<commit_message>
Deployed 594a09d with MkDocs version: 1.5.3
</commit_message>
<xml_diff>
--- a/slides/Unit10_Assertion.pptx
+++ b/slides/Unit10_Assertion.pptx
@@ -184,7 +184,7 @@
 <file path=ppt/revisionInfo.xml><?xml version="1.0" encoding="utf-8"?>
 <p1510:revInfo xmlns:a="http://schemas.openxmlformats.org/drawingml/2006/main" xmlns:r="http://schemas.openxmlformats.org/officeDocument/2006/relationships" xmlns:p1510="http://schemas.microsoft.com/office/powerpoint/2015/10/main">
   <p1510:revLst>
-    <p1510:client id="{E1F69EA3-923B-4A3D-A291-FC2E2F321811}" v="2" dt="2024-01-31T05:32:16.405"/>
+    <p1510:client id="{E1F69EA3-923B-4A3D-A291-FC2E2F321811}" v="7" dt="2024-02-05T04:36:31.437"/>
   </p1510:revLst>
 </p1510:revInfo>
 </file>
@@ -649,8 +649,8 @@
   </pc:docChgLst>
   <pc:docChgLst>
     <pc:chgData name="Zhao Jin" userId="cd05a825-544c-438a-9ba1-08e63db50b47" providerId="ADAL" clId="{E1F69EA3-923B-4A3D-A291-FC2E2F321811}"/>
-    <pc:docChg chg="modSld">
-      <pc:chgData name="Zhao Jin" userId="cd05a825-544c-438a-9ba1-08e63db50b47" providerId="ADAL" clId="{E1F69EA3-923B-4A3D-A291-FC2E2F321811}" dt="2024-01-31T05:35:40.702" v="72" actId="20577"/>
+    <pc:docChg chg="undo custSel modSld">
+      <pc:chgData name="Zhao Jin" userId="cd05a825-544c-438a-9ba1-08e63db50b47" providerId="ADAL" clId="{E1F69EA3-923B-4A3D-A291-FC2E2F321811}" dt="2024-02-05T04:37:46.746" v="359" actId="207"/>
       <pc:docMkLst>
         <pc:docMk/>
       </pc:docMkLst>
@@ -689,6 +689,320 @@
             <pc:docMk/>
             <pc:sldMk cId="1067695719" sldId="526"/>
             <ac:spMk id="13" creationId="{00000000-0000-0000-0000-000000000000}"/>
+          </ac:spMkLst>
+        </pc:spChg>
+      </pc:sldChg>
+      <pc:sldChg chg="modSp mod">
+        <pc:chgData name="Zhao Jin" userId="cd05a825-544c-438a-9ba1-08e63db50b47" providerId="ADAL" clId="{E1F69EA3-923B-4A3D-A291-FC2E2F321811}" dt="2024-02-05T04:28:23.654" v="78" actId="113"/>
+        <pc:sldMkLst>
+          <pc:docMk/>
+          <pc:sldMk cId="3226898961" sldId="552"/>
+        </pc:sldMkLst>
+        <pc:spChg chg="mod">
+          <ac:chgData name="Zhao Jin" userId="cd05a825-544c-438a-9ba1-08e63db50b47" providerId="ADAL" clId="{E1F69EA3-923B-4A3D-A291-FC2E2F321811}" dt="2024-02-05T04:28:23.654" v="78" actId="113"/>
+          <ac:spMkLst>
+            <pc:docMk/>
+            <pc:sldMk cId="3226898961" sldId="552"/>
+            <ac:spMk id="16" creationId="{D2096CE0-F283-4186-90FF-7C54FF151885}"/>
+          </ac:spMkLst>
+        </pc:spChg>
+      </pc:sldChg>
+      <pc:sldChg chg="modSp mod">
+        <pc:chgData name="Zhao Jin" userId="cd05a825-544c-438a-9ba1-08e63db50b47" providerId="ADAL" clId="{E1F69EA3-923B-4A3D-A291-FC2E2F321811}" dt="2024-02-05T04:29:08.077" v="120" actId="1037"/>
+        <pc:sldMkLst>
+          <pc:docMk/>
+          <pc:sldMk cId="3959984611" sldId="553"/>
+        </pc:sldMkLst>
+        <pc:spChg chg="mod">
+          <ac:chgData name="Zhao Jin" userId="cd05a825-544c-438a-9ba1-08e63db50b47" providerId="ADAL" clId="{E1F69EA3-923B-4A3D-A291-FC2E2F321811}" dt="2024-02-05T04:29:02.699" v="83" actId="14100"/>
+          <ac:spMkLst>
+            <pc:docMk/>
+            <pc:sldMk cId="3959984611" sldId="553"/>
+            <ac:spMk id="16" creationId="{D2096CE0-F283-4186-90FF-7C54FF151885}"/>
+          </ac:spMkLst>
+        </pc:spChg>
+        <pc:grpChg chg="mod">
+          <ac:chgData name="Zhao Jin" userId="cd05a825-544c-438a-9ba1-08e63db50b47" providerId="ADAL" clId="{E1F69EA3-923B-4A3D-A291-FC2E2F321811}" dt="2024-02-05T04:29:08.077" v="120" actId="1037"/>
+          <ac:grpSpMkLst>
+            <pc:docMk/>
+            <pc:sldMk cId="3959984611" sldId="553"/>
+            <ac:grpSpMk id="9" creationId="{37416115-CEE5-4CFE-A531-47FECA5A527E}"/>
+          </ac:grpSpMkLst>
+        </pc:grpChg>
+      </pc:sldChg>
+      <pc:sldChg chg="addSp delSp modSp mod">
+        <pc:chgData name="Zhao Jin" userId="cd05a825-544c-438a-9ba1-08e63db50b47" providerId="ADAL" clId="{E1F69EA3-923B-4A3D-A291-FC2E2F321811}" dt="2024-02-05T04:30:25.814" v="142" actId="20577"/>
+        <pc:sldMkLst>
+          <pc:docMk/>
+          <pc:sldMk cId="4088633470" sldId="554"/>
+        </pc:sldMkLst>
+        <pc:spChg chg="mod">
+          <ac:chgData name="Zhao Jin" userId="cd05a825-544c-438a-9ba1-08e63db50b47" providerId="ADAL" clId="{E1F69EA3-923B-4A3D-A291-FC2E2F321811}" dt="2024-02-05T04:29:12.273" v="122"/>
+          <ac:spMkLst>
+            <pc:docMk/>
+            <pc:sldMk cId="4088633470" sldId="554"/>
+            <ac:spMk id="4" creationId="{0FD6E0D9-2FDF-9730-A146-B535D3B4F770}"/>
+          </ac:spMkLst>
+        </pc:spChg>
+        <pc:spChg chg="mod">
+          <ac:chgData name="Zhao Jin" userId="cd05a825-544c-438a-9ba1-08e63db50b47" providerId="ADAL" clId="{E1F69EA3-923B-4A3D-A291-FC2E2F321811}" dt="2024-02-05T04:29:12.273" v="122"/>
+          <ac:spMkLst>
+            <pc:docMk/>
+            <pc:sldMk cId="4088633470" sldId="554"/>
+            <ac:spMk id="13" creationId="{F667D191-013D-D86B-6E05-C44FE3842916}"/>
+          </ac:spMkLst>
+        </pc:spChg>
+        <pc:spChg chg="mod">
+          <ac:chgData name="Zhao Jin" userId="cd05a825-544c-438a-9ba1-08e63db50b47" providerId="ADAL" clId="{E1F69EA3-923B-4A3D-A291-FC2E2F321811}" dt="2024-02-05T04:29:12.273" v="122"/>
+          <ac:spMkLst>
+            <pc:docMk/>
+            <pc:sldMk cId="4088633470" sldId="554"/>
+            <ac:spMk id="14" creationId="{197CE863-6484-DCE1-1425-53AC38FB38D0}"/>
+          </ac:spMkLst>
+        </pc:spChg>
+        <pc:spChg chg="mod">
+          <ac:chgData name="Zhao Jin" userId="cd05a825-544c-438a-9ba1-08e63db50b47" providerId="ADAL" clId="{E1F69EA3-923B-4A3D-A291-FC2E2F321811}" dt="2024-02-05T04:30:25.814" v="142" actId="20577"/>
+          <ac:spMkLst>
+            <pc:docMk/>
+            <pc:sldMk cId="4088633470" sldId="554"/>
+            <ac:spMk id="16" creationId="{D2096CE0-F283-4186-90FF-7C54FF151885}"/>
+          </ac:spMkLst>
+        </pc:spChg>
+        <pc:spChg chg="mod">
+          <ac:chgData name="Zhao Jin" userId="cd05a825-544c-438a-9ba1-08e63db50b47" providerId="ADAL" clId="{E1F69EA3-923B-4A3D-A291-FC2E2F321811}" dt="2024-02-05T04:29:12.273" v="122"/>
+          <ac:spMkLst>
+            <pc:docMk/>
+            <pc:sldMk cId="4088633470" sldId="554"/>
+            <ac:spMk id="29" creationId="{93DDCECD-81F2-FDB9-39B0-AC37CD03B326}"/>
+          </ac:spMkLst>
+        </pc:spChg>
+        <pc:spChg chg="mod">
+          <ac:chgData name="Zhao Jin" userId="cd05a825-544c-438a-9ba1-08e63db50b47" providerId="ADAL" clId="{E1F69EA3-923B-4A3D-A291-FC2E2F321811}" dt="2024-02-05T04:29:12.273" v="122"/>
+          <ac:spMkLst>
+            <pc:docMk/>
+            <pc:sldMk cId="4088633470" sldId="554"/>
+            <ac:spMk id="36" creationId="{72F53E7B-BFA5-512C-3E6E-052EE1527BD0}"/>
+          </ac:spMkLst>
+        </pc:spChg>
+        <pc:grpChg chg="add mod">
+          <ac:chgData name="Zhao Jin" userId="cd05a825-544c-438a-9ba1-08e63db50b47" providerId="ADAL" clId="{E1F69EA3-923B-4A3D-A291-FC2E2F321811}" dt="2024-02-05T04:29:12.273" v="122"/>
+          <ac:grpSpMkLst>
+            <pc:docMk/>
+            <pc:sldMk cId="4088633470" sldId="554"/>
+            <ac:grpSpMk id="3" creationId="{A4B1E7ED-444E-65CA-6B47-63587A78E8D9}"/>
+          </ac:grpSpMkLst>
+        </pc:grpChg>
+        <pc:grpChg chg="del">
+          <ac:chgData name="Zhao Jin" userId="cd05a825-544c-438a-9ba1-08e63db50b47" providerId="ADAL" clId="{E1F69EA3-923B-4A3D-A291-FC2E2F321811}" dt="2024-02-05T04:29:11.402" v="121" actId="478"/>
+          <ac:grpSpMkLst>
+            <pc:docMk/>
+            <pc:sldMk cId="4088633470" sldId="554"/>
+            <ac:grpSpMk id="9" creationId="{37416115-CEE5-4CFE-A531-47FECA5A527E}"/>
+          </ac:grpSpMkLst>
+        </pc:grpChg>
+        <pc:cxnChg chg="mod">
+          <ac:chgData name="Zhao Jin" userId="cd05a825-544c-438a-9ba1-08e63db50b47" providerId="ADAL" clId="{E1F69EA3-923B-4A3D-A291-FC2E2F321811}" dt="2024-02-05T04:29:12.273" v="122"/>
+          <ac:cxnSpMkLst>
+            <pc:docMk/>
+            <pc:sldMk cId="4088633470" sldId="554"/>
+            <ac:cxnSpMk id="5" creationId="{CA210FE5-4997-BC8F-A07A-D125CF7FA7FF}"/>
+          </ac:cxnSpMkLst>
+        </pc:cxnChg>
+        <pc:cxnChg chg="mod">
+          <ac:chgData name="Zhao Jin" userId="cd05a825-544c-438a-9ba1-08e63db50b47" providerId="ADAL" clId="{E1F69EA3-923B-4A3D-A291-FC2E2F321811}" dt="2024-02-05T04:29:12.273" v="122"/>
+          <ac:cxnSpMkLst>
+            <pc:docMk/>
+            <pc:sldMk cId="4088633470" sldId="554"/>
+            <ac:cxnSpMk id="6" creationId="{44874913-F340-F2C6-C44D-485CD2C7496C}"/>
+          </ac:cxnSpMkLst>
+        </pc:cxnChg>
+        <pc:cxnChg chg="mod">
+          <ac:chgData name="Zhao Jin" userId="cd05a825-544c-438a-9ba1-08e63db50b47" providerId="ADAL" clId="{E1F69EA3-923B-4A3D-A291-FC2E2F321811}" dt="2024-02-05T04:29:12.273" v="122"/>
+          <ac:cxnSpMkLst>
+            <pc:docMk/>
+            <pc:sldMk cId="4088633470" sldId="554"/>
+            <ac:cxnSpMk id="8" creationId="{5A307302-CA6E-0A8C-688C-6EC3BBDD5230}"/>
+          </ac:cxnSpMkLst>
+        </pc:cxnChg>
+        <pc:cxnChg chg="mod">
+          <ac:chgData name="Zhao Jin" userId="cd05a825-544c-438a-9ba1-08e63db50b47" providerId="ADAL" clId="{E1F69EA3-923B-4A3D-A291-FC2E2F321811}" dt="2024-02-05T04:29:11.402" v="121" actId="478"/>
+          <ac:cxnSpMkLst>
+            <pc:docMk/>
+            <pc:sldMk cId="4088633470" sldId="554"/>
+            <ac:cxnSpMk id="11" creationId="{5375CFEE-B18D-4AF5-A183-92F82A04AB95}"/>
+          </ac:cxnSpMkLst>
+        </pc:cxnChg>
+        <pc:cxnChg chg="mod">
+          <ac:chgData name="Zhao Jin" userId="cd05a825-544c-438a-9ba1-08e63db50b47" providerId="ADAL" clId="{E1F69EA3-923B-4A3D-A291-FC2E2F321811}" dt="2024-02-05T04:29:12.273" v="122"/>
+          <ac:cxnSpMkLst>
+            <pc:docMk/>
+            <pc:sldMk cId="4088633470" sldId="554"/>
+            <ac:cxnSpMk id="31" creationId="{9CF90E05-ACCB-6526-436B-BE894E291816}"/>
+          </ac:cxnSpMkLst>
+        </pc:cxnChg>
+        <pc:cxnChg chg="mod">
+          <ac:chgData name="Zhao Jin" userId="cd05a825-544c-438a-9ba1-08e63db50b47" providerId="ADAL" clId="{E1F69EA3-923B-4A3D-A291-FC2E2F321811}" dt="2024-02-05T04:29:12.273" v="122"/>
+          <ac:cxnSpMkLst>
+            <pc:docMk/>
+            <pc:sldMk cId="4088633470" sldId="554"/>
+            <ac:cxnSpMk id="32" creationId="{04173FB7-CD45-7AA3-8DAE-1102C37FAD37}"/>
+          </ac:cxnSpMkLst>
+        </pc:cxnChg>
+        <pc:cxnChg chg="mod">
+          <ac:chgData name="Zhao Jin" userId="cd05a825-544c-438a-9ba1-08e63db50b47" providerId="ADAL" clId="{E1F69EA3-923B-4A3D-A291-FC2E2F321811}" dt="2024-02-05T04:29:12.273" v="122"/>
+          <ac:cxnSpMkLst>
+            <pc:docMk/>
+            <pc:sldMk cId="4088633470" sldId="554"/>
+            <ac:cxnSpMk id="33" creationId="{3B75B619-FEAC-0EFE-D57F-1C4820A48AB1}"/>
+          </ac:cxnSpMkLst>
+        </pc:cxnChg>
+        <pc:cxnChg chg="mod">
+          <ac:chgData name="Zhao Jin" userId="cd05a825-544c-438a-9ba1-08e63db50b47" providerId="ADAL" clId="{E1F69EA3-923B-4A3D-A291-FC2E2F321811}" dt="2024-02-05T04:29:12.273" v="122"/>
+          <ac:cxnSpMkLst>
+            <pc:docMk/>
+            <pc:sldMk cId="4088633470" sldId="554"/>
+            <ac:cxnSpMk id="34" creationId="{D9BF39EB-0508-0EF1-5264-0B104F2206B1}"/>
+          </ac:cxnSpMkLst>
+        </pc:cxnChg>
+        <pc:cxnChg chg="mod">
+          <ac:chgData name="Zhao Jin" userId="cd05a825-544c-438a-9ba1-08e63db50b47" providerId="ADAL" clId="{E1F69EA3-923B-4A3D-A291-FC2E2F321811}" dt="2024-02-05T04:29:12.273" v="122"/>
+          <ac:cxnSpMkLst>
+            <pc:docMk/>
+            <pc:sldMk cId="4088633470" sldId="554"/>
+            <ac:cxnSpMk id="35" creationId="{4BAFF74A-81C2-3855-FE34-0D6B09231ED8}"/>
+          </ac:cxnSpMkLst>
+        </pc:cxnChg>
+        <pc:cxnChg chg="mod">
+          <ac:chgData name="Zhao Jin" userId="cd05a825-544c-438a-9ba1-08e63db50b47" providerId="ADAL" clId="{E1F69EA3-923B-4A3D-A291-FC2E2F321811}" dt="2024-02-05T04:29:12.273" v="122"/>
+          <ac:cxnSpMkLst>
+            <pc:docMk/>
+            <pc:sldMk cId="4088633470" sldId="554"/>
+            <ac:cxnSpMk id="37" creationId="{611A1807-EE83-CD39-F8D4-E0953D65283D}"/>
+          </ac:cxnSpMkLst>
+        </pc:cxnChg>
+        <pc:cxnChg chg="mod">
+          <ac:chgData name="Zhao Jin" userId="cd05a825-544c-438a-9ba1-08e63db50b47" providerId="ADAL" clId="{E1F69EA3-923B-4A3D-A291-FC2E2F321811}" dt="2024-02-05T04:29:12.273" v="122"/>
+          <ac:cxnSpMkLst>
+            <pc:docMk/>
+            <pc:sldMk cId="4088633470" sldId="554"/>
+            <ac:cxnSpMk id="38" creationId="{565A25FF-B4F3-2E7F-88DA-E8F294D02FB2}"/>
+          </ac:cxnSpMkLst>
+        </pc:cxnChg>
+      </pc:sldChg>
+      <pc:sldChg chg="addSp delSp modSp mod">
+        <pc:chgData name="Zhao Jin" userId="cd05a825-544c-438a-9ba1-08e63db50b47" providerId="ADAL" clId="{E1F69EA3-923B-4A3D-A291-FC2E2F321811}" dt="2024-02-05T04:34:10.801" v="243" actId="20577"/>
+        <pc:sldMkLst>
+          <pc:docMk/>
+          <pc:sldMk cId="4050494307" sldId="555"/>
+        </pc:sldMkLst>
+        <pc:spChg chg="mod">
+          <ac:chgData name="Zhao Jin" userId="cd05a825-544c-438a-9ba1-08e63db50b47" providerId="ADAL" clId="{E1F69EA3-923B-4A3D-A291-FC2E2F321811}" dt="2024-02-05T04:34:10.801" v="243" actId="20577"/>
+          <ac:spMkLst>
+            <pc:docMk/>
+            <pc:sldMk cId="4050494307" sldId="555"/>
+            <ac:spMk id="16" creationId="{D2096CE0-F283-4186-90FF-7C54FF151885}"/>
+          </ac:spMkLst>
+        </pc:spChg>
+        <pc:picChg chg="del">
+          <ac:chgData name="Zhao Jin" userId="cd05a825-544c-438a-9ba1-08e63db50b47" providerId="ADAL" clId="{E1F69EA3-923B-4A3D-A291-FC2E2F321811}" dt="2024-02-05T04:31:31.506" v="161" actId="478"/>
+          <ac:picMkLst>
+            <pc:docMk/>
+            <pc:sldMk cId="4050494307" sldId="555"/>
+            <ac:picMk id="2" creationId="{6D73691B-4B97-4B86-8C7B-28391EA29716}"/>
+          </ac:picMkLst>
+        </pc:picChg>
+        <pc:picChg chg="add mod">
+          <ac:chgData name="Zhao Jin" userId="cd05a825-544c-438a-9ba1-08e63db50b47" providerId="ADAL" clId="{E1F69EA3-923B-4A3D-A291-FC2E2F321811}" dt="2024-02-05T04:31:27.377" v="159"/>
+          <ac:picMkLst>
+            <pc:docMk/>
+            <pc:sldMk cId="4050494307" sldId="555"/>
+            <ac:picMk id="4" creationId="{8AA832E5-22F5-EF34-96B2-BD37174DB6C4}"/>
+          </ac:picMkLst>
+        </pc:picChg>
+        <pc:picChg chg="add mod">
+          <ac:chgData name="Zhao Jin" userId="cd05a825-544c-438a-9ba1-08e63db50b47" providerId="ADAL" clId="{E1F69EA3-923B-4A3D-A291-FC2E2F321811}" dt="2024-02-05T04:31:30.348" v="160"/>
+          <ac:picMkLst>
+            <pc:docMk/>
+            <pc:sldMk cId="4050494307" sldId="555"/>
+            <ac:picMk id="5" creationId="{AC813A67-6D14-9982-2391-67B6D47D8FF5}"/>
+          </ac:picMkLst>
+        </pc:picChg>
+      </pc:sldChg>
+      <pc:sldChg chg="modSp mod">
+        <pc:chgData name="Zhao Jin" userId="cd05a825-544c-438a-9ba1-08e63db50b47" providerId="ADAL" clId="{E1F69EA3-923B-4A3D-A291-FC2E2F321811}" dt="2024-02-05T04:31:21.826" v="158" actId="1076"/>
+        <pc:sldMkLst>
+          <pc:docMk/>
+          <pc:sldMk cId="184150163" sldId="556"/>
+        </pc:sldMkLst>
+        <pc:spChg chg="mod">
+          <ac:chgData name="Zhao Jin" userId="cd05a825-544c-438a-9ba1-08e63db50b47" providerId="ADAL" clId="{E1F69EA3-923B-4A3D-A291-FC2E2F321811}" dt="2024-02-05T04:31:16.064" v="157" actId="6549"/>
+          <ac:spMkLst>
+            <pc:docMk/>
+            <pc:sldMk cId="184150163" sldId="556"/>
+            <ac:spMk id="16" creationId="{D2096CE0-F283-4186-90FF-7C54FF151885}"/>
+          </ac:spMkLst>
+        </pc:spChg>
+        <pc:picChg chg="mod">
+          <ac:chgData name="Zhao Jin" userId="cd05a825-544c-438a-9ba1-08e63db50b47" providerId="ADAL" clId="{E1F69EA3-923B-4A3D-A291-FC2E2F321811}" dt="2024-02-05T04:31:21.826" v="158" actId="1076"/>
+          <ac:picMkLst>
+            <pc:docMk/>
+            <pc:sldMk cId="184150163" sldId="556"/>
+            <ac:picMk id="2" creationId="{6D73691B-4B97-4B86-8C7B-28391EA29716}"/>
+          </ac:picMkLst>
+        </pc:picChg>
+      </pc:sldChg>
+      <pc:sldChg chg="addSp modSp mod">
+        <pc:chgData name="Zhao Jin" userId="cd05a825-544c-438a-9ba1-08e63db50b47" providerId="ADAL" clId="{E1F69EA3-923B-4A3D-A291-FC2E2F321811}" dt="2024-02-05T04:37:46.746" v="359" actId="207"/>
+        <pc:sldMkLst>
+          <pc:docMk/>
+          <pc:sldMk cId="3003604107" sldId="557"/>
+        </pc:sldMkLst>
+        <pc:spChg chg="add">
+          <ac:chgData name="Zhao Jin" userId="cd05a825-544c-438a-9ba1-08e63db50b47" providerId="ADAL" clId="{E1F69EA3-923B-4A3D-A291-FC2E2F321811}" dt="2024-02-05T04:36:29.644" v="305" actId="11529"/>
+          <ac:spMkLst>
+            <pc:docMk/>
+            <pc:sldMk cId="3003604107" sldId="557"/>
+            <ac:spMk id="3" creationId="{EB29D67A-E1FB-B8A1-FFED-05798E6A90A4}"/>
+          </ac:spMkLst>
+        </pc:spChg>
+        <pc:spChg chg="add mod">
+          <ac:chgData name="Zhao Jin" userId="cd05a825-544c-438a-9ba1-08e63db50b47" providerId="ADAL" clId="{E1F69EA3-923B-4A3D-A291-FC2E2F321811}" dt="2024-02-05T04:36:40.985" v="309" actId="1076"/>
+          <ac:spMkLst>
+            <pc:docMk/>
+            <pc:sldMk cId="3003604107" sldId="557"/>
+            <ac:spMk id="4" creationId="{28C1099F-1121-70FE-4A9C-B34BE7EF3CFA}"/>
+          </ac:spMkLst>
+        </pc:spChg>
+        <pc:spChg chg="mod">
+          <ac:chgData name="Zhao Jin" userId="cd05a825-544c-438a-9ba1-08e63db50b47" providerId="ADAL" clId="{E1F69EA3-923B-4A3D-A291-FC2E2F321811}" dt="2024-02-05T04:37:10.170" v="352" actId="20577"/>
+          <ac:spMkLst>
+            <pc:docMk/>
+            <pc:sldMk cId="3003604107" sldId="557"/>
+            <ac:spMk id="8" creationId="{00000000-0000-0000-0000-000000000000}"/>
+          </ac:spMkLst>
+        </pc:spChg>
+        <pc:spChg chg="mod">
+          <ac:chgData name="Zhao Jin" userId="cd05a825-544c-438a-9ba1-08e63db50b47" providerId="ADAL" clId="{E1F69EA3-923B-4A3D-A291-FC2E2F321811}" dt="2024-02-05T04:37:33.021" v="355" actId="207"/>
+          <ac:spMkLst>
+            <pc:docMk/>
+            <pc:sldMk cId="3003604107" sldId="557"/>
+            <ac:spMk id="9" creationId="{BB45AA11-5681-47FB-AA94-C76223DE9352}"/>
+          </ac:spMkLst>
+        </pc:spChg>
+        <pc:spChg chg="mod">
+          <ac:chgData name="Zhao Jin" userId="cd05a825-544c-438a-9ba1-08e63db50b47" providerId="ADAL" clId="{E1F69EA3-923B-4A3D-A291-FC2E2F321811}" dt="2024-02-05T04:37:39.820" v="357" actId="207"/>
+          <ac:spMkLst>
+            <pc:docMk/>
+            <pc:sldMk cId="3003604107" sldId="557"/>
+            <ac:spMk id="10" creationId="{1F82F03C-3D9A-47CF-8FA6-851312B9155C}"/>
+          </ac:spMkLst>
+        </pc:spChg>
+        <pc:spChg chg="mod">
+          <ac:chgData name="Zhao Jin" userId="cd05a825-544c-438a-9ba1-08e63db50b47" providerId="ADAL" clId="{E1F69EA3-923B-4A3D-A291-FC2E2F321811}" dt="2024-02-05T04:37:46.746" v="359" actId="207"/>
+          <ac:spMkLst>
+            <pc:docMk/>
+            <pc:sldMk cId="3003604107" sldId="557"/>
+            <ac:spMk id="11" creationId="{84C2A383-CC54-46C5-88B7-8AA206CA370C}"/>
           </ac:spMkLst>
         </pc:spChg>
       </pc:sldChg>
@@ -3047,7 +3361,7 @@
               <a:pPr>
                 <a:defRPr/>
               </a:pPr>
-              <a:t>1/31/2024</a:t>
+              <a:t>2/5/2024</a:t>
             </a:fld>
             <a:endParaRPr lang="en-US" dirty="0"/>
           </a:p>
@@ -8696,51 +9010,51 @@
               </a:tabLst>
             </a:pPr>
             <a:r>
-              <a:rPr lang="es-ES" sz="2000" dirty="0">
+              <a:rPr lang="es-ES" sz="2000" b="1" dirty="0">
                 <a:solidFill>
                   <a:schemeClr val="tx1"/>
                 </a:solidFill>
-                <a:latin typeface="Roboto Mono"/>
+                <a:latin typeface="Courier New" panose="02070309020205020404" pitchFamily="49" charset="0"/>
                 <a:cs typeface="Courier New" panose="02070309020205020404" pitchFamily="49" charset="0"/>
               </a:rPr>
               <a:t>… // </a:t>
             </a:r>
             <a:r>
-              <a:rPr lang="es-ES" sz="2000" dirty="0" err="1">
+              <a:rPr lang="es-ES" sz="2000" b="1" dirty="0" err="1">
                 <a:solidFill>
                   <a:schemeClr val="tx1"/>
                 </a:solidFill>
-                <a:latin typeface="Roboto Mono"/>
+                <a:latin typeface="Courier New" panose="02070309020205020404" pitchFamily="49" charset="0"/>
                 <a:cs typeface="Courier New" panose="02070309020205020404" pitchFamily="49" charset="0"/>
               </a:rPr>
               <a:t>some</a:t>
             </a:r>
             <a:r>
-              <a:rPr lang="es-ES" sz="2000" dirty="0">
+              <a:rPr lang="es-ES" sz="2000" b="1" dirty="0">
                 <a:solidFill>
                   <a:schemeClr val="tx1"/>
                 </a:solidFill>
-                <a:latin typeface="Roboto Mono"/>
+                <a:latin typeface="Courier New" panose="02070309020205020404" pitchFamily="49" charset="0"/>
                 <a:cs typeface="Courier New" panose="02070309020205020404" pitchFamily="49" charset="0"/>
               </a:rPr>
               <a:t> </a:t>
             </a:r>
             <a:r>
-              <a:rPr lang="es-ES" sz="2000" dirty="0" err="1">
+              <a:rPr lang="es-ES" sz="2000" b="1" dirty="0" err="1">
                 <a:solidFill>
                   <a:schemeClr val="tx1"/>
                 </a:solidFill>
-                <a:latin typeface="Roboto Mono"/>
+                <a:latin typeface="Courier New" panose="02070309020205020404" pitchFamily="49" charset="0"/>
                 <a:cs typeface="Courier New" panose="02070309020205020404" pitchFamily="49" charset="0"/>
               </a:rPr>
               <a:t>code</a:t>
             </a:r>
             <a:r>
-              <a:rPr lang="es-ES" sz="2000" dirty="0">
+              <a:rPr lang="es-ES" sz="2000" b="1" dirty="0">
                 <a:solidFill>
                   <a:schemeClr val="tx1"/>
                 </a:solidFill>
-                <a:latin typeface="Roboto Mono"/>
+                <a:latin typeface="Courier New" panose="02070309020205020404" pitchFamily="49" charset="0"/>
                 <a:cs typeface="Courier New" panose="02070309020205020404" pitchFamily="49" charset="0"/>
               </a:rPr>
               <a:t> Step 1</a:t>
@@ -8757,92 +9071,92 @@
               </a:tabLst>
             </a:pPr>
             <a:r>
-              <a:rPr lang="es-ES" sz="2000" dirty="0">
+              <a:rPr lang="es-ES" sz="2000" b="1" dirty="0">
                 <a:solidFill>
                   <a:srgbClr val="0000FF"/>
                 </a:solidFill>
                 <a:highlight>
                   <a:srgbClr val="FFFF00"/>
                 </a:highlight>
-                <a:latin typeface="Roboto Mono"/>
+                <a:latin typeface="Courier New" panose="02070309020205020404" pitchFamily="49" charset="0"/>
                 <a:cs typeface="Courier New" panose="02070309020205020404" pitchFamily="49" charset="0"/>
               </a:rPr>
               <a:t>// {</a:t>
             </a:r>
             <a:r>
-              <a:rPr lang="es-ES" sz="2000" dirty="0" err="1">
+              <a:rPr lang="es-ES" sz="2000" b="1" dirty="0" err="1">
                 <a:solidFill>
                   <a:srgbClr val="0000FF"/>
                 </a:solidFill>
                 <a:highlight>
                   <a:srgbClr val="FFFF00"/>
                 </a:highlight>
-                <a:latin typeface="Roboto Mono"/>
+                <a:latin typeface="Courier New" panose="02070309020205020404" pitchFamily="49" charset="0"/>
                 <a:cs typeface="Courier New" panose="02070309020205020404" pitchFamily="49" charset="0"/>
               </a:rPr>
               <a:t>Assertion</a:t>
             </a:r>
             <a:r>
-              <a:rPr lang="es-ES" sz="2000" dirty="0">
+              <a:rPr lang="es-ES" sz="2000" b="1" dirty="0">
                 <a:solidFill>
                   <a:srgbClr val="0000FF"/>
                 </a:solidFill>
                 <a:highlight>
                   <a:srgbClr val="FFFF00"/>
                 </a:highlight>
-                <a:latin typeface="Roboto Mono"/>
+                <a:latin typeface="Courier New" panose="02070309020205020404" pitchFamily="49" charset="0"/>
                 <a:cs typeface="Courier New" panose="02070309020205020404" pitchFamily="49" charset="0"/>
               </a:rPr>
               <a:t> </a:t>
             </a:r>
             <a:r>
-              <a:rPr lang="es-ES" sz="2000" dirty="0" err="1">
+              <a:rPr lang="es-ES" sz="2000" b="1" dirty="0" err="1">
                 <a:solidFill>
                   <a:srgbClr val="0000FF"/>
                 </a:solidFill>
                 <a:highlight>
                   <a:srgbClr val="FFFF00"/>
                 </a:highlight>
-                <a:latin typeface="Roboto Mono"/>
+                <a:latin typeface="Courier New" panose="02070309020205020404" pitchFamily="49" charset="0"/>
                 <a:cs typeface="Courier New" panose="02070309020205020404" pitchFamily="49" charset="0"/>
               </a:rPr>
               <a:t>that</a:t>
             </a:r>
             <a:r>
-              <a:rPr lang="es-ES" sz="2000" dirty="0">
+              <a:rPr lang="es-ES" sz="2000" b="1" dirty="0">
                 <a:solidFill>
                   <a:srgbClr val="0000FF"/>
                 </a:solidFill>
                 <a:highlight>
                   <a:srgbClr val="FFFF00"/>
                 </a:highlight>
-                <a:latin typeface="Roboto Mono"/>
+                <a:latin typeface="Courier New" panose="02070309020205020404" pitchFamily="49" charset="0"/>
                 <a:cs typeface="Courier New" panose="02070309020205020404" pitchFamily="49" charset="0"/>
               </a:rPr>
               <a:t> </a:t>
             </a:r>
             <a:r>
-              <a:rPr lang="es-ES" sz="2000" dirty="0" err="1">
+              <a:rPr lang="es-ES" sz="2000" b="1" dirty="0" err="1">
                 <a:solidFill>
                   <a:srgbClr val="0000FF"/>
                 </a:solidFill>
                 <a:highlight>
                   <a:srgbClr val="FFFF00"/>
                 </a:highlight>
-                <a:latin typeface="Roboto Mono"/>
+                <a:latin typeface="Courier New" panose="02070309020205020404" pitchFamily="49" charset="0"/>
                 <a:cs typeface="Courier New" panose="02070309020205020404" pitchFamily="49" charset="0"/>
               </a:rPr>
               <a:t>must</a:t>
             </a:r>
             <a:r>
-              <a:rPr lang="es-ES" sz="2000" dirty="0">
+              <a:rPr lang="es-ES" sz="2000" b="1" dirty="0">
                 <a:solidFill>
                   <a:srgbClr val="0000FF"/>
                 </a:solidFill>
                 <a:highlight>
                   <a:srgbClr val="FFFF00"/>
                 </a:highlight>
-                <a:latin typeface="Roboto Mono"/>
+                <a:latin typeface="Courier New" panose="02070309020205020404" pitchFamily="49" charset="0"/>
                 <a:cs typeface="Courier New" panose="02070309020205020404" pitchFamily="49" charset="0"/>
               </a:rPr>
               <a:t> be true after Step 1}</a:t>
@@ -8858,12 +9172,13 @@
                 <a:tab pos="1712913" algn="l"/>
               </a:tabLst>
             </a:pPr>
-            <a:endParaRPr lang="es-ES" sz="2000" i="0" dirty="0">
+            <a:endParaRPr lang="es-ES" sz="2000" b="1" i="0" dirty="0">
               <a:solidFill>
                 <a:srgbClr val="0000FF"/>
               </a:solidFill>
               <a:effectLst/>
-              <a:latin typeface="Roboto Mono"/>
+              <a:latin typeface="Courier New" panose="02070309020205020404" pitchFamily="49" charset="0"/>
+              <a:cs typeface="Courier New" panose="02070309020205020404" pitchFamily="49" charset="0"/>
             </a:endParaRPr>
           </a:p>
           <a:p>
@@ -8877,50 +9192,50 @@
               </a:tabLst>
             </a:pPr>
             <a:r>
-              <a:rPr lang="es-ES" sz="2000" dirty="0">
+              <a:rPr lang="es-ES" sz="2000" b="1" dirty="0">
                 <a:solidFill>
                   <a:schemeClr val="tx1"/>
                 </a:solidFill>
-                <a:latin typeface="Roboto Mono"/>
+                <a:latin typeface="Courier New" panose="02070309020205020404" pitchFamily="49" charset="0"/>
                 <a:cs typeface="Courier New" panose="02070309020205020404" pitchFamily="49" charset="0"/>
               </a:rPr>
               <a:t>… // </a:t>
             </a:r>
             <a:r>
-              <a:rPr lang="es-ES" sz="2000" dirty="0" err="1">
+              <a:rPr lang="es-ES" sz="2000" b="1" dirty="0" err="1">
                 <a:solidFill>
                   <a:schemeClr val="tx1"/>
                 </a:solidFill>
-                <a:latin typeface="Roboto Mono"/>
+                <a:latin typeface="Courier New" panose="02070309020205020404" pitchFamily="49" charset="0"/>
                 <a:cs typeface="Courier New" panose="02070309020205020404" pitchFamily="49" charset="0"/>
               </a:rPr>
               <a:t>some</a:t>
             </a:r>
             <a:r>
-              <a:rPr lang="es-ES" sz="2000" dirty="0">
+              <a:rPr lang="es-ES" sz="2000" b="1" dirty="0">
                 <a:solidFill>
                   <a:schemeClr val="tx1"/>
                 </a:solidFill>
-                <a:latin typeface="Roboto Mono"/>
+                <a:latin typeface="Courier New" panose="02070309020205020404" pitchFamily="49" charset="0"/>
                 <a:cs typeface="Courier New" panose="02070309020205020404" pitchFamily="49" charset="0"/>
               </a:rPr>
               <a:t> </a:t>
             </a:r>
             <a:r>
-              <a:rPr lang="es-ES" sz="2000" dirty="0" err="1">
+              <a:rPr lang="es-ES" sz="2000" b="1" dirty="0" err="1">
                 <a:solidFill>
                   <a:schemeClr val="tx1"/>
                 </a:solidFill>
-                <a:latin typeface="Roboto Mono"/>
+                <a:latin typeface="Courier New" panose="02070309020205020404" pitchFamily="49" charset="0"/>
                 <a:cs typeface="Courier New" panose="02070309020205020404" pitchFamily="49" charset="0"/>
               </a:rPr>
               <a:t>code</a:t>
             </a:r>
-            <a:endParaRPr lang="es-ES" sz="2000" dirty="0">
+            <a:endParaRPr lang="es-ES" sz="2000" b="1" dirty="0">
               <a:solidFill>
                 <a:schemeClr val="tx1"/>
               </a:solidFill>
-              <a:latin typeface="Roboto Mono"/>
+              <a:latin typeface="Courier New" panose="02070309020205020404" pitchFamily="49" charset="0"/>
               <a:cs typeface="Courier New" panose="02070309020205020404" pitchFamily="49" charset="0"/>
             </a:endParaRPr>
           </a:p>
@@ -8935,92 +9250,92 @@
               </a:tabLst>
             </a:pPr>
             <a:r>
-              <a:rPr lang="es-ES" sz="2000" dirty="0">
+              <a:rPr lang="es-ES" sz="2000" b="1" dirty="0">
                 <a:solidFill>
                   <a:srgbClr val="0000FF"/>
                 </a:solidFill>
                 <a:highlight>
                   <a:srgbClr val="FFFF00"/>
                 </a:highlight>
-                <a:latin typeface="Roboto Mono"/>
+                <a:latin typeface="Courier New" panose="02070309020205020404" pitchFamily="49" charset="0"/>
                 <a:cs typeface="Courier New" panose="02070309020205020404" pitchFamily="49" charset="0"/>
               </a:rPr>
               <a:t>// {</a:t>
             </a:r>
             <a:r>
-              <a:rPr lang="es-ES" sz="2000" dirty="0" err="1">
+              <a:rPr lang="es-ES" sz="2000" b="1" dirty="0" err="1">
                 <a:solidFill>
                   <a:srgbClr val="0000FF"/>
                 </a:solidFill>
                 <a:highlight>
                   <a:srgbClr val="FFFF00"/>
                 </a:highlight>
-                <a:latin typeface="Roboto Mono"/>
+                <a:latin typeface="Courier New" panose="02070309020205020404" pitchFamily="49" charset="0"/>
                 <a:cs typeface="Courier New" panose="02070309020205020404" pitchFamily="49" charset="0"/>
               </a:rPr>
               <a:t>Assertion</a:t>
             </a:r>
             <a:r>
-              <a:rPr lang="es-ES" sz="2000" dirty="0">
+              <a:rPr lang="es-ES" sz="2000" b="1" dirty="0">
                 <a:solidFill>
                   <a:srgbClr val="0000FF"/>
                 </a:solidFill>
                 <a:highlight>
                   <a:srgbClr val="FFFF00"/>
                 </a:highlight>
-                <a:latin typeface="Roboto Mono"/>
+                <a:latin typeface="Courier New" panose="02070309020205020404" pitchFamily="49" charset="0"/>
                 <a:cs typeface="Courier New" panose="02070309020205020404" pitchFamily="49" charset="0"/>
               </a:rPr>
               <a:t> </a:t>
             </a:r>
             <a:r>
-              <a:rPr lang="es-ES" sz="2000" dirty="0" err="1">
+              <a:rPr lang="es-ES" sz="2000" b="1" dirty="0" err="1">
                 <a:solidFill>
                   <a:srgbClr val="0000FF"/>
                 </a:solidFill>
                 <a:highlight>
                   <a:srgbClr val="FFFF00"/>
                 </a:highlight>
-                <a:latin typeface="Roboto Mono"/>
+                <a:latin typeface="Courier New" panose="02070309020205020404" pitchFamily="49" charset="0"/>
                 <a:cs typeface="Courier New" panose="02070309020205020404" pitchFamily="49" charset="0"/>
               </a:rPr>
               <a:t>that</a:t>
             </a:r>
             <a:r>
-              <a:rPr lang="es-ES" sz="2000" dirty="0">
+              <a:rPr lang="es-ES" sz="2000" b="1" dirty="0">
                 <a:solidFill>
                   <a:srgbClr val="0000FF"/>
                 </a:solidFill>
                 <a:highlight>
                   <a:srgbClr val="FFFF00"/>
                 </a:highlight>
-                <a:latin typeface="Roboto Mono"/>
+                <a:latin typeface="Courier New" panose="02070309020205020404" pitchFamily="49" charset="0"/>
                 <a:cs typeface="Courier New" panose="02070309020205020404" pitchFamily="49" charset="0"/>
               </a:rPr>
               <a:t> </a:t>
             </a:r>
             <a:r>
-              <a:rPr lang="es-ES" sz="2000" dirty="0" err="1">
+              <a:rPr lang="es-ES" sz="2000" b="1" dirty="0" err="1">
                 <a:solidFill>
                   <a:srgbClr val="0000FF"/>
                 </a:solidFill>
                 <a:highlight>
                   <a:srgbClr val="FFFF00"/>
                 </a:highlight>
-                <a:latin typeface="Roboto Mono"/>
+                <a:latin typeface="Courier New" panose="02070309020205020404" pitchFamily="49" charset="0"/>
                 <a:cs typeface="Courier New" panose="02070309020205020404" pitchFamily="49" charset="0"/>
               </a:rPr>
               <a:t>must</a:t>
             </a:r>
             <a:r>
-              <a:rPr lang="es-ES" sz="2000" dirty="0">
+              <a:rPr lang="es-ES" sz="2000" b="1" dirty="0">
                 <a:solidFill>
                   <a:srgbClr val="0000FF"/>
                 </a:solidFill>
                 <a:highlight>
                   <a:srgbClr val="FFFF00"/>
                 </a:highlight>
-                <a:latin typeface="Roboto Mono"/>
+                <a:latin typeface="Courier New" panose="02070309020205020404" pitchFamily="49" charset="0"/>
                 <a:cs typeface="Courier New" panose="02070309020205020404" pitchFamily="49" charset="0"/>
               </a:rPr>
               <a:t> be true after Step 2}</a:t>
@@ -9036,14 +9351,14 @@
                 <a:tab pos="1712913" algn="l"/>
               </a:tabLst>
             </a:pPr>
-            <a:endParaRPr lang="es-ES" sz="2000" dirty="0">
+            <a:endParaRPr lang="es-ES" sz="2000" b="1" dirty="0">
               <a:solidFill>
                 <a:srgbClr val="0000FF"/>
               </a:solidFill>
               <a:highlight>
                 <a:srgbClr val="FFFF00"/>
               </a:highlight>
-              <a:latin typeface="Roboto Mono"/>
+              <a:latin typeface="Courier New" panose="02070309020205020404" pitchFamily="49" charset="0"/>
               <a:cs typeface="Courier New" panose="02070309020205020404" pitchFamily="49" charset="0"/>
             </a:endParaRPr>
           </a:p>
@@ -9058,50 +9373,50 @@
               </a:tabLst>
             </a:pPr>
             <a:r>
-              <a:rPr lang="es-ES" sz="2000" dirty="0">
+              <a:rPr lang="es-ES" sz="2000" b="1" dirty="0">
                 <a:solidFill>
                   <a:schemeClr val="tx1"/>
                 </a:solidFill>
-                <a:latin typeface="Roboto Mono"/>
+                <a:latin typeface="Courier New" panose="02070309020205020404" pitchFamily="49" charset="0"/>
                 <a:cs typeface="Courier New" panose="02070309020205020404" pitchFamily="49" charset="0"/>
               </a:rPr>
               <a:t>… // </a:t>
             </a:r>
             <a:r>
-              <a:rPr lang="es-ES" sz="2000" dirty="0" err="1">
+              <a:rPr lang="es-ES" sz="2000" b="1" dirty="0" err="1">
                 <a:solidFill>
                   <a:schemeClr val="tx1"/>
                 </a:solidFill>
-                <a:latin typeface="Roboto Mono"/>
+                <a:latin typeface="Courier New" panose="02070309020205020404" pitchFamily="49" charset="0"/>
                 <a:cs typeface="Courier New" panose="02070309020205020404" pitchFamily="49" charset="0"/>
               </a:rPr>
               <a:t>some</a:t>
             </a:r>
             <a:r>
-              <a:rPr lang="es-ES" sz="2000" dirty="0">
+              <a:rPr lang="es-ES" sz="2000" b="1" dirty="0">
                 <a:solidFill>
                   <a:schemeClr val="tx1"/>
                 </a:solidFill>
-                <a:latin typeface="Roboto Mono"/>
+                <a:latin typeface="Courier New" panose="02070309020205020404" pitchFamily="49" charset="0"/>
                 <a:cs typeface="Courier New" panose="02070309020205020404" pitchFamily="49" charset="0"/>
               </a:rPr>
               <a:t> </a:t>
             </a:r>
             <a:r>
-              <a:rPr lang="es-ES" sz="2000" dirty="0" err="1">
+              <a:rPr lang="es-ES" sz="2000" b="1" dirty="0" err="1">
                 <a:solidFill>
                   <a:schemeClr val="tx1"/>
                 </a:solidFill>
-                <a:latin typeface="Roboto Mono"/>
+                <a:latin typeface="Courier New" panose="02070309020205020404" pitchFamily="49" charset="0"/>
                 <a:cs typeface="Courier New" panose="02070309020205020404" pitchFamily="49" charset="0"/>
               </a:rPr>
               <a:t>code</a:t>
             </a:r>
-            <a:endParaRPr lang="es-ES" sz="2000" dirty="0">
+            <a:endParaRPr lang="es-ES" sz="2000" b="1" dirty="0">
               <a:solidFill>
                 <a:schemeClr val="tx1"/>
               </a:solidFill>
-              <a:latin typeface="Roboto Mono"/>
+              <a:latin typeface="Courier New" panose="02070309020205020404" pitchFamily="49" charset="0"/>
               <a:cs typeface="Courier New" panose="02070309020205020404" pitchFamily="49" charset="0"/>
             </a:endParaRPr>
           </a:p>
@@ -9116,92 +9431,92 @@
               </a:tabLst>
             </a:pPr>
             <a:r>
-              <a:rPr lang="es-ES" sz="2000" dirty="0">
+              <a:rPr lang="es-ES" sz="2000" b="1" dirty="0">
                 <a:solidFill>
                   <a:srgbClr val="0000FF"/>
                 </a:solidFill>
                 <a:highlight>
                   <a:srgbClr val="FFFF00"/>
                 </a:highlight>
-                <a:latin typeface="Roboto Mono"/>
+                <a:latin typeface="Courier New" panose="02070309020205020404" pitchFamily="49" charset="0"/>
                 <a:cs typeface="Courier New" panose="02070309020205020404" pitchFamily="49" charset="0"/>
               </a:rPr>
               <a:t>// {</a:t>
             </a:r>
             <a:r>
-              <a:rPr lang="es-ES" sz="2000" dirty="0" err="1">
+              <a:rPr lang="es-ES" sz="2000" b="1" dirty="0" err="1">
                 <a:solidFill>
                   <a:srgbClr val="0000FF"/>
                 </a:solidFill>
                 <a:highlight>
                   <a:srgbClr val="FFFF00"/>
                 </a:highlight>
-                <a:latin typeface="Roboto Mono"/>
+                <a:latin typeface="Courier New" panose="02070309020205020404" pitchFamily="49" charset="0"/>
                 <a:cs typeface="Courier New" panose="02070309020205020404" pitchFamily="49" charset="0"/>
               </a:rPr>
               <a:t>Assertion</a:t>
             </a:r>
             <a:r>
-              <a:rPr lang="es-ES" sz="2000" dirty="0">
+              <a:rPr lang="es-ES" sz="2000" b="1" dirty="0">
                 <a:solidFill>
                   <a:srgbClr val="0000FF"/>
                 </a:solidFill>
                 <a:highlight>
                   <a:srgbClr val="FFFF00"/>
                 </a:highlight>
-                <a:latin typeface="Roboto Mono"/>
+                <a:latin typeface="Courier New" panose="02070309020205020404" pitchFamily="49" charset="0"/>
                 <a:cs typeface="Courier New" panose="02070309020205020404" pitchFamily="49" charset="0"/>
               </a:rPr>
               <a:t> </a:t>
             </a:r>
             <a:r>
-              <a:rPr lang="es-ES" sz="2000" dirty="0" err="1">
+              <a:rPr lang="es-ES" sz="2000" b="1" dirty="0" err="1">
                 <a:solidFill>
                   <a:srgbClr val="0000FF"/>
                 </a:solidFill>
                 <a:highlight>
                   <a:srgbClr val="FFFF00"/>
                 </a:highlight>
-                <a:latin typeface="Roboto Mono"/>
+                <a:latin typeface="Courier New" panose="02070309020205020404" pitchFamily="49" charset="0"/>
                 <a:cs typeface="Courier New" panose="02070309020205020404" pitchFamily="49" charset="0"/>
               </a:rPr>
               <a:t>that</a:t>
             </a:r>
             <a:r>
-              <a:rPr lang="es-ES" sz="2000" dirty="0">
+              <a:rPr lang="es-ES" sz="2000" b="1" dirty="0">
                 <a:solidFill>
                   <a:srgbClr val="0000FF"/>
                 </a:solidFill>
                 <a:highlight>
                   <a:srgbClr val="FFFF00"/>
                 </a:highlight>
-                <a:latin typeface="Roboto Mono"/>
+                <a:latin typeface="Courier New" panose="02070309020205020404" pitchFamily="49" charset="0"/>
                 <a:cs typeface="Courier New" panose="02070309020205020404" pitchFamily="49" charset="0"/>
               </a:rPr>
               <a:t> </a:t>
             </a:r>
             <a:r>
-              <a:rPr lang="es-ES" sz="2000" dirty="0" err="1">
+              <a:rPr lang="es-ES" sz="2000" b="1" dirty="0" err="1">
                 <a:solidFill>
                   <a:srgbClr val="0000FF"/>
                 </a:solidFill>
                 <a:highlight>
                   <a:srgbClr val="FFFF00"/>
                 </a:highlight>
-                <a:latin typeface="Roboto Mono"/>
+                <a:latin typeface="Courier New" panose="02070309020205020404" pitchFamily="49" charset="0"/>
                 <a:cs typeface="Courier New" panose="02070309020205020404" pitchFamily="49" charset="0"/>
               </a:rPr>
               <a:t>must</a:t>
             </a:r>
             <a:r>
-              <a:rPr lang="es-ES" sz="2000" dirty="0">
+              <a:rPr lang="es-ES" sz="2000" b="1" dirty="0">
                 <a:solidFill>
                   <a:srgbClr val="0000FF"/>
                 </a:solidFill>
                 <a:highlight>
                   <a:srgbClr val="FFFF00"/>
                 </a:highlight>
-                <a:latin typeface="Roboto Mono"/>
+                <a:latin typeface="Courier New" panose="02070309020205020404" pitchFamily="49" charset="0"/>
                 <a:cs typeface="Courier New" panose="02070309020205020404" pitchFamily="49" charset="0"/>
               </a:rPr>
               <a:t> be true after Step 3}</a:t>
@@ -9644,7 +9959,7 @@
         <p:spPr>
           <a:xfrm>
             <a:off x="1039914" y="2976254"/>
-            <a:ext cx="3756490" cy="2862322"/>
+            <a:ext cx="4896130" cy="2862322"/>
           </a:xfrm>
           <a:prstGeom prst="rect">
             <a:avLst/>
@@ -9688,32 +10003,35 @@
               </a:tabLst>
             </a:pPr>
             <a:r>
-              <a:rPr lang="es-ES" sz="2000" i="0" dirty="0" err="1">
+              <a:rPr lang="es-ES" sz="2000" b="1" i="0" dirty="0" err="1">
                 <a:solidFill>
                   <a:srgbClr val="0000FF"/>
                 </a:solidFill>
                 <a:effectLst/>
-                <a:latin typeface="Roboto Mono"/>
+                <a:latin typeface="Courier New" panose="02070309020205020404" pitchFamily="49" charset="0"/>
+                <a:cs typeface="Courier New" panose="02070309020205020404" pitchFamily="49" charset="0"/>
               </a:rPr>
               <a:t>if</a:t>
             </a:r>
             <a:r>
-              <a:rPr lang="es-ES" sz="2000" i="0" dirty="0">
+              <a:rPr lang="es-ES" sz="2000" b="1" i="0" dirty="0">
                 <a:solidFill>
                   <a:srgbClr val="0000FF"/>
                 </a:solidFill>
                 <a:effectLst/>
-                <a:latin typeface="Roboto Mono"/>
+                <a:latin typeface="Courier New" panose="02070309020205020404" pitchFamily="49" charset="0"/>
+                <a:cs typeface="Courier New" panose="02070309020205020404" pitchFamily="49" charset="0"/>
               </a:rPr>
               <a:t> </a:t>
             </a:r>
             <a:r>
-              <a:rPr lang="es-ES" sz="2000" i="0" dirty="0">
+              <a:rPr lang="es-ES" sz="2000" b="1" i="0" dirty="0">
                 <a:solidFill>
                   <a:schemeClr val="tx1"/>
                 </a:solidFill>
                 <a:effectLst/>
-                <a:latin typeface="Roboto Mono"/>
+                <a:latin typeface="Courier New" panose="02070309020205020404" pitchFamily="49" charset="0"/>
+                <a:cs typeface="Courier New" panose="02070309020205020404" pitchFamily="49" charset="0"/>
               </a:rPr>
               <a:t>(…) { </a:t>
             </a:r>
@@ -9729,16 +10047,17 @@
               </a:tabLst>
             </a:pPr>
             <a:r>
-              <a:rPr lang="es-ES" sz="2000" dirty="0">
+              <a:rPr lang="es-ES" sz="2000" b="1" dirty="0">
                 <a:solidFill>
                   <a:schemeClr val="tx1"/>
                 </a:solidFill>
-                <a:latin typeface="Roboto Mono"/>
+                <a:latin typeface="Courier New" panose="02070309020205020404" pitchFamily="49" charset="0"/>
+                <a:cs typeface="Courier New" panose="02070309020205020404" pitchFamily="49" charset="0"/>
               </a:rPr>
               <a:t>    </a:t>
             </a:r>
             <a:r>
-              <a:rPr lang="es-ES" sz="2000" i="0" dirty="0">
+              <a:rPr lang="es-ES" sz="2000" b="1" i="0" dirty="0">
                 <a:solidFill>
                   <a:schemeClr val="tx1"/>
                 </a:solidFill>
@@ -9746,7 +10065,8 @@
                 <a:highlight>
                   <a:srgbClr val="FFFF00"/>
                 </a:highlight>
-                <a:latin typeface="Roboto Mono"/>
+                <a:latin typeface="Courier New" panose="02070309020205020404" pitchFamily="49" charset="0"/>
+                <a:cs typeface="Courier New" panose="02070309020205020404" pitchFamily="49" charset="0"/>
               </a:rPr>
               <a:t>// { x &gt; y } </a:t>
             </a:r>
@@ -9762,21 +10082,23 @@
               </a:tabLst>
             </a:pPr>
             <a:r>
-              <a:rPr lang="es-ES" sz="2000" dirty="0">
+              <a:rPr lang="es-ES" sz="2000" b="1" dirty="0">
                 <a:solidFill>
                   <a:schemeClr val="tx1"/>
                 </a:solidFill>
-                <a:latin typeface="Roboto Mono"/>
+                <a:latin typeface="Courier New" panose="02070309020205020404" pitchFamily="49" charset="0"/>
+                <a:cs typeface="Courier New" panose="02070309020205020404" pitchFamily="49" charset="0"/>
               </a:rPr>
               <a:t>    </a:t>
             </a:r>
             <a:r>
-              <a:rPr lang="es-ES" sz="2000" i="0" dirty="0">
+              <a:rPr lang="es-ES" sz="2000" b="1" i="0" dirty="0">
                 <a:solidFill>
                   <a:schemeClr val="tx1"/>
                 </a:solidFill>
                 <a:effectLst/>
-                <a:latin typeface="Roboto Mono"/>
+                <a:latin typeface="Courier New" panose="02070309020205020404" pitchFamily="49" charset="0"/>
+                <a:cs typeface="Courier New" panose="02070309020205020404" pitchFamily="49" charset="0"/>
               </a:rPr>
               <a:t>… </a:t>
             </a:r>
@@ -9792,76 +10114,82 @@
               </a:tabLst>
             </a:pPr>
             <a:r>
-              <a:rPr lang="es-ES" sz="2000" dirty="0">
+              <a:rPr lang="es-ES" sz="2000" b="1" dirty="0">
                 <a:solidFill>
                   <a:schemeClr val="tx1"/>
                 </a:solidFill>
-                <a:latin typeface="Roboto Mono"/>
+                <a:latin typeface="Courier New" panose="02070309020205020404" pitchFamily="49" charset="0"/>
+                <a:cs typeface="Courier New" panose="02070309020205020404" pitchFamily="49" charset="0"/>
               </a:rPr>
               <a:t>    </a:t>
             </a:r>
             <a:r>
-              <a:rPr lang="es-ES" sz="2000" dirty="0">
+              <a:rPr lang="es-ES" sz="2000" b="1" dirty="0">
                 <a:solidFill>
                   <a:schemeClr val="tx1"/>
                 </a:solidFill>
                 <a:highlight>
                   <a:srgbClr val="FFFF00"/>
                 </a:highlight>
-                <a:latin typeface="Roboto Mono"/>
+                <a:latin typeface="Courier New" panose="02070309020205020404" pitchFamily="49" charset="0"/>
+                <a:cs typeface="Courier New" panose="02070309020205020404" pitchFamily="49" charset="0"/>
               </a:rPr>
               <a:t>//  {</a:t>
             </a:r>
             <a:r>
-              <a:rPr lang="es-ES" sz="2000" dirty="0" err="1">
+              <a:rPr lang="es-ES" sz="2000" b="1" dirty="0" err="1">
                 <a:solidFill>
                   <a:schemeClr val="tx1"/>
                 </a:solidFill>
                 <a:highlight>
                   <a:srgbClr val="FFFF00"/>
                 </a:highlight>
-                <a:latin typeface="Roboto Mono"/>
+                <a:latin typeface="Courier New" panose="02070309020205020404" pitchFamily="49" charset="0"/>
+                <a:cs typeface="Courier New" panose="02070309020205020404" pitchFamily="49" charset="0"/>
               </a:rPr>
               <a:t>max</a:t>
             </a:r>
             <a:r>
-              <a:rPr lang="es-ES" sz="2000" dirty="0">
+              <a:rPr lang="es-ES" sz="2000" b="1" dirty="0">
                 <a:solidFill>
                   <a:schemeClr val="tx1"/>
                 </a:solidFill>
                 <a:highlight>
                   <a:srgbClr val="FFFF00"/>
                 </a:highlight>
-                <a:latin typeface="Roboto Mono"/>
+                <a:latin typeface="Courier New" panose="02070309020205020404" pitchFamily="49" charset="0"/>
+                <a:cs typeface="Courier New" panose="02070309020205020404" pitchFamily="49" charset="0"/>
               </a:rPr>
               <a:t> == x &amp;&amp; </a:t>
             </a:r>
             <a:r>
-              <a:rPr lang="es-ES" sz="2000" dirty="0" err="1">
+              <a:rPr lang="es-ES" sz="2000" b="1" dirty="0" err="1">
                 <a:solidFill>
                   <a:schemeClr val="tx1"/>
                 </a:solidFill>
                 <a:highlight>
                   <a:srgbClr val="FFFF00"/>
                 </a:highlight>
-                <a:latin typeface="Roboto Mono"/>
+                <a:latin typeface="Courier New" panose="02070309020205020404" pitchFamily="49" charset="0"/>
+                <a:cs typeface="Courier New" panose="02070309020205020404" pitchFamily="49" charset="0"/>
               </a:rPr>
               <a:t>max</a:t>
             </a:r>
             <a:r>
-              <a:rPr lang="es-ES" sz="2000" dirty="0">
+              <a:rPr lang="es-ES" sz="2000" b="1" dirty="0">
                 <a:solidFill>
                   <a:schemeClr val="tx1"/>
                 </a:solidFill>
                 <a:highlight>
                   <a:srgbClr val="FFFF00"/>
                 </a:highlight>
-                <a:latin typeface="Roboto Mono"/>
+                <a:latin typeface="Courier New" panose="02070309020205020404" pitchFamily="49" charset="0"/>
+                <a:cs typeface="Courier New" panose="02070309020205020404" pitchFamily="49" charset="0"/>
               </a:rPr>
               <a:t> &gt; y</a:t>
             </a:r>
             <a:r>
-              <a:rPr lang="es-ES" sz="2000" i="0" dirty="0">
+              <a:rPr lang="es-ES" sz="2000" b="1" i="0" dirty="0">
                 <a:solidFill>
                   <a:schemeClr val="tx1"/>
                 </a:solidFill>
@@ -9869,7 +10197,8 @@
                 <a:highlight>
                   <a:srgbClr val="FFFF00"/>
                 </a:highlight>
-                <a:latin typeface="Roboto Mono"/>
+                <a:latin typeface="Courier New" panose="02070309020205020404" pitchFamily="49" charset="0"/>
+                <a:cs typeface="Courier New" panose="02070309020205020404" pitchFamily="49" charset="0"/>
               </a:rPr>
               <a:t>} </a:t>
             </a:r>
@@ -9885,32 +10214,35 @@
               </a:tabLst>
             </a:pPr>
             <a:r>
-              <a:rPr lang="es-ES" sz="2000" i="0" dirty="0" err="1">
+              <a:rPr lang="es-ES" sz="2000" b="1" i="0" dirty="0" err="1">
                 <a:solidFill>
                   <a:srgbClr val="0000FF"/>
                 </a:solidFill>
                 <a:effectLst/>
-                <a:latin typeface="Roboto Mono"/>
+                <a:latin typeface="Courier New" panose="02070309020205020404" pitchFamily="49" charset="0"/>
+                <a:cs typeface="Courier New" panose="02070309020205020404" pitchFamily="49" charset="0"/>
               </a:rPr>
               <a:t>else</a:t>
             </a:r>
             <a:r>
-              <a:rPr lang="es-ES" sz="2000" i="0" dirty="0">
+              <a:rPr lang="es-ES" sz="2000" b="1" i="0" dirty="0">
                 <a:solidFill>
                   <a:srgbClr val="0000FF"/>
                 </a:solidFill>
                 <a:effectLst/>
-                <a:latin typeface="Roboto Mono"/>
+                <a:latin typeface="Courier New" panose="02070309020205020404" pitchFamily="49" charset="0"/>
+                <a:cs typeface="Courier New" panose="02070309020205020404" pitchFamily="49" charset="0"/>
               </a:rPr>
               <a:t> </a:t>
             </a:r>
             <a:r>
-              <a:rPr lang="es-ES" sz="2000" i="0" dirty="0">
+              <a:rPr lang="es-ES" sz="2000" b="1" i="0" dirty="0">
                 <a:solidFill>
                   <a:schemeClr val="tx1"/>
                 </a:solidFill>
                 <a:effectLst/>
-                <a:latin typeface="Roboto Mono"/>
+                <a:latin typeface="Courier New" panose="02070309020205020404" pitchFamily="49" charset="0"/>
+                <a:cs typeface="Courier New" panose="02070309020205020404" pitchFamily="49" charset="0"/>
               </a:rPr>
               <a:t>{ </a:t>
             </a:r>
@@ -9926,16 +10258,17 @@
               </a:tabLst>
             </a:pPr>
             <a:r>
-              <a:rPr lang="es-ES" sz="2000" dirty="0">
+              <a:rPr lang="es-ES" sz="2000" b="1" dirty="0">
                 <a:solidFill>
                   <a:schemeClr val="tx1"/>
                 </a:solidFill>
-                <a:latin typeface="Roboto Mono"/>
+                <a:latin typeface="Courier New" panose="02070309020205020404" pitchFamily="49" charset="0"/>
+                <a:cs typeface="Courier New" panose="02070309020205020404" pitchFamily="49" charset="0"/>
               </a:rPr>
               <a:t>    </a:t>
             </a:r>
             <a:r>
-              <a:rPr lang="es-ES" sz="2000" i="0" dirty="0">
+              <a:rPr lang="es-ES" sz="2000" b="1" i="0" dirty="0">
                 <a:solidFill>
                   <a:schemeClr val="tx1"/>
                 </a:solidFill>
@@ -9943,7 +10276,8 @@
                 <a:highlight>
                   <a:srgbClr val="FFFF00"/>
                 </a:highlight>
-                <a:latin typeface="Roboto Mono"/>
+                <a:latin typeface="Courier New" panose="02070309020205020404" pitchFamily="49" charset="0"/>
+                <a:cs typeface="Courier New" panose="02070309020205020404" pitchFamily="49" charset="0"/>
               </a:rPr>
               <a:t>// { x &lt;= y } </a:t>
             </a:r>
@@ -9959,11 +10293,12 @@
               </a:tabLst>
             </a:pPr>
             <a:r>
-              <a:rPr lang="es-ES" sz="2000" dirty="0">
+              <a:rPr lang="es-ES" sz="2000" b="1" dirty="0">
                 <a:solidFill>
                   <a:schemeClr val="tx1"/>
                 </a:solidFill>
-                <a:latin typeface="Roboto Mono"/>
+                <a:latin typeface="Courier New" panose="02070309020205020404" pitchFamily="49" charset="0"/>
+                <a:cs typeface="Courier New" panose="02070309020205020404" pitchFamily="49" charset="0"/>
               </a:rPr>
               <a:t>    …</a:t>
             </a:r>
@@ -9979,38 +10314,41 @@
               </a:tabLst>
             </a:pPr>
             <a:r>
-              <a:rPr lang="es-ES" sz="2000" dirty="0">
+              <a:rPr lang="es-ES" sz="2000" b="1" dirty="0">
                 <a:solidFill>
                   <a:schemeClr val="tx1"/>
                 </a:solidFill>
-                <a:latin typeface="Roboto Mono"/>
+                <a:latin typeface="Courier New" panose="02070309020205020404" pitchFamily="49" charset="0"/>
+                <a:cs typeface="Courier New" panose="02070309020205020404" pitchFamily="49" charset="0"/>
               </a:rPr>
               <a:t>    </a:t>
             </a:r>
             <a:r>
-              <a:rPr lang="es-ES" sz="2000" dirty="0">
+              <a:rPr lang="es-ES" sz="2000" b="1" dirty="0">
                 <a:solidFill>
                   <a:schemeClr val="tx1"/>
                 </a:solidFill>
                 <a:highlight>
                   <a:srgbClr val="FFFF00"/>
                 </a:highlight>
-                <a:latin typeface="Roboto Mono"/>
+                <a:latin typeface="Courier New" panose="02070309020205020404" pitchFamily="49" charset="0"/>
+                <a:cs typeface="Courier New" panose="02070309020205020404" pitchFamily="49" charset="0"/>
               </a:rPr>
               <a:t>//  {</a:t>
             </a:r>
             <a:r>
-              <a:rPr lang="en-US" sz="2000" b="0" i="0" dirty="0">
+              <a:rPr lang="en-US" sz="2000" b="1" i="0" dirty="0">
                 <a:effectLst/>
                 <a:highlight>
                   <a:srgbClr val="FFFF00"/>
                 </a:highlight>
-                <a:latin typeface="Roboto Mono"/>
+                <a:latin typeface="Courier New" panose="02070309020205020404" pitchFamily="49" charset="0"/>
+                <a:cs typeface="Courier New" panose="02070309020205020404" pitchFamily="49" charset="0"/>
               </a:rPr>
               <a:t>max &gt;= x &amp;&amp; max == y</a:t>
             </a:r>
             <a:r>
-              <a:rPr lang="es-ES" sz="2000" i="0" dirty="0">
+              <a:rPr lang="es-ES" sz="2000" b="1" i="0" dirty="0">
                 <a:solidFill>
                   <a:schemeClr val="tx1"/>
                 </a:solidFill>
@@ -10018,7 +10356,8 @@
                 <a:highlight>
                   <a:srgbClr val="FFFF00"/>
                 </a:highlight>
-                <a:latin typeface="Roboto Mono"/>
+                <a:latin typeface="Courier New" panose="02070309020205020404" pitchFamily="49" charset="0"/>
+                <a:cs typeface="Courier New" panose="02070309020205020404" pitchFamily="49" charset="0"/>
               </a:rPr>
               <a:t>} </a:t>
             </a:r>
@@ -10034,23 +10373,24 @@
               </a:tabLst>
             </a:pPr>
             <a:r>
-              <a:rPr lang="es-ES" sz="2000" i="0" dirty="0">
+              <a:rPr lang="es-ES" sz="2000" b="1" i="0" dirty="0">
                 <a:solidFill>
                   <a:schemeClr val="tx1"/>
                 </a:solidFill>
                 <a:effectLst/>
-                <a:latin typeface="Roboto Mono"/>
+                <a:latin typeface="Courier New" panose="02070309020205020404" pitchFamily="49" charset="0"/>
+                <a:cs typeface="Courier New" panose="02070309020205020404" pitchFamily="49" charset="0"/>
               </a:rPr>
               <a:t>}</a:t>
             </a:r>
-            <a:endParaRPr lang="es-ES" sz="2000" dirty="0">
+            <a:endParaRPr lang="es-ES" sz="2000" b="1" dirty="0">
               <a:solidFill>
                 <a:schemeClr val="tx1"/>
               </a:solidFill>
               <a:highlight>
                 <a:srgbClr val="FFFF00"/>
               </a:highlight>
-              <a:latin typeface="Roboto Mono"/>
+              <a:latin typeface="Courier New" panose="02070309020205020404" pitchFamily="49" charset="0"/>
               <a:cs typeface="Courier New" panose="02070309020205020404" pitchFamily="49" charset="0"/>
             </a:endParaRPr>
           </a:p>
@@ -10072,7 +10412,7 @@
         </p:nvGrpSpPr>
         <p:grpSpPr bwMode="auto">
           <a:xfrm>
-            <a:off x="5094276" y="3358933"/>
+            <a:off x="6289328" y="3358933"/>
             <a:ext cx="2411413" cy="1537336"/>
             <a:chOff x="6445623" y="3191438"/>
             <a:chExt cx="2411506" cy="1537425"/>
@@ -10745,15 +11085,7 @@
             </a:pPr>
             <a:r>
               <a:rPr lang="en-US" dirty="0"/>
-              <a:t>Important</a:t>
-            </a:r>
-            <a:r>
-              <a:rPr lang="en-US"/>
-              <a:t>: Write assertions </a:t>
-            </a:r>
-            <a:r>
-              <a:rPr lang="en-US" dirty="0"/>
-              <a:t>based on your </a:t>
+              <a:t>Important: Write assertions based on your </a:t>
             </a:r>
             <a:r>
               <a:rPr lang="en-US" dirty="0">
@@ -11123,8 +11455,8 @@
         </p:nvSpPr>
         <p:spPr>
           <a:xfrm>
-            <a:off x="1039914" y="2976254"/>
-            <a:ext cx="3756490" cy="2862322"/>
+            <a:off x="1039913" y="2976254"/>
+            <a:ext cx="4892671" cy="2862322"/>
           </a:xfrm>
           <a:prstGeom prst="rect">
             <a:avLst/>
@@ -11168,54 +11500,37 @@
               </a:tabLst>
             </a:pPr>
             <a:r>
-              <a:rPr lang="es-ES" sz="2000" i="0" dirty="0" err="1">
+              <a:rPr lang="es-ES" sz="2000" b="1" i="0" dirty="0" err="1">
                 <a:solidFill>
                   <a:srgbClr val="0000FF"/>
                 </a:solidFill>
                 <a:effectLst/>
-                <a:latin typeface="Roboto Mono"/>
+                <a:latin typeface="Courier New" panose="02070309020205020404" pitchFamily="49" charset="0"/>
+                <a:cs typeface="Courier New" panose="02070309020205020404" pitchFamily="49" charset="0"/>
               </a:rPr>
               <a:t>if</a:t>
             </a:r>
             <a:r>
-              <a:rPr lang="es-ES" sz="2000" i="0" dirty="0">
+              <a:rPr lang="es-ES" sz="2000" b="1" i="0" dirty="0">
                 <a:solidFill>
                   <a:srgbClr val="0000FF"/>
                 </a:solidFill>
                 <a:effectLst/>
-                <a:latin typeface="Roboto Mono"/>
+                <a:latin typeface="Courier New" panose="02070309020205020404" pitchFamily="49" charset="0"/>
+                <a:cs typeface="Courier New" panose="02070309020205020404" pitchFamily="49" charset="0"/>
               </a:rPr>
               <a:t> </a:t>
             </a:r>
             <a:r>
-              <a:rPr lang="es-ES" sz="2000" i="0" dirty="0">
+              <a:rPr lang="es-ES" sz="2000" b="1" i="0" dirty="0">
                 <a:solidFill>
                   <a:schemeClr val="tx1"/>
                 </a:solidFill>
                 <a:effectLst/>
-                <a:latin typeface="Roboto Mono"/>
-              </a:rPr>
-              <a:t>(</a:t>
-            </a:r>
-            <a:r>
-              <a:rPr lang="es-ES" sz="2000" b="1" i="0" dirty="0">
-                <a:solidFill>
-                  <a:schemeClr val="tx1"/>
-                </a:solidFill>
-                <a:effectLst/>
-                <a:latin typeface="Roboto Mono"/>
-              </a:rPr>
-              <a:t>x &gt; y</a:t>
-            </a:r>
-            <a:r>
-              <a:rPr lang="es-ES" sz="2000" i="0" dirty="0">
-                <a:solidFill>
-                  <a:schemeClr val="tx1"/>
-                </a:solidFill>
-                <a:effectLst/>
-                <a:latin typeface="Roboto Mono"/>
-              </a:rPr>
-              <a:t>) { </a:t>
+                <a:latin typeface="Courier New" panose="02070309020205020404" pitchFamily="49" charset="0"/>
+                <a:cs typeface="Courier New" panose="02070309020205020404" pitchFamily="49" charset="0"/>
+              </a:rPr>
+              <a:t>(x &gt; y) { </a:t>
             </a:r>
           </a:p>
           <a:p>
@@ -11229,16 +11544,17 @@
               </a:tabLst>
             </a:pPr>
             <a:r>
-              <a:rPr lang="es-ES" sz="2000" dirty="0">
+              <a:rPr lang="es-ES" sz="2000" b="1" dirty="0">
                 <a:solidFill>
                   <a:schemeClr val="tx1"/>
                 </a:solidFill>
-                <a:latin typeface="Roboto Mono"/>
+                <a:latin typeface="Courier New" panose="02070309020205020404" pitchFamily="49" charset="0"/>
+                <a:cs typeface="Courier New" panose="02070309020205020404" pitchFamily="49" charset="0"/>
               </a:rPr>
               <a:t>    </a:t>
             </a:r>
             <a:r>
-              <a:rPr lang="es-ES" sz="2000" i="0" dirty="0">
+              <a:rPr lang="es-ES" sz="2000" b="1" i="0" dirty="0">
                 <a:solidFill>
                   <a:schemeClr val="tx1"/>
                 </a:solidFill>
@@ -11246,7 +11562,8 @@
                 <a:highlight>
                   <a:srgbClr val="FFFF00"/>
                 </a:highlight>
-                <a:latin typeface="Roboto Mono"/>
+                <a:latin typeface="Courier New" panose="02070309020205020404" pitchFamily="49" charset="0"/>
+                <a:cs typeface="Courier New" panose="02070309020205020404" pitchFamily="49" charset="0"/>
               </a:rPr>
               <a:t>// { x &gt; y } </a:t>
             </a:r>
@@ -11262,11 +11579,12 @@
               </a:tabLst>
             </a:pPr>
             <a:r>
-              <a:rPr lang="es-ES" sz="2000" dirty="0">
+              <a:rPr lang="es-ES" sz="2000" b="1" dirty="0">
                 <a:solidFill>
                   <a:schemeClr val="tx1"/>
                 </a:solidFill>
-                <a:latin typeface="Roboto Mono"/>
+                <a:latin typeface="Courier New" panose="02070309020205020404" pitchFamily="49" charset="0"/>
+                <a:cs typeface="Courier New" panose="02070309020205020404" pitchFamily="49" charset="0"/>
               </a:rPr>
               <a:t>    </a:t>
             </a:r>
@@ -11276,7 +11594,8 @@
                   <a:schemeClr val="tx1"/>
                 </a:solidFill>
                 <a:effectLst/>
-                <a:latin typeface="Roboto Mono"/>
+                <a:latin typeface="Courier New" panose="02070309020205020404" pitchFamily="49" charset="0"/>
+                <a:cs typeface="Courier New" panose="02070309020205020404" pitchFamily="49" charset="0"/>
               </a:rPr>
               <a:t>max</a:t>
             </a:r>
@@ -11286,7 +11605,8 @@
                   <a:schemeClr val="tx1"/>
                 </a:solidFill>
                 <a:effectLst/>
-                <a:latin typeface="Roboto Mono"/>
+                <a:latin typeface="Courier New" panose="02070309020205020404" pitchFamily="49" charset="0"/>
+                <a:cs typeface="Courier New" panose="02070309020205020404" pitchFamily="49" charset="0"/>
               </a:rPr>
               <a:t> = x;</a:t>
             </a:r>
@@ -11302,76 +11622,82 @@
               </a:tabLst>
             </a:pPr>
             <a:r>
-              <a:rPr lang="es-ES" sz="2000" dirty="0">
+              <a:rPr lang="es-ES" sz="2000" b="1" dirty="0">
                 <a:solidFill>
                   <a:schemeClr val="tx1"/>
                 </a:solidFill>
-                <a:latin typeface="Roboto Mono"/>
+                <a:latin typeface="Courier New" panose="02070309020205020404" pitchFamily="49" charset="0"/>
+                <a:cs typeface="Courier New" panose="02070309020205020404" pitchFamily="49" charset="0"/>
               </a:rPr>
               <a:t>    </a:t>
             </a:r>
             <a:r>
-              <a:rPr lang="es-ES" sz="2000" dirty="0">
+              <a:rPr lang="es-ES" sz="2000" b="1" dirty="0">
                 <a:solidFill>
                   <a:schemeClr val="tx1"/>
                 </a:solidFill>
                 <a:highlight>
                   <a:srgbClr val="FFFF00"/>
                 </a:highlight>
-                <a:latin typeface="Roboto Mono"/>
+                <a:latin typeface="Courier New" panose="02070309020205020404" pitchFamily="49" charset="0"/>
+                <a:cs typeface="Courier New" panose="02070309020205020404" pitchFamily="49" charset="0"/>
               </a:rPr>
               <a:t>//  {</a:t>
             </a:r>
             <a:r>
-              <a:rPr lang="es-ES" sz="2000" dirty="0" err="1">
+              <a:rPr lang="es-ES" sz="2000" b="1" dirty="0" err="1">
                 <a:solidFill>
                   <a:schemeClr val="tx1"/>
                 </a:solidFill>
                 <a:highlight>
                   <a:srgbClr val="FFFF00"/>
                 </a:highlight>
-                <a:latin typeface="Roboto Mono"/>
+                <a:latin typeface="Courier New" panose="02070309020205020404" pitchFamily="49" charset="0"/>
+                <a:cs typeface="Courier New" panose="02070309020205020404" pitchFamily="49" charset="0"/>
               </a:rPr>
               <a:t>max</a:t>
             </a:r>
             <a:r>
-              <a:rPr lang="es-ES" sz="2000" dirty="0">
+              <a:rPr lang="es-ES" sz="2000" b="1" dirty="0">
                 <a:solidFill>
                   <a:schemeClr val="tx1"/>
                 </a:solidFill>
                 <a:highlight>
                   <a:srgbClr val="FFFF00"/>
                 </a:highlight>
-                <a:latin typeface="Roboto Mono"/>
+                <a:latin typeface="Courier New" panose="02070309020205020404" pitchFamily="49" charset="0"/>
+                <a:cs typeface="Courier New" panose="02070309020205020404" pitchFamily="49" charset="0"/>
               </a:rPr>
               <a:t> == x &amp;&amp; </a:t>
             </a:r>
             <a:r>
-              <a:rPr lang="es-ES" sz="2000" dirty="0" err="1">
+              <a:rPr lang="es-ES" sz="2000" b="1" dirty="0" err="1">
                 <a:solidFill>
                   <a:schemeClr val="tx1"/>
                 </a:solidFill>
                 <a:highlight>
                   <a:srgbClr val="FFFF00"/>
                 </a:highlight>
-                <a:latin typeface="Roboto Mono"/>
+                <a:latin typeface="Courier New" panose="02070309020205020404" pitchFamily="49" charset="0"/>
+                <a:cs typeface="Courier New" panose="02070309020205020404" pitchFamily="49" charset="0"/>
               </a:rPr>
               <a:t>max</a:t>
             </a:r>
             <a:r>
-              <a:rPr lang="es-ES" sz="2000" dirty="0">
+              <a:rPr lang="es-ES" sz="2000" b="1" dirty="0">
                 <a:solidFill>
                   <a:schemeClr val="tx1"/>
                 </a:solidFill>
                 <a:highlight>
                   <a:srgbClr val="FFFF00"/>
                 </a:highlight>
-                <a:latin typeface="Roboto Mono"/>
+                <a:latin typeface="Courier New" panose="02070309020205020404" pitchFamily="49" charset="0"/>
+                <a:cs typeface="Courier New" panose="02070309020205020404" pitchFamily="49" charset="0"/>
               </a:rPr>
               <a:t> &gt; y</a:t>
             </a:r>
             <a:r>
-              <a:rPr lang="es-ES" sz="2000" i="0" dirty="0">
+              <a:rPr lang="es-ES" sz="2000" b="1" i="0" dirty="0">
                 <a:solidFill>
                   <a:schemeClr val="tx1"/>
                 </a:solidFill>
@@ -11379,7 +11705,8 @@
                 <a:highlight>
                   <a:srgbClr val="FFFF00"/>
                 </a:highlight>
-                <a:latin typeface="Roboto Mono"/>
+                <a:latin typeface="Courier New" panose="02070309020205020404" pitchFamily="49" charset="0"/>
+                <a:cs typeface="Courier New" panose="02070309020205020404" pitchFamily="49" charset="0"/>
               </a:rPr>
               <a:t>} </a:t>
             </a:r>
@@ -11395,32 +11722,35 @@
               </a:tabLst>
             </a:pPr>
             <a:r>
-              <a:rPr lang="es-ES" sz="2000" i="0" dirty="0" err="1">
+              <a:rPr lang="es-ES" sz="2000" b="1" i="0" dirty="0" err="1">
                 <a:solidFill>
                   <a:srgbClr val="0000FF"/>
                 </a:solidFill>
                 <a:effectLst/>
-                <a:latin typeface="Roboto Mono"/>
+                <a:latin typeface="Courier New" panose="02070309020205020404" pitchFamily="49" charset="0"/>
+                <a:cs typeface="Courier New" panose="02070309020205020404" pitchFamily="49" charset="0"/>
               </a:rPr>
               <a:t>else</a:t>
             </a:r>
             <a:r>
-              <a:rPr lang="es-ES" sz="2000" i="0" dirty="0">
+              <a:rPr lang="es-ES" sz="2000" b="1" i="0" dirty="0">
                 <a:solidFill>
                   <a:srgbClr val="0000FF"/>
                 </a:solidFill>
                 <a:effectLst/>
-                <a:latin typeface="Roboto Mono"/>
+                <a:latin typeface="Courier New" panose="02070309020205020404" pitchFamily="49" charset="0"/>
+                <a:cs typeface="Courier New" panose="02070309020205020404" pitchFamily="49" charset="0"/>
               </a:rPr>
               <a:t> </a:t>
             </a:r>
             <a:r>
-              <a:rPr lang="es-ES" sz="2000" i="0" dirty="0">
+              <a:rPr lang="es-ES" sz="2000" b="1" i="0" dirty="0">
                 <a:solidFill>
                   <a:schemeClr val="tx1"/>
                 </a:solidFill>
                 <a:effectLst/>
-                <a:latin typeface="Roboto Mono"/>
+                <a:latin typeface="Courier New" panose="02070309020205020404" pitchFamily="49" charset="0"/>
+                <a:cs typeface="Courier New" panose="02070309020205020404" pitchFamily="49" charset="0"/>
               </a:rPr>
               <a:t>{ </a:t>
             </a:r>
@@ -11436,16 +11766,17 @@
               </a:tabLst>
             </a:pPr>
             <a:r>
-              <a:rPr lang="es-ES" sz="2000" dirty="0">
+              <a:rPr lang="es-ES" sz="2000" b="1" dirty="0">
                 <a:solidFill>
                   <a:schemeClr val="tx1"/>
                 </a:solidFill>
-                <a:latin typeface="Roboto Mono"/>
+                <a:latin typeface="Courier New" panose="02070309020205020404" pitchFamily="49" charset="0"/>
+                <a:cs typeface="Courier New" panose="02070309020205020404" pitchFamily="49" charset="0"/>
               </a:rPr>
               <a:t>    </a:t>
             </a:r>
             <a:r>
-              <a:rPr lang="es-ES" sz="2000" i="0" dirty="0">
+              <a:rPr lang="es-ES" sz="2000" b="1" i="0" dirty="0">
                 <a:solidFill>
                   <a:schemeClr val="tx1"/>
                 </a:solidFill>
@@ -11453,7 +11784,8 @@
                 <a:highlight>
                   <a:srgbClr val="FFFF00"/>
                 </a:highlight>
-                <a:latin typeface="Roboto Mono"/>
+                <a:latin typeface="Courier New" panose="02070309020205020404" pitchFamily="49" charset="0"/>
+                <a:cs typeface="Courier New" panose="02070309020205020404" pitchFamily="49" charset="0"/>
               </a:rPr>
               <a:t>// { x &lt;= y } </a:t>
             </a:r>
@@ -11469,11 +11801,12 @@
               </a:tabLst>
             </a:pPr>
             <a:r>
-              <a:rPr lang="es-ES" sz="2000" dirty="0">
+              <a:rPr lang="es-ES" sz="2000" b="1" dirty="0">
                 <a:solidFill>
                   <a:schemeClr val="tx1"/>
                 </a:solidFill>
-                <a:latin typeface="Roboto Mono"/>
+                <a:latin typeface="Courier New" panose="02070309020205020404" pitchFamily="49" charset="0"/>
+                <a:cs typeface="Courier New" panose="02070309020205020404" pitchFamily="49" charset="0"/>
               </a:rPr>
               <a:t>    </a:t>
             </a:r>
@@ -11482,7 +11815,8 @@
                 <a:solidFill>
                   <a:schemeClr val="tx1"/>
                 </a:solidFill>
-                <a:latin typeface="Roboto Mono"/>
+                <a:latin typeface="Courier New" panose="02070309020205020404" pitchFamily="49" charset="0"/>
+                <a:cs typeface="Courier New" panose="02070309020205020404" pitchFamily="49" charset="0"/>
               </a:rPr>
               <a:t>max</a:t>
             </a:r>
@@ -11491,7 +11825,8 @@
                 <a:solidFill>
                   <a:schemeClr val="tx1"/>
                 </a:solidFill>
-                <a:latin typeface="Roboto Mono"/>
+                <a:latin typeface="Courier New" panose="02070309020205020404" pitchFamily="49" charset="0"/>
+                <a:cs typeface="Courier New" panose="02070309020205020404" pitchFamily="49" charset="0"/>
               </a:rPr>
               <a:t> = y;</a:t>
             </a:r>
@@ -11507,38 +11842,41 @@
               </a:tabLst>
             </a:pPr>
             <a:r>
-              <a:rPr lang="es-ES" sz="2000" dirty="0">
+              <a:rPr lang="es-ES" sz="2000" b="1" dirty="0">
                 <a:solidFill>
                   <a:schemeClr val="tx1"/>
                 </a:solidFill>
-                <a:latin typeface="Roboto Mono"/>
+                <a:latin typeface="Courier New" panose="02070309020205020404" pitchFamily="49" charset="0"/>
+                <a:cs typeface="Courier New" panose="02070309020205020404" pitchFamily="49" charset="0"/>
               </a:rPr>
               <a:t>    </a:t>
             </a:r>
             <a:r>
-              <a:rPr lang="es-ES" sz="2000" dirty="0">
+              <a:rPr lang="es-ES" sz="2000" b="1" dirty="0">
                 <a:solidFill>
                   <a:schemeClr val="tx1"/>
                 </a:solidFill>
                 <a:highlight>
                   <a:srgbClr val="FFFF00"/>
                 </a:highlight>
-                <a:latin typeface="Roboto Mono"/>
+                <a:latin typeface="Courier New" panose="02070309020205020404" pitchFamily="49" charset="0"/>
+                <a:cs typeface="Courier New" panose="02070309020205020404" pitchFamily="49" charset="0"/>
               </a:rPr>
               <a:t>//  {</a:t>
             </a:r>
             <a:r>
-              <a:rPr lang="en-US" sz="2000" b="0" i="0" dirty="0">
+              <a:rPr lang="en-US" sz="2000" b="1" i="0" dirty="0">
                 <a:effectLst/>
                 <a:highlight>
                   <a:srgbClr val="FFFF00"/>
                 </a:highlight>
-                <a:latin typeface="Roboto Mono"/>
+                <a:latin typeface="Courier New" panose="02070309020205020404" pitchFamily="49" charset="0"/>
+                <a:cs typeface="Courier New" panose="02070309020205020404" pitchFamily="49" charset="0"/>
               </a:rPr>
               <a:t>max &gt;= x &amp;&amp; max == y</a:t>
             </a:r>
             <a:r>
-              <a:rPr lang="es-ES" sz="2000" i="0" dirty="0">
+              <a:rPr lang="es-ES" sz="2000" b="1" i="0" dirty="0">
                 <a:solidFill>
                   <a:schemeClr val="tx1"/>
                 </a:solidFill>
@@ -11546,7 +11884,8 @@
                 <a:highlight>
                   <a:srgbClr val="FFFF00"/>
                 </a:highlight>
-                <a:latin typeface="Roboto Mono"/>
+                <a:latin typeface="Courier New" panose="02070309020205020404" pitchFamily="49" charset="0"/>
+                <a:cs typeface="Courier New" panose="02070309020205020404" pitchFamily="49" charset="0"/>
               </a:rPr>
               <a:t>} </a:t>
             </a:r>
@@ -11562,34 +11901,67 @@
               </a:tabLst>
             </a:pPr>
             <a:r>
-              <a:rPr lang="es-ES" sz="2000" i="0" dirty="0">
+              <a:rPr lang="es-ES" sz="2000" b="1" i="0" dirty="0">
                 <a:solidFill>
                   <a:schemeClr val="tx1"/>
                 </a:solidFill>
                 <a:effectLst/>
-                <a:latin typeface="Roboto Mono"/>
+                <a:latin typeface="Courier New" panose="02070309020205020404" pitchFamily="49" charset="0"/>
+                <a:cs typeface="Courier New" panose="02070309020205020404" pitchFamily="49" charset="0"/>
               </a:rPr>
               <a:t>}</a:t>
             </a:r>
-            <a:endParaRPr lang="es-ES" sz="2000" dirty="0">
+            <a:endParaRPr lang="es-ES" sz="2000" b="1" dirty="0">
               <a:solidFill>
                 <a:schemeClr val="tx1"/>
               </a:solidFill>
               <a:highlight>
                 <a:srgbClr val="FFFF00"/>
               </a:highlight>
-              <a:latin typeface="Roboto Mono"/>
+              <a:latin typeface="Courier New" panose="02070309020205020404" pitchFamily="49" charset="0"/>
               <a:cs typeface="Courier New" panose="02070309020205020404" pitchFamily="49" charset="0"/>
             </a:endParaRPr>
+          </a:p>
+        </p:txBody>
+      </p:sp>
+      <p:sp>
+        <p:nvSpPr>
+          <p:cNvPr id="2" name="Footer Placeholder 1">
+            <a:extLst>
+              <a:ext uri="{FF2B5EF4-FFF2-40B4-BE49-F238E27FC236}">
+                <a16:creationId xmlns:a16="http://schemas.microsoft.com/office/drawing/2014/main" id="{49A9D89E-ED7E-83C7-66A1-FBF6E2E746D0}"/>
+              </a:ext>
+            </a:extLst>
+          </p:cNvPr>
+          <p:cNvSpPr>
+            <a:spLocks noGrp="1"/>
+          </p:cNvSpPr>
+          <p:nvPr>
+            <p:ph type="ftr" sz="quarter" idx="11"/>
+          </p:nvPr>
+        </p:nvSpPr>
+        <p:spPr/>
+        <p:txBody>
+          <a:bodyPr/>
+          <a:lstStyle/>
+          <a:p>
+            <a:pPr algn="l">
+              <a:defRPr/>
+            </a:pPr>
+            <a:r>
+              <a:rPr lang="en-US"/>
+              <a:t>CS1010 (AY2023/24 Semester 2)</a:t>
+            </a:r>
+            <a:endParaRPr lang="en-US" dirty="0"/>
           </a:p>
         </p:txBody>
       </p:sp>
       <p:grpSp>
         <p:nvGrpSpPr>
-          <p:cNvPr id="9" name="Group 53">
+          <p:cNvPr id="3" name="Group 53">
             <a:extLst>
               <a:ext uri="{FF2B5EF4-FFF2-40B4-BE49-F238E27FC236}">
-                <a16:creationId xmlns:a16="http://schemas.microsoft.com/office/drawing/2014/main" id="{37416115-CEE5-4CFE-A531-47FECA5A527E}"/>
+                <a16:creationId xmlns:a16="http://schemas.microsoft.com/office/drawing/2014/main" id="{A4B1E7ED-444E-65CA-6B47-63587A78E8D9}"/>
               </a:ext>
             </a:extLst>
           </p:cNvPr>
@@ -11600,7 +11972,7 @@
         </p:nvGrpSpPr>
         <p:grpSpPr bwMode="auto">
           <a:xfrm>
-            <a:off x="5094276" y="3358933"/>
+            <a:off x="6289328" y="3358933"/>
             <a:ext cx="2411413" cy="1537336"/>
             <a:chOff x="6445623" y="3191438"/>
             <a:chExt cx="2411506" cy="1537425"/>
@@ -11608,10 +11980,10 @@
         </p:grpSpPr>
         <p:sp>
           <p:nvSpPr>
-            <p:cNvPr id="10" name="Flowchart: Decision 9">
+            <p:cNvPr id="4" name="Flowchart: Decision 3">
               <a:extLst>
                 <a:ext uri="{FF2B5EF4-FFF2-40B4-BE49-F238E27FC236}">
-                  <a16:creationId xmlns:a16="http://schemas.microsoft.com/office/drawing/2014/main" id="{08836371-BB3C-4342-87C0-77D5EBA6FCC3}"/>
+                  <a16:creationId xmlns:a16="http://schemas.microsoft.com/office/drawing/2014/main" id="{0FD6E0D9-2FDF-9730-A146-B535D3B4F770}"/>
                 </a:ext>
               </a:extLst>
             </p:cNvPr>
@@ -11653,16 +12025,16 @@
         </p:sp>
         <p:cxnSp>
           <p:nvCxnSpPr>
-            <p:cNvPr id="11" name="Straight Arrow Connector 33">
+            <p:cNvPr id="5" name="Straight Arrow Connector 33">
               <a:extLst>
                 <a:ext uri="{FF2B5EF4-FFF2-40B4-BE49-F238E27FC236}">
-                  <a16:creationId xmlns:a16="http://schemas.microsoft.com/office/drawing/2014/main" id="{5375CFEE-B18D-4AF5-A183-92F82A04AB95}"/>
+                  <a16:creationId xmlns:a16="http://schemas.microsoft.com/office/drawing/2014/main" id="{CA210FE5-4997-BC8F-A07A-D125CF7FA7FF}"/>
                 </a:ext>
               </a:extLst>
             </p:cNvPr>
             <p:cNvCxnSpPr>
               <a:cxnSpLocks noChangeShapeType="1"/>
-              <a:endCxn id="10" idx="0"/>
+              <a:endCxn id="4" idx="0"/>
             </p:cNvCxnSpPr>
             <p:nvPr/>
           </p:nvCxnSpPr>
@@ -11687,10 +12059,10 @@
         </p:cxnSp>
         <p:cxnSp>
           <p:nvCxnSpPr>
-            <p:cNvPr id="15" name="Straight Connector 35">
+            <p:cNvPr id="6" name="Straight Connector 35">
               <a:extLst>
                 <a:ext uri="{FF2B5EF4-FFF2-40B4-BE49-F238E27FC236}">
-                  <a16:creationId xmlns:a16="http://schemas.microsoft.com/office/drawing/2014/main" id="{73C893A1-DD8E-4E4E-83CC-5A89F4ACC0A6}"/>
+                  <a16:creationId xmlns:a16="http://schemas.microsoft.com/office/drawing/2014/main" id="{44874913-F340-F2C6-C44D-485CD2C7496C}"/>
                 </a:ext>
               </a:extLst>
             </p:cNvPr>
@@ -11720,10 +12092,10 @@
         </p:cxnSp>
         <p:cxnSp>
           <p:nvCxnSpPr>
-            <p:cNvPr id="17" name="Straight Arrow Connector 36">
+            <p:cNvPr id="8" name="Straight Arrow Connector 36">
               <a:extLst>
                 <a:ext uri="{FF2B5EF4-FFF2-40B4-BE49-F238E27FC236}">
-                  <a16:creationId xmlns:a16="http://schemas.microsoft.com/office/drawing/2014/main" id="{963E351B-1BA8-47E3-A16D-9B4E0D46A460}"/>
+                  <a16:creationId xmlns:a16="http://schemas.microsoft.com/office/drawing/2014/main" id="{5A307302-CA6E-0A8C-688C-6EC3BBDD5230}"/>
                 </a:ext>
               </a:extLst>
             </p:cNvPr>
@@ -11753,10 +12125,10 @@
         </p:cxnSp>
         <p:sp>
           <p:nvSpPr>
-            <p:cNvPr id="18" name="Flowchart: Process 17">
+            <p:cNvPr id="13" name="Flowchart: Process 12">
               <a:extLst>
                 <a:ext uri="{FF2B5EF4-FFF2-40B4-BE49-F238E27FC236}">
-                  <a16:creationId xmlns:a16="http://schemas.microsoft.com/office/drawing/2014/main" id="{BF92340A-905F-46DA-BF56-C9F60F2D7CAA}"/>
+                  <a16:creationId xmlns:a16="http://schemas.microsoft.com/office/drawing/2014/main" id="{F667D191-013D-D86B-6E05-C44FE3842916}"/>
                 </a:ext>
               </a:extLst>
             </p:cNvPr>
@@ -11798,10 +12170,10 @@
         </p:sp>
         <p:sp>
           <p:nvSpPr>
-            <p:cNvPr id="19" name="TextBox 38">
+            <p:cNvPr id="14" name="TextBox 38">
               <a:extLst>
                 <a:ext uri="{FF2B5EF4-FFF2-40B4-BE49-F238E27FC236}">
-                  <a16:creationId xmlns:a16="http://schemas.microsoft.com/office/drawing/2014/main" id="{03D1309A-A066-4C86-8100-4C6992A034EA}"/>
+                  <a16:creationId xmlns:a16="http://schemas.microsoft.com/office/drawing/2014/main" id="{197CE863-6484-DCE1-1425-53AC38FB38D0}"/>
                 </a:ext>
               </a:extLst>
             </p:cNvPr>
@@ -11843,10 +12215,10 @@
         </p:sp>
         <p:sp>
           <p:nvSpPr>
-            <p:cNvPr id="20" name="TextBox 39">
+            <p:cNvPr id="29" name="TextBox 39">
               <a:extLst>
                 <a:ext uri="{FF2B5EF4-FFF2-40B4-BE49-F238E27FC236}">
-                  <a16:creationId xmlns:a16="http://schemas.microsoft.com/office/drawing/2014/main" id="{2CC8D76A-5525-4CC9-B0A0-BFD852C2A19F}"/>
+                  <a16:creationId xmlns:a16="http://schemas.microsoft.com/office/drawing/2014/main" id="{93DDCECD-81F2-FDB9-39B0-AC37CD03B326}"/>
                 </a:ext>
               </a:extLst>
             </p:cNvPr>
@@ -11888,10 +12260,10 @@
         </p:sp>
         <p:cxnSp>
           <p:nvCxnSpPr>
-            <p:cNvPr id="21" name="Straight Arrow Connector 40">
+            <p:cNvPr id="31" name="Straight Arrow Connector 40">
               <a:extLst>
                 <a:ext uri="{FF2B5EF4-FFF2-40B4-BE49-F238E27FC236}">
-                  <a16:creationId xmlns:a16="http://schemas.microsoft.com/office/drawing/2014/main" id="{AE62E0C0-4E46-4362-A2F9-068AFC7EF8B7}"/>
+                  <a16:creationId xmlns:a16="http://schemas.microsoft.com/office/drawing/2014/main" id="{9CF90E05-ACCB-6526-436B-BE894E291816}"/>
                 </a:ext>
               </a:extLst>
             </p:cNvPr>
@@ -11921,10 +12293,10 @@
         </p:cxnSp>
         <p:cxnSp>
           <p:nvCxnSpPr>
-            <p:cNvPr id="22" name="Straight Connector 41">
+            <p:cNvPr id="32" name="Straight Connector 41">
               <a:extLst>
                 <a:ext uri="{FF2B5EF4-FFF2-40B4-BE49-F238E27FC236}">
-                  <a16:creationId xmlns:a16="http://schemas.microsoft.com/office/drawing/2014/main" id="{FD4006F1-C86A-4664-97FF-A2B28453F4E6}"/>
+                  <a16:creationId xmlns:a16="http://schemas.microsoft.com/office/drawing/2014/main" id="{04173FB7-CD45-7AA3-8DAE-1102C37FAD37}"/>
                 </a:ext>
               </a:extLst>
             </p:cNvPr>
@@ -11954,10 +12326,10 @@
         </p:cxnSp>
         <p:cxnSp>
           <p:nvCxnSpPr>
-            <p:cNvPr id="23" name="Straight Arrow Connector 42">
+            <p:cNvPr id="33" name="Straight Arrow Connector 42">
               <a:extLst>
                 <a:ext uri="{FF2B5EF4-FFF2-40B4-BE49-F238E27FC236}">
-                  <a16:creationId xmlns:a16="http://schemas.microsoft.com/office/drawing/2014/main" id="{429DDC02-367B-4646-8F3E-B1B1574788CB}"/>
+                  <a16:creationId xmlns:a16="http://schemas.microsoft.com/office/drawing/2014/main" id="{3B75B619-FEAC-0EFE-D57F-1C4820A48AB1}"/>
                 </a:ext>
               </a:extLst>
             </p:cNvPr>
@@ -11987,10 +12359,10 @@
         </p:cxnSp>
         <p:cxnSp>
           <p:nvCxnSpPr>
-            <p:cNvPr id="24" name="Straight Connector 43">
+            <p:cNvPr id="34" name="Straight Connector 43">
               <a:extLst>
                 <a:ext uri="{FF2B5EF4-FFF2-40B4-BE49-F238E27FC236}">
-                  <a16:creationId xmlns:a16="http://schemas.microsoft.com/office/drawing/2014/main" id="{573B404F-ADCF-4858-B7CA-9FB5E9D857AB}"/>
+                  <a16:creationId xmlns:a16="http://schemas.microsoft.com/office/drawing/2014/main" id="{D9BF39EB-0508-0EF1-5264-0B104F2206B1}"/>
                 </a:ext>
               </a:extLst>
             </p:cNvPr>
@@ -12020,10 +12392,10 @@
         </p:cxnSp>
         <p:cxnSp>
           <p:nvCxnSpPr>
-            <p:cNvPr id="25" name="Straight Arrow Connector 47">
+            <p:cNvPr id="35" name="Straight Arrow Connector 47">
               <a:extLst>
                 <a:ext uri="{FF2B5EF4-FFF2-40B4-BE49-F238E27FC236}">
-                  <a16:creationId xmlns:a16="http://schemas.microsoft.com/office/drawing/2014/main" id="{22621656-7BC3-43FB-A4C5-515AB8EA21F9}"/>
+                  <a16:creationId xmlns:a16="http://schemas.microsoft.com/office/drawing/2014/main" id="{4BAFF74A-81C2-3855-FE34-0D6B09231ED8}"/>
                 </a:ext>
               </a:extLst>
             </p:cNvPr>
@@ -12053,10 +12425,10 @@
         </p:cxnSp>
         <p:sp>
           <p:nvSpPr>
-            <p:cNvPr id="26" name="Flowchart: Process 25">
+            <p:cNvPr id="36" name="Flowchart: Process 35">
               <a:extLst>
                 <a:ext uri="{FF2B5EF4-FFF2-40B4-BE49-F238E27FC236}">
-                  <a16:creationId xmlns:a16="http://schemas.microsoft.com/office/drawing/2014/main" id="{D5940203-D294-4EA2-BA43-5CB057899C1D}"/>
+                  <a16:creationId xmlns:a16="http://schemas.microsoft.com/office/drawing/2014/main" id="{72F53E7B-BFA5-512C-3E6E-052EE1527BD0}"/>
                 </a:ext>
               </a:extLst>
             </p:cNvPr>
@@ -12098,10 +12470,10 @@
         </p:sp>
         <p:cxnSp>
           <p:nvCxnSpPr>
-            <p:cNvPr id="27" name="Straight Connector 49">
+            <p:cNvPr id="37" name="Straight Connector 49">
               <a:extLst>
                 <a:ext uri="{FF2B5EF4-FFF2-40B4-BE49-F238E27FC236}">
-                  <a16:creationId xmlns:a16="http://schemas.microsoft.com/office/drawing/2014/main" id="{F529B452-3C49-4035-BB64-802C22695584}"/>
+                  <a16:creationId xmlns:a16="http://schemas.microsoft.com/office/drawing/2014/main" id="{611A1807-EE83-CD39-F8D4-E0953D65283D}"/>
                 </a:ext>
               </a:extLst>
             </p:cNvPr>
@@ -12131,10 +12503,10 @@
         </p:cxnSp>
         <p:cxnSp>
           <p:nvCxnSpPr>
-            <p:cNvPr id="28" name="Straight Arrow Connector 51">
+            <p:cNvPr id="38" name="Straight Arrow Connector 51">
               <a:extLst>
                 <a:ext uri="{FF2B5EF4-FFF2-40B4-BE49-F238E27FC236}">
-                  <a16:creationId xmlns:a16="http://schemas.microsoft.com/office/drawing/2014/main" id="{7E3D8EF6-8416-445A-B46B-1F3F04F0AE42}"/>
+                  <a16:creationId xmlns:a16="http://schemas.microsoft.com/office/drawing/2014/main" id="{565A25FF-B4F3-2E7F-88DA-E8F294D02FB2}"/>
                 </a:ext>
               </a:extLst>
             </p:cNvPr>
@@ -12163,38 +12535,6 @@
           </p:spPr>
         </p:cxnSp>
       </p:grpSp>
-      <p:sp>
-        <p:nvSpPr>
-          <p:cNvPr id="2" name="Footer Placeholder 1">
-            <a:extLst>
-              <a:ext uri="{FF2B5EF4-FFF2-40B4-BE49-F238E27FC236}">
-                <a16:creationId xmlns:a16="http://schemas.microsoft.com/office/drawing/2014/main" id="{49A9D89E-ED7E-83C7-66A1-FBF6E2E746D0}"/>
-              </a:ext>
-            </a:extLst>
-          </p:cNvPr>
-          <p:cNvSpPr>
-            <a:spLocks noGrp="1"/>
-          </p:cNvSpPr>
-          <p:nvPr>
-            <p:ph type="ftr" sz="quarter" idx="11"/>
-          </p:nvPr>
-        </p:nvSpPr>
-        <p:spPr/>
-        <p:txBody>
-          <a:bodyPr/>
-          <a:lstStyle/>
-          <a:p>
-            <a:pPr algn="l">
-              <a:defRPr/>
-            </a:pPr>
-            <a:r>
-              <a:rPr lang="en-US"/>
-              <a:t>CS1010 (AY2023/24 Semester 2)</a:t>
-            </a:r>
-            <a:endParaRPr lang="en-US" dirty="0"/>
-          </a:p>
-        </p:txBody>
-      </p:sp>
     </p:spTree>
     <p:extLst>
       <p:ext uri="{BB962C8B-B14F-4D97-AF65-F5344CB8AC3E}">
@@ -12560,7 +12900,7 @@
         <p:spPr>
           <a:xfrm>
             <a:off x="815509" y="1726566"/>
-            <a:ext cx="4427823" cy="4708981"/>
+            <a:ext cx="6804491" cy="4247317"/>
           </a:xfrm>
           <a:prstGeom prst="rect">
             <a:avLst/>
@@ -12604,32 +12944,35 @@
               </a:tabLst>
             </a:pPr>
             <a:r>
-              <a:rPr lang="es-ES" sz="2000" i="0" dirty="0">
+              <a:rPr lang="es-ES" b="1" i="0" dirty="0">
                 <a:solidFill>
                   <a:schemeClr val="tx1"/>
                 </a:solidFill>
                 <a:effectLst/>
-                <a:latin typeface="Roboto Mono"/>
+                <a:latin typeface="Courier New" panose="02070309020205020404" pitchFamily="49" charset="0"/>
+                <a:cs typeface="Courier New" panose="02070309020205020404" pitchFamily="49" charset="0"/>
               </a:rPr>
               <a:t> </a:t>
             </a:r>
             <a:r>
-              <a:rPr lang="es-ES" sz="2000" i="0" dirty="0" err="1">
+              <a:rPr lang="es-ES" b="1" i="0" dirty="0" err="1">
                 <a:solidFill>
                   <a:srgbClr val="0000FF"/>
                 </a:solidFill>
                 <a:effectLst/>
-                <a:latin typeface="Roboto Mono"/>
+                <a:latin typeface="Courier New" panose="02070309020205020404" pitchFamily="49" charset="0"/>
+                <a:cs typeface="Courier New" panose="02070309020205020404" pitchFamily="49" charset="0"/>
               </a:rPr>
               <a:t>if</a:t>
             </a:r>
             <a:r>
-              <a:rPr lang="es-ES" sz="2000" i="0" dirty="0">
+              <a:rPr lang="es-ES" b="1" i="0" dirty="0">
                 <a:solidFill>
                   <a:schemeClr val="tx1"/>
                 </a:solidFill>
                 <a:effectLst/>
-                <a:latin typeface="Roboto Mono"/>
+                <a:latin typeface="Courier New" panose="02070309020205020404" pitchFamily="49" charset="0"/>
+                <a:cs typeface="Courier New" panose="02070309020205020404" pitchFamily="49" charset="0"/>
               </a:rPr>
               <a:t> (…) {</a:t>
             </a:r>
@@ -12645,17 +12988,18 @@
               </a:tabLst>
             </a:pPr>
             <a:r>
-              <a:rPr lang="en-US" sz="2000" b="0" i="0" dirty="0">
+              <a:rPr lang="en-US" b="1" i="0" dirty="0">
                 <a:solidFill>
                   <a:srgbClr val="36464E"/>
                 </a:solidFill>
                 <a:effectLst/>
-                <a:latin typeface="Roboto Mono"/>
-              </a:rPr>
-              <a:t>     </a:t>
-            </a:r>
-            <a:r>
-              <a:rPr lang="en-US" sz="2000" b="0" i="0" dirty="0">
+                <a:latin typeface="Courier New" panose="02070309020205020404" pitchFamily="49" charset="0"/>
+                <a:cs typeface="Courier New" panose="02070309020205020404" pitchFamily="49" charset="0"/>
+              </a:rPr>
+              <a:t>    </a:t>
+            </a:r>
+            <a:r>
+              <a:rPr lang="en-US" b="1" i="0" dirty="0">
                 <a:solidFill>
                   <a:srgbClr val="36464E"/>
                 </a:solidFill>
@@ -12663,11 +13007,12 @@
                 <a:highlight>
                   <a:srgbClr val="FFFF00"/>
                 </a:highlight>
-                <a:latin typeface="Roboto Mono"/>
+                <a:latin typeface="Courier New" panose="02070309020205020404" pitchFamily="49" charset="0"/>
+                <a:cs typeface="Courier New" panose="02070309020205020404" pitchFamily="49" charset="0"/>
               </a:rPr>
               <a:t>// { score &gt;= 8 }</a:t>
             </a:r>
-            <a:endParaRPr lang="es-ES" sz="2000" i="0" dirty="0">
+            <a:endParaRPr lang="es-ES" b="1" i="0" dirty="0">
               <a:solidFill>
                 <a:schemeClr val="tx1"/>
               </a:solidFill>
@@ -12675,7 +13020,8 @@
               <a:highlight>
                 <a:srgbClr val="FFFF00"/>
               </a:highlight>
-              <a:latin typeface="Roboto Mono"/>
+              <a:latin typeface="Courier New" panose="02070309020205020404" pitchFamily="49" charset="0"/>
+              <a:cs typeface="Courier New" panose="02070309020205020404" pitchFamily="49" charset="0"/>
             </a:endParaRPr>
           </a:p>
           <a:p>
@@ -12689,32 +13035,35 @@
               </a:tabLst>
             </a:pPr>
             <a:r>
-              <a:rPr lang="es-ES" sz="2000" i="0" dirty="0">
+              <a:rPr lang="es-ES" b="1" i="0" dirty="0">
                 <a:solidFill>
                   <a:schemeClr val="tx1"/>
                 </a:solidFill>
                 <a:effectLst/>
-                <a:latin typeface="Roboto Mono"/>
+                <a:latin typeface="Courier New" panose="02070309020205020404" pitchFamily="49" charset="0"/>
+                <a:cs typeface="Courier New" panose="02070309020205020404" pitchFamily="49" charset="0"/>
               </a:rPr>
               <a:t>} </a:t>
             </a:r>
             <a:r>
-              <a:rPr lang="es-ES" sz="2000" i="0" dirty="0" err="1">
+              <a:rPr lang="es-ES" b="1" i="0" dirty="0" err="1">
                 <a:solidFill>
                   <a:srgbClr val="0000FF"/>
                 </a:solidFill>
                 <a:effectLst/>
-                <a:latin typeface="Roboto Mono"/>
+                <a:latin typeface="Courier New" panose="02070309020205020404" pitchFamily="49" charset="0"/>
+                <a:cs typeface="Courier New" panose="02070309020205020404" pitchFamily="49" charset="0"/>
               </a:rPr>
               <a:t>else</a:t>
             </a:r>
             <a:r>
-              <a:rPr lang="es-ES" sz="2000" i="0" dirty="0">
+              <a:rPr lang="es-ES" b="1" i="0" dirty="0">
                 <a:solidFill>
                   <a:schemeClr val="tx1"/>
                 </a:solidFill>
                 <a:effectLst/>
-                <a:latin typeface="Roboto Mono"/>
+                <a:latin typeface="Courier New" panose="02070309020205020404" pitchFamily="49" charset="0"/>
+                <a:cs typeface="Courier New" panose="02070309020205020404" pitchFamily="49" charset="0"/>
               </a:rPr>
               <a:t> {</a:t>
             </a:r>
@@ -12730,16 +13079,17 @@
               </a:tabLst>
             </a:pPr>
             <a:r>
-              <a:rPr lang="es-ES" sz="2000" dirty="0">
+              <a:rPr lang="es-ES" b="1" dirty="0">
                 <a:solidFill>
                   <a:schemeClr val="tx1"/>
                 </a:solidFill>
-                <a:latin typeface="Roboto Mono"/>
+                <a:latin typeface="Courier New" panose="02070309020205020404" pitchFamily="49" charset="0"/>
+                <a:cs typeface="Courier New" panose="02070309020205020404" pitchFamily="49" charset="0"/>
               </a:rPr>
               <a:t>    </a:t>
             </a:r>
             <a:r>
-              <a:rPr lang="en-US" sz="2000" b="0" i="0" dirty="0">
+              <a:rPr lang="en-US" b="1" i="0" dirty="0">
                 <a:solidFill>
                   <a:srgbClr val="36464E"/>
                 </a:solidFill>
@@ -12747,11 +13097,12 @@
                 <a:highlight>
                   <a:srgbClr val="FFFF00"/>
                 </a:highlight>
-                <a:latin typeface="Roboto Mono"/>
+                <a:latin typeface="Courier New" panose="02070309020205020404" pitchFamily="49" charset="0"/>
+                <a:cs typeface="Courier New" panose="02070309020205020404" pitchFamily="49" charset="0"/>
               </a:rPr>
               <a:t>// { score &lt; 8 }</a:t>
             </a:r>
-            <a:endParaRPr lang="es-ES" sz="2000" i="0" dirty="0">
+            <a:endParaRPr lang="es-ES" b="1" i="0" dirty="0">
               <a:solidFill>
                 <a:schemeClr val="tx1"/>
               </a:solidFill>
@@ -12759,7 +13110,8 @@
               <a:highlight>
                 <a:srgbClr val="FFFF00"/>
               </a:highlight>
-              <a:latin typeface="Roboto Mono"/>
+              <a:latin typeface="Courier New" panose="02070309020205020404" pitchFamily="49" charset="0"/>
+              <a:cs typeface="Courier New" panose="02070309020205020404" pitchFamily="49" charset="0"/>
             </a:endParaRPr>
           </a:p>
           <a:p>
@@ -12773,32 +13125,35 @@
               </a:tabLst>
             </a:pPr>
             <a:r>
-              <a:rPr lang="es-ES" sz="2000" i="0" dirty="0">
+              <a:rPr lang="es-ES" b="1" i="0" dirty="0">
                 <a:solidFill>
                   <a:schemeClr val="tx1"/>
                 </a:solidFill>
                 <a:effectLst/>
-                <a:latin typeface="Roboto Mono"/>
+                <a:latin typeface="Courier New" panose="02070309020205020404" pitchFamily="49" charset="0"/>
+                <a:cs typeface="Courier New" panose="02070309020205020404" pitchFamily="49" charset="0"/>
               </a:rPr>
               <a:t>    </a:t>
             </a:r>
             <a:r>
-              <a:rPr lang="es-ES" sz="2000" i="0" dirty="0" err="1">
+              <a:rPr lang="es-ES" b="1" i="0" dirty="0" err="1">
                 <a:solidFill>
                   <a:srgbClr val="0000FF"/>
                 </a:solidFill>
                 <a:effectLst/>
-                <a:latin typeface="Roboto Mono"/>
+                <a:latin typeface="Courier New" panose="02070309020205020404" pitchFamily="49" charset="0"/>
+                <a:cs typeface="Courier New" panose="02070309020205020404" pitchFamily="49" charset="0"/>
               </a:rPr>
               <a:t>if</a:t>
             </a:r>
             <a:r>
-              <a:rPr lang="es-ES" sz="2000" i="0" dirty="0">
+              <a:rPr lang="es-ES" b="1" i="0" dirty="0">
                 <a:solidFill>
                   <a:schemeClr val="tx1"/>
                 </a:solidFill>
                 <a:effectLst/>
-                <a:latin typeface="Roboto Mono"/>
+                <a:latin typeface="Courier New" panose="02070309020205020404" pitchFamily="49" charset="0"/>
+                <a:cs typeface="Courier New" panose="02070309020205020404" pitchFamily="49" charset="0"/>
               </a:rPr>
               <a:t> (…) {</a:t>
             </a:r>
@@ -12814,37 +13169,40 @@
               </a:tabLst>
             </a:pPr>
             <a:r>
-              <a:rPr lang="es-ES" sz="2000" dirty="0">
+              <a:rPr lang="es-ES" b="1" dirty="0">
                 <a:solidFill>
                   <a:schemeClr val="tx1"/>
                 </a:solidFill>
-                <a:latin typeface="Roboto Mono"/>
+                <a:latin typeface="Courier New" panose="02070309020205020404" pitchFamily="49" charset="0"/>
+                <a:cs typeface="Courier New" panose="02070309020205020404" pitchFamily="49" charset="0"/>
               </a:rPr>
               <a:t> </a:t>
             </a:r>
             <a:r>
-              <a:rPr lang="en-US" sz="2000" dirty="0">
+              <a:rPr lang="en-US" b="1" dirty="0">
                 <a:solidFill>
                   <a:srgbClr val="36464E"/>
                 </a:solidFill>
-                <a:latin typeface="Roboto Mono"/>
-              </a:rPr>
-              <a:t>       </a:t>
-            </a:r>
-            <a:r>
-              <a:rPr lang="en-US" sz="2000" dirty="0">
+                <a:latin typeface="Courier New" panose="02070309020205020404" pitchFamily="49" charset="0"/>
+                <a:cs typeface="Courier New" panose="02070309020205020404" pitchFamily="49" charset="0"/>
+              </a:rPr>
+              <a:t>      </a:t>
+            </a:r>
+            <a:r>
+              <a:rPr lang="en-US" b="1" dirty="0">
                 <a:solidFill>
                   <a:srgbClr val="36464E"/>
                 </a:solidFill>
                 <a:highlight>
                   <a:srgbClr val="FFFF00"/>
                 </a:highlight>
-                <a:latin typeface="Roboto Mono"/>
+                <a:latin typeface="Courier New" panose="02070309020205020404" pitchFamily="49" charset="0"/>
+                <a:cs typeface="Courier New" panose="02070309020205020404" pitchFamily="49" charset="0"/>
               </a:rPr>
               <a:t>// </a:t>
             </a:r>
             <a:r>
-              <a:rPr lang="en-US" sz="2000" b="0" i="0" dirty="0">
+              <a:rPr lang="en-US" b="1" i="0" dirty="0">
                 <a:solidFill>
                   <a:srgbClr val="36464E"/>
                 </a:solidFill>
@@ -12852,16 +13210,18 @@
                 <a:highlight>
                   <a:srgbClr val="FFFF00"/>
                 </a:highlight>
-                <a:latin typeface="Roboto Mono"/>
+                <a:latin typeface="Courier New" panose="02070309020205020404" pitchFamily="49" charset="0"/>
+                <a:cs typeface="Courier New" panose="02070309020205020404" pitchFamily="49" charset="0"/>
               </a:rPr>
               <a:t>{ score &lt; 8 &amp;&amp; score &gt;=5 }</a:t>
             </a:r>
-            <a:endParaRPr lang="es-ES" sz="2000" i="0" dirty="0">
+            <a:endParaRPr lang="es-ES" b="1" i="0" dirty="0">
               <a:solidFill>
                 <a:schemeClr val="tx1"/>
               </a:solidFill>
               <a:effectLst/>
-              <a:latin typeface="Roboto Mono"/>
+              <a:latin typeface="Courier New" panose="02070309020205020404" pitchFamily="49" charset="0"/>
+              <a:cs typeface="Courier New" panose="02070309020205020404" pitchFamily="49" charset="0"/>
             </a:endParaRPr>
           </a:p>
           <a:p>
@@ -12875,32 +13235,35 @@
               </a:tabLst>
             </a:pPr>
             <a:r>
-              <a:rPr lang="es-ES" sz="2000" i="0" dirty="0">
+              <a:rPr lang="es-ES" b="1" i="0" dirty="0">
                 <a:solidFill>
                   <a:schemeClr val="tx1"/>
                 </a:solidFill>
                 <a:effectLst/>
-                <a:latin typeface="Roboto Mono"/>
+                <a:latin typeface="Courier New" panose="02070309020205020404" pitchFamily="49" charset="0"/>
+                <a:cs typeface="Courier New" panose="02070309020205020404" pitchFamily="49" charset="0"/>
               </a:rPr>
               <a:t>    } </a:t>
             </a:r>
             <a:r>
-              <a:rPr lang="es-ES" sz="2000" i="0" dirty="0" err="1">
+              <a:rPr lang="es-ES" b="1" i="0" dirty="0" err="1">
                 <a:solidFill>
                   <a:srgbClr val="0000FF"/>
                 </a:solidFill>
                 <a:effectLst/>
-                <a:latin typeface="Roboto Mono"/>
+                <a:latin typeface="Courier New" panose="02070309020205020404" pitchFamily="49" charset="0"/>
+                <a:cs typeface="Courier New" panose="02070309020205020404" pitchFamily="49" charset="0"/>
               </a:rPr>
               <a:t>else</a:t>
             </a:r>
             <a:r>
-              <a:rPr lang="es-ES" sz="2000" i="0" dirty="0">
+              <a:rPr lang="es-ES" b="1" i="0" dirty="0">
                 <a:solidFill>
                   <a:schemeClr val="tx1"/>
                 </a:solidFill>
                 <a:effectLst/>
-                <a:latin typeface="Roboto Mono"/>
+                <a:latin typeface="Courier New" panose="02070309020205020404" pitchFamily="49" charset="0"/>
+                <a:cs typeface="Courier New" panose="02070309020205020404" pitchFamily="49" charset="0"/>
               </a:rPr>
               <a:t> {</a:t>
             </a:r>
@@ -12916,28 +13279,40 @@
               </a:tabLst>
             </a:pPr>
             <a:r>
-              <a:rPr lang="es-ES" sz="2000" dirty="0">
+              <a:rPr lang="es-ES" b="1" dirty="0">
                 <a:solidFill>
                   <a:schemeClr val="tx1"/>
                 </a:solidFill>
-                <a:latin typeface="Roboto Mono"/>
-              </a:rPr>
-              <a:t>      </a:t>
-            </a:r>
-            <a:r>
-              <a:rPr lang="en-US" sz="2000" dirty="0">
+                <a:latin typeface="Courier New" panose="02070309020205020404" pitchFamily="49" charset="0"/>
+                <a:cs typeface="Courier New" panose="02070309020205020404" pitchFamily="49" charset="0"/>
+              </a:rPr>
+              <a:t>     </a:t>
+            </a:r>
+            <a:r>
+              <a:rPr lang="en-US" b="1" dirty="0">
+                <a:solidFill>
+                  <a:srgbClr val="36464E"/>
+                </a:solidFill>
+                <a:latin typeface="Courier New" panose="02070309020205020404" pitchFamily="49" charset="0"/>
+                <a:cs typeface="Courier New" panose="02070309020205020404" pitchFamily="49" charset="0"/>
+              </a:rPr>
+              <a:t>  </a:t>
+            </a:r>
+            <a:r>
+              <a:rPr lang="en-US" b="1" dirty="0">
                 <a:solidFill>
                   <a:srgbClr val="36464E"/>
                 </a:solidFill>
                 <a:highlight>
                   <a:srgbClr val="FFFF00"/>
                 </a:highlight>
-                <a:latin typeface="Roboto Mono"/>
-              </a:rPr>
-              <a:t>  // </a:t>
-            </a:r>
-            <a:r>
-              <a:rPr lang="en-US" sz="2000" b="0" i="0" dirty="0">
+                <a:latin typeface="Courier New" panose="02070309020205020404" pitchFamily="49" charset="0"/>
+                <a:cs typeface="Courier New" panose="02070309020205020404" pitchFamily="49" charset="0"/>
+              </a:rPr>
+              <a:t>// </a:t>
+            </a:r>
+            <a:r>
+              <a:rPr lang="en-US" b="1" i="0" dirty="0">
                 <a:solidFill>
                   <a:srgbClr val="36464E"/>
                 </a:solidFill>
@@ -12945,16 +13320,18 @@
                 <a:highlight>
                   <a:srgbClr val="FFFF00"/>
                 </a:highlight>
-                <a:latin typeface="Roboto Mono"/>
+                <a:latin typeface="Courier New" panose="02070309020205020404" pitchFamily="49" charset="0"/>
+                <a:cs typeface="Courier New" panose="02070309020205020404" pitchFamily="49" charset="0"/>
               </a:rPr>
               <a:t>{ score &lt; 5 }</a:t>
             </a:r>
-            <a:endParaRPr lang="es-ES" sz="2000" i="0" dirty="0">
+            <a:endParaRPr lang="es-ES" b="1" i="0" dirty="0">
               <a:solidFill>
                 <a:schemeClr val="tx1"/>
               </a:solidFill>
               <a:effectLst/>
-              <a:latin typeface="Roboto Mono"/>
+              <a:latin typeface="Courier New" panose="02070309020205020404" pitchFamily="49" charset="0"/>
+              <a:cs typeface="Courier New" panose="02070309020205020404" pitchFamily="49" charset="0"/>
             </a:endParaRPr>
           </a:p>
           <a:p>
@@ -12968,42 +13345,46 @@
               </a:tabLst>
             </a:pPr>
             <a:r>
-              <a:rPr lang="es-ES" sz="2000" i="0" dirty="0">
+              <a:rPr lang="es-ES" b="1" i="0" dirty="0">
                 <a:solidFill>
                   <a:schemeClr val="tx1"/>
                 </a:solidFill>
                 <a:effectLst/>
-                <a:latin typeface="Roboto Mono"/>
+                <a:latin typeface="Courier New" panose="02070309020205020404" pitchFamily="49" charset="0"/>
+                <a:cs typeface="Courier New" panose="02070309020205020404" pitchFamily="49" charset="0"/>
               </a:rPr>
               <a:t>          </a:t>
             </a:r>
             <a:r>
-              <a:rPr lang="es-ES" sz="2000" i="0" dirty="0" err="1">
+              <a:rPr lang="es-ES" b="1" i="0" dirty="0" err="1">
                 <a:solidFill>
                   <a:srgbClr val="0000FF"/>
                 </a:solidFill>
                 <a:effectLst/>
-                <a:latin typeface="Roboto Mono"/>
+                <a:latin typeface="Courier New" panose="02070309020205020404" pitchFamily="49" charset="0"/>
+                <a:cs typeface="Courier New" panose="02070309020205020404" pitchFamily="49" charset="0"/>
               </a:rPr>
               <a:t>if</a:t>
             </a:r>
             <a:r>
-              <a:rPr lang="es-ES" sz="2000" i="0" dirty="0">
+              <a:rPr lang="es-ES" b="1" i="0" dirty="0">
                 <a:solidFill>
                   <a:srgbClr val="0000FF"/>
                 </a:solidFill>
                 <a:effectLst/>
-                <a:latin typeface="Roboto Mono"/>
+                <a:latin typeface="Courier New" panose="02070309020205020404" pitchFamily="49" charset="0"/>
+                <a:cs typeface="Courier New" panose="02070309020205020404" pitchFamily="49" charset="0"/>
               </a:rPr>
               <a:t> </a:t>
             </a:r>
             <a:r>
-              <a:rPr lang="es-ES" sz="2000" i="0" dirty="0">
+              <a:rPr lang="es-ES" b="1" i="0" dirty="0">
                 <a:solidFill>
                   <a:schemeClr val="tx1"/>
                 </a:solidFill>
                 <a:effectLst/>
-                <a:latin typeface="Roboto Mono"/>
+                <a:latin typeface="Courier New" panose="02070309020205020404" pitchFamily="49" charset="0"/>
+                <a:cs typeface="Courier New" panose="02070309020205020404" pitchFamily="49" charset="0"/>
               </a:rPr>
               <a:t>(…) {</a:t>
             </a:r>
@@ -13019,28 +13400,30 @@
               </a:tabLst>
             </a:pPr>
             <a:r>
-              <a:rPr lang="en-US" sz="2000" dirty="0">
+              <a:rPr lang="en-US" b="1" dirty="0">
                 <a:solidFill>
                   <a:srgbClr val="36464E"/>
                 </a:solidFill>
-                <a:latin typeface="Roboto Mono"/>
-              </a:rPr>
-              <a:t>              </a:t>
-            </a:r>
-            <a:r>
-              <a:rPr lang="en-US" sz="2000" dirty="0">
+                <a:latin typeface="Courier New" panose="02070309020205020404" pitchFamily="49" charset="0"/>
+                <a:cs typeface="Courier New" panose="02070309020205020404" pitchFamily="49" charset="0"/>
+              </a:rPr>
+              <a:t>             </a:t>
+            </a:r>
+            <a:r>
+              <a:rPr lang="en-US" b="1" dirty="0">
                 <a:solidFill>
                   <a:srgbClr val="36464E"/>
                 </a:solidFill>
                 <a:highlight>
                   <a:srgbClr val="FFFF00"/>
                 </a:highlight>
-                <a:latin typeface="Roboto Mono"/>
+                <a:latin typeface="Courier New" panose="02070309020205020404" pitchFamily="49" charset="0"/>
+                <a:cs typeface="Courier New" panose="02070309020205020404" pitchFamily="49" charset="0"/>
               </a:rPr>
               <a:t>// </a:t>
             </a:r>
             <a:r>
-              <a:rPr lang="en-US" sz="2000" b="0" i="0" dirty="0">
+              <a:rPr lang="en-US" b="1" i="0" dirty="0">
                 <a:solidFill>
                   <a:srgbClr val="36464E"/>
                 </a:solidFill>
@@ -13048,11 +13431,12 @@
                 <a:highlight>
                   <a:srgbClr val="FFFF00"/>
                 </a:highlight>
-                <a:latin typeface="Roboto Mono"/>
+                <a:latin typeface="Courier New" panose="02070309020205020404" pitchFamily="49" charset="0"/>
+                <a:cs typeface="Courier New" panose="02070309020205020404" pitchFamily="49" charset="0"/>
               </a:rPr>
               <a:t>{ score &lt; 5 &amp;&amp; score &gt;=3}</a:t>
             </a:r>
-            <a:endParaRPr lang="es-ES" sz="2000" i="0" dirty="0">
+            <a:endParaRPr lang="es-ES" b="1" i="0" dirty="0">
               <a:solidFill>
                 <a:schemeClr val="tx1"/>
               </a:solidFill>
@@ -13060,7 +13444,8 @@
               <a:highlight>
                 <a:srgbClr val="FFFF00"/>
               </a:highlight>
-              <a:latin typeface="Roboto Mono"/>
+              <a:latin typeface="Courier New" panose="02070309020205020404" pitchFamily="49" charset="0"/>
+              <a:cs typeface="Courier New" panose="02070309020205020404" pitchFamily="49" charset="0"/>
             </a:endParaRPr>
           </a:p>
           <a:p>
@@ -13074,42 +13459,46 @@
               </a:tabLst>
             </a:pPr>
             <a:r>
-              <a:rPr lang="es-ES" sz="2000" i="0" dirty="0">
+              <a:rPr lang="es-ES" b="1" i="0" dirty="0">
                 <a:solidFill>
                   <a:schemeClr val="tx1"/>
                 </a:solidFill>
                 <a:effectLst/>
-                <a:latin typeface="Roboto Mono"/>
+                <a:latin typeface="Courier New" panose="02070309020205020404" pitchFamily="49" charset="0"/>
+                <a:cs typeface="Courier New" panose="02070309020205020404" pitchFamily="49" charset="0"/>
               </a:rPr>
               <a:t>        } </a:t>
             </a:r>
             <a:r>
-              <a:rPr lang="es-ES" sz="2000" i="0" dirty="0" err="1">
+              <a:rPr lang="es-ES" b="1" i="0" dirty="0" err="1">
                 <a:solidFill>
                   <a:srgbClr val="0000FF"/>
                 </a:solidFill>
                 <a:effectLst/>
-                <a:latin typeface="Roboto Mono"/>
+                <a:latin typeface="Courier New" panose="02070309020205020404" pitchFamily="49" charset="0"/>
+                <a:cs typeface="Courier New" panose="02070309020205020404" pitchFamily="49" charset="0"/>
               </a:rPr>
               <a:t>else</a:t>
             </a:r>
             <a:r>
-              <a:rPr lang="es-ES" sz="2000" i="0" dirty="0">
+              <a:rPr lang="es-ES" b="1" i="0" dirty="0">
                 <a:solidFill>
                   <a:srgbClr val="0000FF"/>
                 </a:solidFill>
                 <a:effectLst/>
-                <a:latin typeface="Roboto Mono"/>
+                <a:latin typeface="Courier New" panose="02070309020205020404" pitchFamily="49" charset="0"/>
+                <a:cs typeface="Courier New" panose="02070309020205020404" pitchFamily="49" charset="0"/>
               </a:rPr>
               <a:t> </a:t>
             </a:r>
             <a:r>
-              <a:rPr lang="es-ES" sz="2000" i="0" dirty="0">
+              <a:rPr lang="es-ES" b="1" i="0" dirty="0">
                 <a:solidFill>
                   <a:schemeClr val="tx1"/>
                 </a:solidFill>
                 <a:effectLst/>
-                <a:latin typeface="Roboto Mono"/>
+                <a:latin typeface="Courier New" panose="02070309020205020404" pitchFamily="49" charset="0"/>
+                <a:cs typeface="Courier New" panose="02070309020205020404" pitchFamily="49" charset="0"/>
               </a:rPr>
               <a:t>{</a:t>
             </a:r>
@@ -13125,37 +13514,40 @@
               </a:tabLst>
             </a:pPr>
             <a:r>
-              <a:rPr lang="es-ES" sz="2000" dirty="0">
+              <a:rPr lang="es-ES" b="1" dirty="0">
                 <a:solidFill>
                   <a:schemeClr val="tx1"/>
                 </a:solidFill>
-                <a:latin typeface="Roboto Mono"/>
-              </a:rPr>
-              <a:t>              </a:t>
-            </a:r>
-            <a:r>
-              <a:rPr lang="en-US" sz="2000" dirty="0">
+                <a:latin typeface="Courier New" panose="02070309020205020404" pitchFamily="49" charset="0"/>
+                <a:cs typeface="Courier New" panose="02070309020205020404" pitchFamily="49" charset="0"/>
+              </a:rPr>
+              <a:t>            </a:t>
+            </a:r>
+            <a:r>
+              <a:rPr lang="en-US" b="1" dirty="0">
                 <a:solidFill>
                   <a:srgbClr val="36464E"/>
                 </a:solidFill>
-                <a:latin typeface="Roboto Mono"/>
+                <a:latin typeface="Courier New" panose="02070309020205020404" pitchFamily="49" charset="0"/>
+                <a:cs typeface="Courier New" panose="02070309020205020404" pitchFamily="49" charset="0"/>
               </a:rPr>
               <a:t> </a:t>
             </a:r>
             <a:r>
-              <a:rPr lang="en-US" sz="2000" dirty="0">
+              <a:rPr lang="en-US" b="1" dirty="0">
                 <a:solidFill>
                   <a:srgbClr val="36464E"/>
                 </a:solidFill>
                 <a:highlight>
                   <a:srgbClr val="FFFF00"/>
                 </a:highlight>
-                <a:latin typeface="Roboto Mono"/>
+                <a:latin typeface="Courier New" panose="02070309020205020404" pitchFamily="49" charset="0"/>
+                <a:cs typeface="Courier New" panose="02070309020205020404" pitchFamily="49" charset="0"/>
               </a:rPr>
               <a:t>// </a:t>
             </a:r>
             <a:r>
-              <a:rPr lang="en-US" sz="2000" b="0" i="0" dirty="0">
+              <a:rPr lang="en-US" b="1" i="0" dirty="0">
                 <a:solidFill>
                   <a:srgbClr val="36464E"/>
                 </a:solidFill>
@@ -13163,16 +13555,18 @@
                 <a:highlight>
                   <a:srgbClr val="FFFF00"/>
                 </a:highlight>
-                <a:latin typeface="Roboto Mono"/>
+                <a:latin typeface="Courier New" panose="02070309020205020404" pitchFamily="49" charset="0"/>
+                <a:cs typeface="Courier New" panose="02070309020205020404" pitchFamily="49" charset="0"/>
               </a:rPr>
               <a:t>{score &lt; 3}</a:t>
             </a:r>
-            <a:endParaRPr lang="es-ES" sz="2000" i="0" dirty="0">
+            <a:endParaRPr lang="es-ES" b="1" i="0" dirty="0">
               <a:solidFill>
                 <a:schemeClr val="tx1"/>
               </a:solidFill>
               <a:effectLst/>
-              <a:latin typeface="Roboto Mono"/>
+              <a:latin typeface="Courier New" panose="02070309020205020404" pitchFamily="49" charset="0"/>
+              <a:cs typeface="Courier New" panose="02070309020205020404" pitchFamily="49" charset="0"/>
             </a:endParaRPr>
           </a:p>
           <a:p>
@@ -13186,12 +13580,13 @@
               </a:tabLst>
             </a:pPr>
             <a:r>
-              <a:rPr lang="es-ES" sz="2000" i="0" dirty="0">
+              <a:rPr lang="es-ES" b="1" i="0" dirty="0">
                 <a:solidFill>
                   <a:schemeClr val="tx1"/>
                 </a:solidFill>
                 <a:effectLst/>
-                <a:latin typeface="Roboto Mono"/>
+                <a:latin typeface="Courier New" panose="02070309020205020404" pitchFamily="49" charset="0"/>
+                <a:cs typeface="Courier New" panose="02070309020205020404" pitchFamily="49" charset="0"/>
               </a:rPr>
               <a:t>        }</a:t>
             </a:r>
@@ -13207,12 +13602,13 @@
               </a:tabLst>
             </a:pPr>
             <a:r>
-              <a:rPr lang="es-ES" sz="2000" i="0" dirty="0">
+              <a:rPr lang="es-ES" b="1" i="0" dirty="0">
                 <a:solidFill>
                   <a:schemeClr val="tx1"/>
                 </a:solidFill>
                 <a:effectLst/>
-                <a:latin typeface="Roboto Mono"/>
+                <a:latin typeface="Courier New" panose="02070309020205020404" pitchFamily="49" charset="0"/>
+                <a:cs typeface="Courier New" panose="02070309020205020404" pitchFamily="49" charset="0"/>
               </a:rPr>
               <a:t>    }</a:t>
             </a:r>
@@ -13228,12 +13624,13 @@
               </a:tabLst>
             </a:pPr>
             <a:r>
-              <a:rPr lang="es-ES" sz="2000" i="0" dirty="0">
+              <a:rPr lang="es-ES" b="1" i="0" dirty="0">
                 <a:solidFill>
                   <a:schemeClr val="tx1"/>
                 </a:solidFill>
                 <a:effectLst/>
-                <a:latin typeface="Roboto Mono"/>
+                <a:latin typeface="Courier New" panose="02070309020205020404" pitchFamily="49" charset="0"/>
+                <a:cs typeface="Courier New" panose="02070309020205020404" pitchFamily="49" charset="0"/>
               </a:rPr>
               <a:t>}</a:t>
             </a:r>
@@ -13262,7 +13659,7 @@
         </p:blipFill>
         <p:spPr>
           <a:xfrm>
-            <a:off x="4724400" y="1837205"/>
+            <a:off x="4778373" y="4701232"/>
             <a:ext cx="4202736" cy="1938636"/>
           </a:xfrm>
           <a:prstGeom prst="rect">
@@ -13667,7 +14064,7 @@
         <p:spPr>
           <a:xfrm>
             <a:off x="815509" y="1726566"/>
-            <a:ext cx="4427823" cy="4708981"/>
+            <a:ext cx="6988578" cy="4247317"/>
           </a:xfrm>
           <a:prstGeom prst="rect">
             <a:avLst/>
@@ -13711,72 +14108,68 @@
               </a:tabLst>
             </a:pPr>
             <a:r>
-              <a:rPr lang="es-ES" sz="2000" i="0" dirty="0">
+              <a:rPr lang="es-ES" b="1" i="0" dirty="0">
                 <a:solidFill>
                   <a:srgbClr val="0000FF"/>
                 </a:solidFill>
                 <a:effectLst/>
-                <a:latin typeface="Roboto Mono"/>
+                <a:latin typeface="Courier New" panose="02070309020205020404" pitchFamily="49" charset="0"/>
+                <a:cs typeface="Courier New" panose="02070309020205020404" pitchFamily="49" charset="0"/>
               </a:rPr>
               <a:t> </a:t>
             </a:r>
             <a:r>
-              <a:rPr lang="es-ES" sz="2000" i="0" dirty="0" err="1">
+              <a:rPr lang="es-ES" b="1" i="0" dirty="0" err="1">
                 <a:solidFill>
                   <a:srgbClr val="0000FF"/>
                 </a:solidFill>
                 <a:effectLst/>
-                <a:latin typeface="Roboto Mono"/>
+                <a:latin typeface="Courier New" panose="02070309020205020404" pitchFamily="49" charset="0"/>
+                <a:cs typeface="Courier New" panose="02070309020205020404" pitchFamily="49" charset="0"/>
               </a:rPr>
               <a:t>if</a:t>
             </a:r>
             <a:r>
-              <a:rPr lang="es-ES" sz="2000" i="0" dirty="0">
+              <a:rPr lang="es-ES" b="1" i="0" dirty="0">
                 <a:solidFill>
                   <a:srgbClr val="0000FF"/>
                 </a:solidFill>
                 <a:effectLst/>
-                <a:latin typeface="Roboto Mono"/>
+                <a:latin typeface="Courier New" panose="02070309020205020404" pitchFamily="49" charset="0"/>
+                <a:cs typeface="Courier New" panose="02070309020205020404" pitchFamily="49" charset="0"/>
               </a:rPr>
               <a:t> </a:t>
             </a:r>
             <a:r>
-              <a:rPr lang="es-ES" sz="2000" i="0" dirty="0">
+              <a:rPr lang="es-ES" b="1" i="0" dirty="0">
                 <a:solidFill>
                   <a:schemeClr val="tx1"/>
                 </a:solidFill>
                 <a:effectLst/>
-                <a:latin typeface="Roboto Mono"/>
-              </a:rPr>
-              <a:t>(</a:t>
-            </a:r>
-            <a:r>
-              <a:rPr lang="es-ES" sz="2000" b="1" i="0" dirty="0">
+                <a:latin typeface="Courier New" panose="02070309020205020404" pitchFamily="49" charset="0"/>
+                <a:cs typeface="Courier New" panose="02070309020205020404" pitchFamily="49" charset="0"/>
+              </a:rPr>
+              <a:t>(score &gt;= </a:t>
+            </a:r>
+            <a:r>
+              <a:rPr lang="es-ES" b="1" i="0" dirty="0">
+                <a:solidFill>
+                  <a:srgbClr val="C00000"/>
+                </a:solidFill>
+                <a:effectLst/>
+                <a:latin typeface="Courier New" panose="02070309020205020404" pitchFamily="49" charset="0"/>
+                <a:cs typeface="Courier New" panose="02070309020205020404" pitchFamily="49" charset="0"/>
+              </a:rPr>
+              <a:t>8</a:t>
+            </a:r>
+            <a:r>
+              <a:rPr lang="es-ES" b="1" i="0" dirty="0">
                 <a:solidFill>
                   <a:schemeClr val="tx1"/>
                 </a:solidFill>
                 <a:effectLst/>
-                <a:latin typeface="Roboto Mono"/>
-              </a:rPr>
-              <a:t>score &gt;= </a:t>
-            </a:r>
-            <a:r>
-              <a:rPr lang="es-ES" sz="2000" b="1" i="0" dirty="0">
-                <a:solidFill>
-                  <a:srgbClr val="C00000"/>
-                </a:solidFill>
-                <a:effectLst/>
-                <a:latin typeface="Roboto Mono"/>
-              </a:rPr>
-              <a:t>8</a:t>
-            </a:r>
-            <a:r>
-              <a:rPr lang="es-ES" sz="2000" i="0" dirty="0">
-                <a:solidFill>
-                  <a:schemeClr val="tx1"/>
-                </a:solidFill>
-                <a:effectLst/>
-                <a:latin typeface="Roboto Mono"/>
+                <a:latin typeface="Courier New" panose="02070309020205020404" pitchFamily="49" charset="0"/>
+                <a:cs typeface="Courier New" panose="02070309020205020404" pitchFamily="49" charset="0"/>
               </a:rPr>
               <a:t>) {</a:t>
             </a:r>
@@ -13792,17 +14185,18 @@
               </a:tabLst>
             </a:pPr>
             <a:r>
-              <a:rPr lang="en-US" sz="2000" b="0" i="0" dirty="0">
+              <a:rPr lang="en-US" b="1" i="0" dirty="0">
                 <a:solidFill>
                   <a:srgbClr val="36464E"/>
                 </a:solidFill>
                 <a:effectLst/>
-                <a:latin typeface="Roboto Mono"/>
-              </a:rPr>
-              <a:t>     </a:t>
-            </a:r>
-            <a:r>
-              <a:rPr lang="en-US" sz="2000" b="0" i="0" dirty="0">
+                <a:latin typeface="Courier New" panose="02070309020205020404" pitchFamily="49" charset="0"/>
+                <a:cs typeface="Courier New" panose="02070309020205020404" pitchFamily="49" charset="0"/>
+              </a:rPr>
+              <a:t>    </a:t>
+            </a:r>
+            <a:r>
+              <a:rPr lang="en-US" b="1" i="0" dirty="0">
                 <a:solidFill>
                   <a:srgbClr val="36464E"/>
                 </a:solidFill>
@@ -13810,11 +14204,12 @@
                 <a:highlight>
                   <a:srgbClr val="FFFF00"/>
                 </a:highlight>
-                <a:latin typeface="Roboto Mono"/>
+                <a:latin typeface="Courier New" panose="02070309020205020404" pitchFamily="49" charset="0"/>
+                <a:cs typeface="Courier New" panose="02070309020205020404" pitchFamily="49" charset="0"/>
               </a:rPr>
               <a:t>// { score &gt;= 8 }</a:t>
             </a:r>
-            <a:endParaRPr lang="es-ES" sz="2000" i="0" dirty="0">
+            <a:endParaRPr lang="es-ES" b="1" i="0" dirty="0">
               <a:solidFill>
                 <a:schemeClr val="tx1"/>
               </a:solidFill>
@@ -13822,7 +14217,8 @@
               <a:highlight>
                 <a:srgbClr val="FFFF00"/>
               </a:highlight>
-              <a:latin typeface="Roboto Mono"/>
+              <a:latin typeface="Courier New" panose="02070309020205020404" pitchFamily="49" charset="0"/>
+              <a:cs typeface="Courier New" panose="02070309020205020404" pitchFamily="49" charset="0"/>
             </a:endParaRPr>
           </a:p>
           <a:p>
@@ -13836,32 +14232,35 @@
               </a:tabLst>
             </a:pPr>
             <a:r>
-              <a:rPr lang="es-ES" sz="2000" i="0" dirty="0">
+              <a:rPr lang="es-ES" b="1" i="0" dirty="0">
                 <a:solidFill>
                   <a:schemeClr val="tx1"/>
                 </a:solidFill>
                 <a:effectLst/>
-                <a:latin typeface="Roboto Mono"/>
+                <a:latin typeface="Courier New" panose="02070309020205020404" pitchFamily="49" charset="0"/>
+                <a:cs typeface="Courier New" panose="02070309020205020404" pitchFamily="49" charset="0"/>
               </a:rPr>
               <a:t>} </a:t>
             </a:r>
             <a:r>
-              <a:rPr lang="es-ES" sz="2000" i="0" dirty="0" err="1">
+              <a:rPr lang="es-ES" b="1" i="0" dirty="0" err="1">
                 <a:solidFill>
                   <a:srgbClr val="0000FF"/>
                 </a:solidFill>
                 <a:effectLst/>
-                <a:latin typeface="Roboto Mono"/>
+                <a:latin typeface="Courier New" panose="02070309020205020404" pitchFamily="49" charset="0"/>
+                <a:cs typeface="Courier New" panose="02070309020205020404" pitchFamily="49" charset="0"/>
               </a:rPr>
               <a:t>else</a:t>
             </a:r>
             <a:r>
-              <a:rPr lang="es-ES" sz="2000" i="0" dirty="0">
+              <a:rPr lang="es-ES" b="1" i="0" dirty="0">
                 <a:solidFill>
                   <a:schemeClr val="tx1"/>
                 </a:solidFill>
                 <a:effectLst/>
-                <a:latin typeface="Roboto Mono"/>
+                <a:latin typeface="Courier New" panose="02070309020205020404" pitchFamily="49" charset="0"/>
+                <a:cs typeface="Courier New" panose="02070309020205020404" pitchFamily="49" charset="0"/>
               </a:rPr>
               <a:t> {</a:t>
             </a:r>
@@ -13877,16 +14276,17 @@
               </a:tabLst>
             </a:pPr>
             <a:r>
-              <a:rPr lang="es-ES" sz="2000" dirty="0">
+              <a:rPr lang="es-ES" b="1" dirty="0">
                 <a:solidFill>
                   <a:schemeClr val="tx1"/>
                 </a:solidFill>
-                <a:latin typeface="Roboto Mono"/>
+                <a:latin typeface="Courier New" panose="02070309020205020404" pitchFamily="49" charset="0"/>
+                <a:cs typeface="Courier New" panose="02070309020205020404" pitchFamily="49" charset="0"/>
               </a:rPr>
               <a:t>    </a:t>
             </a:r>
             <a:r>
-              <a:rPr lang="en-US" sz="2000" b="0" i="0" dirty="0">
+              <a:rPr lang="en-US" b="1" i="0" dirty="0">
                 <a:solidFill>
                   <a:srgbClr val="36464E"/>
                 </a:solidFill>
@@ -13894,11 +14294,12 @@
                 <a:highlight>
                   <a:srgbClr val="FFFF00"/>
                 </a:highlight>
-                <a:latin typeface="Roboto Mono"/>
+                <a:latin typeface="Courier New" panose="02070309020205020404" pitchFamily="49" charset="0"/>
+                <a:cs typeface="Courier New" panose="02070309020205020404" pitchFamily="49" charset="0"/>
               </a:rPr>
               <a:t>// { score &lt; 8 }</a:t>
             </a:r>
-            <a:endParaRPr lang="es-ES" sz="2000" i="0" dirty="0">
+            <a:endParaRPr lang="es-ES" b="1" i="0" dirty="0">
               <a:solidFill>
                 <a:schemeClr val="tx1"/>
               </a:solidFill>
@@ -13906,7 +14307,8 @@
               <a:highlight>
                 <a:srgbClr val="FFFF00"/>
               </a:highlight>
-              <a:latin typeface="Roboto Mono"/>
+              <a:latin typeface="Courier New" panose="02070309020205020404" pitchFamily="49" charset="0"/>
+              <a:cs typeface="Courier New" panose="02070309020205020404" pitchFamily="49" charset="0"/>
             </a:endParaRPr>
           </a:p>
           <a:p>
@@ -13920,72 +14322,68 @@
               </a:tabLst>
             </a:pPr>
             <a:r>
-              <a:rPr lang="es-ES" sz="2000" i="0" dirty="0">
+              <a:rPr lang="es-ES" b="1" i="0" dirty="0">
                 <a:solidFill>
                   <a:schemeClr val="tx1"/>
                 </a:solidFill>
                 <a:effectLst/>
-                <a:latin typeface="Roboto Mono"/>
+                <a:latin typeface="Courier New" panose="02070309020205020404" pitchFamily="49" charset="0"/>
+                <a:cs typeface="Courier New" panose="02070309020205020404" pitchFamily="49" charset="0"/>
               </a:rPr>
               <a:t>    </a:t>
             </a:r>
             <a:r>
-              <a:rPr lang="es-ES" sz="2000" i="0" dirty="0" err="1">
+              <a:rPr lang="es-ES" b="1" i="0" dirty="0" err="1">
                 <a:solidFill>
                   <a:srgbClr val="0000FF"/>
                 </a:solidFill>
                 <a:effectLst/>
-                <a:latin typeface="Roboto Mono"/>
+                <a:latin typeface="Courier New" panose="02070309020205020404" pitchFamily="49" charset="0"/>
+                <a:cs typeface="Courier New" panose="02070309020205020404" pitchFamily="49" charset="0"/>
               </a:rPr>
               <a:t>if</a:t>
             </a:r>
             <a:r>
-              <a:rPr lang="es-ES" sz="2000" i="0" dirty="0">
+              <a:rPr lang="es-ES" b="1" i="0" dirty="0">
                 <a:solidFill>
                   <a:srgbClr val="0000FF"/>
                 </a:solidFill>
                 <a:effectLst/>
-                <a:latin typeface="Roboto Mono"/>
+                <a:latin typeface="Courier New" panose="02070309020205020404" pitchFamily="49" charset="0"/>
+                <a:cs typeface="Courier New" panose="02070309020205020404" pitchFamily="49" charset="0"/>
               </a:rPr>
               <a:t> </a:t>
             </a:r>
             <a:r>
-              <a:rPr lang="es-ES" sz="2000" i="0" dirty="0">
+              <a:rPr lang="es-ES" b="1" i="0" dirty="0">
                 <a:solidFill>
                   <a:schemeClr val="tx1"/>
                 </a:solidFill>
                 <a:effectLst/>
-                <a:latin typeface="Roboto Mono"/>
-              </a:rPr>
-              <a:t>(</a:t>
-            </a:r>
-            <a:r>
-              <a:rPr lang="es-ES" sz="2000" b="1" i="0" dirty="0">
+                <a:latin typeface="Courier New" panose="02070309020205020404" pitchFamily="49" charset="0"/>
+                <a:cs typeface="Courier New" panose="02070309020205020404" pitchFamily="49" charset="0"/>
+              </a:rPr>
+              <a:t>(score &gt;= </a:t>
+            </a:r>
+            <a:r>
+              <a:rPr lang="es-ES" b="1" i="0" dirty="0">
+                <a:solidFill>
+                  <a:srgbClr val="C00000"/>
+                </a:solidFill>
+                <a:effectLst/>
+                <a:latin typeface="Courier New" panose="02070309020205020404" pitchFamily="49" charset="0"/>
+                <a:cs typeface="Courier New" panose="02070309020205020404" pitchFamily="49" charset="0"/>
+              </a:rPr>
+              <a:t>5</a:t>
+            </a:r>
+            <a:r>
+              <a:rPr lang="es-ES" b="1" i="0" dirty="0">
                 <a:solidFill>
                   <a:schemeClr val="tx1"/>
                 </a:solidFill>
                 <a:effectLst/>
-                <a:latin typeface="Roboto Mono"/>
-              </a:rPr>
-              <a:t>score &gt;= </a:t>
-            </a:r>
-            <a:r>
-              <a:rPr lang="es-ES" sz="2000" b="1" i="0" dirty="0">
-                <a:solidFill>
-                  <a:srgbClr val="C00000"/>
-                </a:solidFill>
-                <a:effectLst/>
-                <a:latin typeface="Roboto Mono"/>
-              </a:rPr>
-              <a:t>5</a:t>
-            </a:r>
-            <a:r>
-              <a:rPr lang="es-ES" sz="2000" i="0" dirty="0">
-                <a:solidFill>
-                  <a:schemeClr val="tx1"/>
-                </a:solidFill>
-                <a:effectLst/>
-                <a:latin typeface="Roboto Mono"/>
+                <a:latin typeface="Courier New" panose="02070309020205020404" pitchFamily="49" charset="0"/>
+                <a:cs typeface="Courier New" panose="02070309020205020404" pitchFamily="49" charset="0"/>
               </a:rPr>
               <a:t>) {</a:t>
             </a:r>
@@ -14001,37 +14399,40 @@
               </a:tabLst>
             </a:pPr>
             <a:r>
-              <a:rPr lang="es-ES" sz="2000" dirty="0">
+              <a:rPr lang="es-ES" b="1" dirty="0">
                 <a:solidFill>
                   <a:schemeClr val="tx1"/>
                 </a:solidFill>
-                <a:latin typeface="Roboto Mono"/>
+                <a:latin typeface="Courier New" panose="02070309020205020404" pitchFamily="49" charset="0"/>
+                <a:cs typeface="Courier New" panose="02070309020205020404" pitchFamily="49" charset="0"/>
               </a:rPr>
               <a:t> </a:t>
             </a:r>
             <a:r>
-              <a:rPr lang="en-US" sz="2000" dirty="0">
+              <a:rPr lang="en-US" b="1" dirty="0">
                 <a:solidFill>
                   <a:srgbClr val="36464E"/>
                 </a:solidFill>
-                <a:latin typeface="Roboto Mono"/>
-              </a:rPr>
-              <a:t>       </a:t>
-            </a:r>
-            <a:r>
-              <a:rPr lang="en-US" sz="2000" dirty="0">
+                <a:latin typeface="Courier New" panose="02070309020205020404" pitchFamily="49" charset="0"/>
+                <a:cs typeface="Courier New" panose="02070309020205020404" pitchFamily="49" charset="0"/>
+              </a:rPr>
+              <a:t>      </a:t>
+            </a:r>
+            <a:r>
+              <a:rPr lang="en-US" b="1" dirty="0">
                 <a:solidFill>
                   <a:srgbClr val="36464E"/>
                 </a:solidFill>
                 <a:highlight>
                   <a:srgbClr val="FFFF00"/>
                 </a:highlight>
-                <a:latin typeface="Roboto Mono"/>
+                <a:latin typeface="Courier New" panose="02070309020205020404" pitchFamily="49" charset="0"/>
+                <a:cs typeface="Courier New" panose="02070309020205020404" pitchFamily="49" charset="0"/>
               </a:rPr>
               <a:t>// </a:t>
             </a:r>
             <a:r>
-              <a:rPr lang="en-US" sz="2000" b="0" i="0" dirty="0">
+              <a:rPr lang="en-US" b="1" i="0" dirty="0">
                 <a:solidFill>
                   <a:srgbClr val="36464E"/>
                 </a:solidFill>
@@ -14039,16 +14440,18 @@
                 <a:highlight>
                   <a:srgbClr val="FFFF00"/>
                 </a:highlight>
-                <a:latin typeface="Roboto Mono"/>
+                <a:latin typeface="Courier New" panose="02070309020205020404" pitchFamily="49" charset="0"/>
+                <a:cs typeface="Courier New" panose="02070309020205020404" pitchFamily="49" charset="0"/>
               </a:rPr>
               <a:t>{ score &lt; 8 &amp;&amp; score &gt;=5 }</a:t>
             </a:r>
-            <a:endParaRPr lang="es-ES" sz="2000" i="0" dirty="0">
+            <a:endParaRPr lang="es-ES" b="1" i="0" dirty="0">
               <a:solidFill>
                 <a:schemeClr val="tx1"/>
               </a:solidFill>
               <a:effectLst/>
-              <a:latin typeface="Roboto Mono"/>
+              <a:latin typeface="Courier New" panose="02070309020205020404" pitchFamily="49" charset="0"/>
+              <a:cs typeface="Courier New" panose="02070309020205020404" pitchFamily="49" charset="0"/>
             </a:endParaRPr>
           </a:p>
           <a:p>
@@ -14062,52 +14465,57 @@
               </a:tabLst>
             </a:pPr>
             <a:r>
-              <a:rPr lang="es-ES" sz="2000" i="0" dirty="0">
+              <a:rPr lang="es-ES" b="1" i="0" dirty="0">
                 <a:solidFill>
                   <a:schemeClr val="tx1"/>
                 </a:solidFill>
                 <a:effectLst/>
-                <a:latin typeface="Roboto Mono"/>
+                <a:latin typeface="Courier New" panose="02070309020205020404" pitchFamily="49" charset="0"/>
+                <a:cs typeface="Courier New" panose="02070309020205020404" pitchFamily="49" charset="0"/>
               </a:rPr>
               <a:t>    }</a:t>
             </a:r>
             <a:r>
-              <a:rPr lang="es-ES" sz="2000" i="0" dirty="0">
+              <a:rPr lang="es-ES" b="1" i="0" dirty="0">
                 <a:solidFill>
                   <a:srgbClr val="0000FF"/>
                 </a:solidFill>
                 <a:effectLst/>
-                <a:latin typeface="Roboto Mono"/>
+                <a:latin typeface="Courier New" panose="02070309020205020404" pitchFamily="49" charset="0"/>
+                <a:cs typeface="Courier New" panose="02070309020205020404" pitchFamily="49" charset="0"/>
               </a:rPr>
               <a:t> </a:t>
             </a:r>
             <a:r>
-              <a:rPr lang="es-ES" sz="2000" i="0" dirty="0" err="1">
+              <a:rPr lang="es-ES" b="1" i="0" dirty="0" err="1">
                 <a:solidFill>
                   <a:srgbClr val="0000FF"/>
                 </a:solidFill>
                 <a:effectLst/>
-                <a:latin typeface="Roboto Mono"/>
+                <a:latin typeface="Courier New" panose="02070309020205020404" pitchFamily="49" charset="0"/>
+                <a:cs typeface="Courier New" panose="02070309020205020404" pitchFamily="49" charset="0"/>
               </a:rPr>
               <a:t>else</a:t>
             </a:r>
             <a:r>
-              <a:rPr lang="es-ES" sz="2000" i="0" dirty="0">
+              <a:rPr lang="es-ES" b="1" i="0" dirty="0">
                 <a:solidFill>
                   <a:srgbClr val="0000FF"/>
                 </a:solidFill>
                 <a:effectLst/>
-                <a:latin typeface="Roboto Mono"/>
+                <a:latin typeface="Courier New" panose="02070309020205020404" pitchFamily="49" charset="0"/>
+                <a:cs typeface="Courier New" panose="02070309020205020404" pitchFamily="49" charset="0"/>
               </a:rPr>
               <a:t> </a:t>
             </a:r>
             <a:r>
-              <a:rPr lang="es-ES" sz="2000" i="0" dirty="0">
+              <a:rPr lang="es-ES" b="1" i="0" dirty="0">
                 <a:solidFill>
                   <a:schemeClr val="tx1"/>
                 </a:solidFill>
                 <a:effectLst/>
-                <a:latin typeface="Roboto Mono"/>
+                <a:latin typeface="Courier New" panose="02070309020205020404" pitchFamily="49" charset="0"/>
+                <a:cs typeface="Courier New" panose="02070309020205020404" pitchFamily="49" charset="0"/>
               </a:rPr>
               <a:t>{</a:t>
             </a:r>
@@ -14123,28 +14531,40 @@
               </a:tabLst>
             </a:pPr>
             <a:r>
-              <a:rPr lang="es-ES" sz="2000" dirty="0">
+              <a:rPr lang="es-ES" b="1" dirty="0">
                 <a:solidFill>
                   <a:schemeClr val="tx1"/>
                 </a:solidFill>
-                <a:latin typeface="Roboto Mono"/>
+                <a:latin typeface="Courier New" panose="02070309020205020404" pitchFamily="49" charset="0"/>
+                <a:cs typeface="Courier New" panose="02070309020205020404" pitchFamily="49" charset="0"/>
               </a:rPr>
               <a:t>      </a:t>
             </a:r>
             <a:r>
-              <a:rPr lang="en-US" sz="2000" dirty="0">
+              <a:rPr lang="en-US" b="1" dirty="0">
+                <a:solidFill>
+                  <a:srgbClr val="36464E"/>
+                </a:solidFill>
+                <a:latin typeface="Courier New" panose="02070309020205020404" pitchFamily="49" charset="0"/>
+                <a:cs typeface="Courier New" panose="02070309020205020404" pitchFamily="49" charset="0"/>
+              </a:rPr>
+              <a:t> </a:t>
+            </a:r>
+            <a:r>
+              <a:rPr lang="en-US" b="1" dirty="0">
                 <a:solidFill>
                   <a:srgbClr val="36464E"/>
                 </a:solidFill>
                 <a:highlight>
                   <a:srgbClr val="FFFF00"/>
                 </a:highlight>
-                <a:latin typeface="Roboto Mono"/>
-              </a:rPr>
-              <a:t>  // </a:t>
-            </a:r>
-            <a:r>
-              <a:rPr lang="en-US" sz="2000" b="0" i="0" dirty="0">
+                <a:latin typeface="Courier New" panose="02070309020205020404" pitchFamily="49" charset="0"/>
+                <a:cs typeface="Courier New" panose="02070309020205020404" pitchFamily="49" charset="0"/>
+              </a:rPr>
+              <a:t>// </a:t>
+            </a:r>
+            <a:r>
+              <a:rPr lang="en-US" b="1" i="0" dirty="0">
                 <a:solidFill>
                   <a:srgbClr val="36464E"/>
                 </a:solidFill>
@@ -14152,16 +14572,18 @@
                 <a:highlight>
                   <a:srgbClr val="FFFF00"/>
                 </a:highlight>
-                <a:latin typeface="Roboto Mono"/>
+                <a:latin typeface="Courier New" panose="02070309020205020404" pitchFamily="49" charset="0"/>
+                <a:cs typeface="Courier New" panose="02070309020205020404" pitchFamily="49" charset="0"/>
               </a:rPr>
               <a:t>{ score &lt; 5 }</a:t>
             </a:r>
-            <a:endParaRPr lang="es-ES" sz="2000" i="0" dirty="0">
+            <a:endParaRPr lang="es-ES" b="1" i="0" dirty="0">
               <a:solidFill>
                 <a:schemeClr val="tx1"/>
               </a:solidFill>
               <a:effectLst/>
-              <a:latin typeface="Roboto Mono"/>
+              <a:latin typeface="Courier New" panose="02070309020205020404" pitchFamily="49" charset="0"/>
+              <a:cs typeface="Courier New" panose="02070309020205020404" pitchFamily="49" charset="0"/>
             </a:endParaRPr>
           </a:p>
           <a:p>
@@ -14175,82 +14597,79 @@
               </a:tabLst>
             </a:pPr>
             <a:r>
-              <a:rPr lang="es-ES" sz="2000" i="0" dirty="0">
+              <a:rPr lang="es-ES" b="1" i="0" dirty="0">
                 <a:solidFill>
                   <a:schemeClr val="tx1"/>
                 </a:solidFill>
                 <a:effectLst/>
-                <a:latin typeface="Roboto Mono"/>
+                <a:latin typeface="Courier New" panose="02070309020205020404" pitchFamily="49" charset="0"/>
+                <a:cs typeface="Courier New" panose="02070309020205020404" pitchFamily="49" charset="0"/>
               </a:rPr>
               <a:t>         </a:t>
             </a:r>
             <a:r>
-              <a:rPr lang="es-ES" sz="2000" i="0" dirty="0">
+              <a:rPr lang="es-ES" b="1" i="0" dirty="0">
                 <a:solidFill>
                   <a:srgbClr val="0000FF"/>
                 </a:solidFill>
                 <a:effectLst/>
-                <a:latin typeface="Roboto Mono"/>
+                <a:latin typeface="Courier New" panose="02070309020205020404" pitchFamily="49" charset="0"/>
+                <a:cs typeface="Courier New" panose="02070309020205020404" pitchFamily="49" charset="0"/>
               </a:rPr>
               <a:t> </a:t>
             </a:r>
             <a:r>
-              <a:rPr lang="es-ES" sz="2000" i="0" dirty="0" err="1">
+              <a:rPr lang="es-ES" b="1" i="0" dirty="0" err="1">
                 <a:solidFill>
                   <a:srgbClr val="0000FF"/>
                 </a:solidFill>
                 <a:effectLst/>
-                <a:latin typeface="Roboto Mono"/>
+                <a:latin typeface="Courier New" panose="02070309020205020404" pitchFamily="49" charset="0"/>
+                <a:cs typeface="Courier New" panose="02070309020205020404" pitchFamily="49" charset="0"/>
               </a:rPr>
               <a:t>if</a:t>
             </a:r>
             <a:r>
-              <a:rPr lang="es-ES" sz="2000" i="0" dirty="0">
+              <a:rPr lang="es-ES" b="1" i="0" dirty="0">
                 <a:solidFill>
                   <a:srgbClr val="0000FF"/>
                 </a:solidFill>
                 <a:effectLst/>
-                <a:latin typeface="Roboto Mono"/>
+                <a:latin typeface="Courier New" panose="02070309020205020404" pitchFamily="49" charset="0"/>
+                <a:cs typeface="Courier New" panose="02070309020205020404" pitchFamily="49" charset="0"/>
               </a:rPr>
               <a:t> </a:t>
             </a:r>
             <a:r>
-              <a:rPr lang="es-ES" sz="2000" i="0" dirty="0">
+              <a:rPr lang="es-ES" b="1" i="0" dirty="0">
                 <a:solidFill>
                   <a:schemeClr val="tx1"/>
                 </a:solidFill>
                 <a:effectLst/>
-                <a:latin typeface="Roboto Mono"/>
-              </a:rPr>
-              <a:t>(</a:t>
-            </a:r>
-            <a:r>
-              <a:rPr lang="es-ES" sz="2000" b="1" i="0" dirty="0">
+                <a:latin typeface="Courier New" panose="02070309020205020404" pitchFamily="49" charset="0"/>
+                <a:cs typeface="Courier New" panose="02070309020205020404" pitchFamily="49" charset="0"/>
+              </a:rPr>
+              <a:t>(score &gt;= </a:t>
+            </a:r>
+            <a:r>
+              <a:rPr lang="es-ES" b="1" i="0" dirty="0">
+                <a:solidFill>
+                  <a:srgbClr val="C00000"/>
+                </a:solidFill>
+                <a:effectLst/>
+                <a:latin typeface="Courier New" panose="02070309020205020404" pitchFamily="49" charset="0"/>
+                <a:cs typeface="Courier New" panose="02070309020205020404" pitchFamily="49" charset="0"/>
+              </a:rPr>
+              <a:t>3</a:t>
+            </a:r>
+            <a:r>
+              <a:rPr lang="es-ES" b="1" i="0" dirty="0">
                 <a:solidFill>
                   <a:schemeClr val="tx1"/>
                 </a:solidFill>
                 <a:effectLst/>
-                <a:latin typeface="Roboto Mono"/>
-              </a:rPr>
-              <a:t>score &gt;= </a:t>
-            </a:r>
-            <a:r>
-              <a:rPr lang="es-ES" sz="2000" b="1" i="0" dirty="0">
-                <a:solidFill>
-                  <a:srgbClr val="C00000"/>
-                </a:solidFill>
-                <a:effectLst/>
-                <a:latin typeface="Roboto Mono"/>
-              </a:rPr>
-              <a:t>3</a:t>
-            </a:r>
-            <a:r>
-              <a:rPr lang="es-ES" sz="2000" i="0" dirty="0">
-                <a:solidFill>
-                  <a:schemeClr val="tx1"/>
-                </a:solidFill>
-                <a:effectLst/>
-                <a:latin typeface="Roboto Mono"/>
+                <a:latin typeface="Courier New" panose="02070309020205020404" pitchFamily="49" charset="0"/>
+                <a:cs typeface="Courier New" panose="02070309020205020404" pitchFamily="49" charset="0"/>
               </a:rPr>
               <a:t>) {</a:t>
             </a:r>
@@ -14266,28 +14685,30 @@
               </a:tabLst>
             </a:pPr>
             <a:r>
-              <a:rPr lang="en-US" sz="2000" dirty="0">
+              <a:rPr lang="en-US" b="1" dirty="0">
                 <a:solidFill>
                   <a:srgbClr val="36464E"/>
                 </a:solidFill>
-                <a:latin typeface="Roboto Mono"/>
-              </a:rPr>
-              <a:t>              </a:t>
-            </a:r>
-            <a:r>
-              <a:rPr lang="en-US" sz="2000" dirty="0">
+                <a:latin typeface="Courier New" panose="02070309020205020404" pitchFamily="49" charset="0"/>
+                <a:cs typeface="Courier New" panose="02070309020205020404" pitchFamily="49" charset="0"/>
+              </a:rPr>
+              <a:t>             </a:t>
+            </a:r>
+            <a:r>
+              <a:rPr lang="en-US" b="1" dirty="0">
                 <a:solidFill>
                   <a:srgbClr val="36464E"/>
                 </a:solidFill>
                 <a:highlight>
                   <a:srgbClr val="FFFF00"/>
                 </a:highlight>
-                <a:latin typeface="Roboto Mono"/>
+                <a:latin typeface="Courier New" panose="02070309020205020404" pitchFamily="49" charset="0"/>
+                <a:cs typeface="Courier New" panose="02070309020205020404" pitchFamily="49" charset="0"/>
               </a:rPr>
               <a:t>// </a:t>
             </a:r>
             <a:r>
-              <a:rPr lang="en-US" sz="2000" b="0" i="0" dirty="0">
+              <a:rPr lang="en-US" b="1" i="0" dirty="0">
                 <a:solidFill>
                   <a:srgbClr val="36464E"/>
                 </a:solidFill>
@@ -14295,11 +14716,12 @@
                 <a:highlight>
                   <a:srgbClr val="FFFF00"/>
                 </a:highlight>
-                <a:latin typeface="Roboto Mono"/>
+                <a:latin typeface="Courier New" panose="02070309020205020404" pitchFamily="49" charset="0"/>
+                <a:cs typeface="Courier New" panose="02070309020205020404" pitchFamily="49" charset="0"/>
               </a:rPr>
               <a:t>{ score &lt; 5 &amp;&amp; score &gt;=3}</a:t>
             </a:r>
-            <a:endParaRPr lang="es-ES" sz="2000" i="0" dirty="0">
+            <a:endParaRPr lang="es-ES" b="1" i="0" dirty="0">
               <a:solidFill>
                 <a:schemeClr val="tx1"/>
               </a:solidFill>
@@ -14307,7 +14729,8 @@
               <a:highlight>
                 <a:srgbClr val="FFFF00"/>
               </a:highlight>
-              <a:latin typeface="Roboto Mono"/>
+              <a:latin typeface="Courier New" panose="02070309020205020404" pitchFamily="49" charset="0"/>
+              <a:cs typeface="Courier New" panose="02070309020205020404" pitchFamily="49" charset="0"/>
             </a:endParaRPr>
           </a:p>
           <a:p>
@@ -14321,35 +14744,45 @@
               </a:tabLst>
             </a:pPr>
             <a:r>
-              <a:rPr lang="es-ES" sz="2000" i="0" dirty="0">
+              <a:rPr lang="es-ES" b="1" i="0" dirty="0">
                 <a:solidFill>
                   <a:schemeClr val="tx1"/>
                 </a:solidFill>
                 <a:effectLst/>
-                <a:latin typeface="Roboto Mono"/>
+                <a:latin typeface="Courier New" panose="02070309020205020404" pitchFamily="49" charset="0"/>
+                <a:cs typeface="Courier New" panose="02070309020205020404" pitchFamily="49" charset="0"/>
               </a:rPr>
               <a:t>        } </a:t>
             </a:r>
             <a:r>
-              <a:rPr lang="es-ES" sz="2000" i="0" dirty="0" err="1">
+              <a:rPr lang="es-ES" b="1" i="0" dirty="0" err="1">
                 <a:solidFill>
                   <a:srgbClr val="0000FF"/>
                 </a:solidFill>
                 <a:effectLst/>
-                <a:latin typeface="Roboto Mono"/>
+                <a:latin typeface="Courier New" panose="02070309020205020404" pitchFamily="49" charset="0"/>
+                <a:cs typeface="Courier New" panose="02070309020205020404" pitchFamily="49" charset="0"/>
               </a:rPr>
               <a:t>else</a:t>
             </a:r>
             <a:r>
-              <a:rPr lang="es-ES" sz="2000" i="0" dirty="0">
+              <a:rPr lang="es-ES" b="1" i="0" dirty="0">
                 <a:solidFill>
                   <a:schemeClr val="tx1"/>
                 </a:solidFill>
                 <a:effectLst/>
-                <a:latin typeface="Roboto Mono"/>
+                <a:latin typeface="Courier New" panose="02070309020205020404" pitchFamily="49" charset="0"/>
+                <a:cs typeface="Courier New" panose="02070309020205020404" pitchFamily="49" charset="0"/>
               </a:rPr>
               <a:t> {</a:t>
             </a:r>
+            <a:endParaRPr lang="es-ES" b="1" dirty="0">
+              <a:solidFill>
+                <a:schemeClr val="tx1"/>
+              </a:solidFill>
+              <a:latin typeface="Courier New" panose="02070309020205020404" pitchFamily="49" charset="0"/>
+              <a:cs typeface="Courier New" panose="02070309020205020404" pitchFamily="49" charset="0"/>
+            </a:endParaRPr>
           </a:p>
           <a:p>
             <a:pPr>
@@ -14362,37 +14795,30 @@
               </a:tabLst>
             </a:pPr>
             <a:r>
-              <a:rPr lang="es-ES" sz="2000" dirty="0">
+              <a:rPr lang="es-ES" b="1" dirty="0">
                 <a:solidFill>
                   <a:schemeClr val="tx1"/>
                 </a:solidFill>
-                <a:latin typeface="Roboto Mono"/>
-              </a:rPr>
-              <a:t>              </a:t>
-            </a:r>
-            <a:r>
-              <a:rPr lang="en-US" sz="2000" dirty="0">
-                <a:solidFill>
-                  <a:srgbClr val="36464E"/>
-                </a:solidFill>
-                <a:latin typeface="Roboto Mono"/>
-              </a:rPr>
-              <a:t> </a:t>
-            </a:r>
-            <a:r>
-              <a:rPr lang="en-US" sz="2000" dirty="0">
+                <a:latin typeface="Courier New" panose="02070309020205020404" pitchFamily="49" charset="0"/>
+                <a:cs typeface="Courier New" panose="02070309020205020404" pitchFamily="49" charset="0"/>
+              </a:rPr>
+              <a:t>             </a:t>
+            </a:r>
+            <a:r>
+              <a:rPr lang="en-US" b="1" dirty="0">
                 <a:solidFill>
                   <a:srgbClr val="36464E"/>
                 </a:solidFill>
                 <a:highlight>
                   <a:srgbClr val="FFFF00"/>
                 </a:highlight>
-                <a:latin typeface="Roboto Mono"/>
+                <a:latin typeface="Courier New" panose="02070309020205020404" pitchFamily="49" charset="0"/>
+                <a:cs typeface="Courier New" panose="02070309020205020404" pitchFamily="49" charset="0"/>
               </a:rPr>
               <a:t>// </a:t>
             </a:r>
             <a:r>
-              <a:rPr lang="en-US" sz="2000" b="0" i="0" dirty="0">
+              <a:rPr lang="en-US" b="1" i="0" dirty="0">
                 <a:solidFill>
                   <a:srgbClr val="36464E"/>
                 </a:solidFill>
@@ -14400,16 +14826,18 @@
                 <a:highlight>
                   <a:srgbClr val="FFFF00"/>
                 </a:highlight>
-                <a:latin typeface="Roboto Mono"/>
+                <a:latin typeface="Courier New" panose="02070309020205020404" pitchFamily="49" charset="0"/>
+                <a:cs typeface="Courier New" panose="02070309020205020404" pitchFamily="49" charset="0"/>
               </a:rPr>
               <a:t>{score &lt; 3}</a:t>
             </a:r>
-            <a:endParaRPr lang="es-ES" sz="2000" i="0" dirty="0">
+            <a:endParaRPr lang="es-ES" b="1" i="0" dirty="0">
               <a:solidFill>
                 <a:schemeClr val="tx1"/>
               </a:solidFill>
               <a:effectLst/>
-              <a:latin typeface="Roboto Mono"/>
+              <a:latin typeface="Courier New" panose="02070309020205020404" pitchFamily="49" charset="0"/>
+              <a:cs typeface="Courier New" panose="02070309020205020404" pitchFamily="49" charset="0"/>
             </a:endParaRPr>
           </a:p>
           <a:p>
@@ -14423,12 +14851,13 @@
               </a:tabLst>
             </a:pPr>
             <a:r>
-              <a:rPr lang="es-ES" sz="2000" i="0" dirty="0">
+              <a:rPr lang="es-ES" b="1" i="0" dirty="0">
                 <a:solidFill>
                   <a:schemeClr val="tx1"/>
                 </a:solidFill>
                 <a:effectLst/>
-                <a:latin typeface="Roboto Mono"/>
+                <a:latin typeface="Courier New" panose="02070309020205020404" pitchFamily="49" charset="0"/>
+                <a:cs typeface="Courier New" panose="02070309020205020404" pitchFamily="49" charset="0"/>
               </a:rPr>
               <a:t>        }</a:t>
             </a:r>
@@ -14444,12 +14873,13 @@
               </a:tabLst>
             </a:pPr>
             <a:r>
-              <a:rPr lang="es-ES" sz="2000" i="0" dirty="0">
+              <a:rPr lang="es-ES" b="1" i="0" dirty="0">
                 <a:solidFill>
                   <a:schemeClr val="tx1"/>
                 </a:solidFill>
                 <a:effectLst/>
-                <a:latin typeface="Roboto Mono"/>
+                <a:latin typeface="Courier New" panose="02070309020205020404" pitchFamily="49" charset="0"/>
+                <a:cs typeface="Courier New" panose="02070309020205020404" pitchFamily="49" charset="0"/>
               </a:rPr>
               <a:t>    }</a:t>
             </a:r>
@@ -14465,48 +14895,19 @@
               </a:tabLst>
             </a:pPr>
             <a:r>
-              <a:rPr lang="es-ES" sz="2000" i="0" dirty="0">
+              <a:rPr lang="es-ES" b="1" i="0" dirty="0">
                 <a:solidFill>
                   <a:schemeClr val="tx1"/>
                 </a:solidFill>
                 <a:effectLst/>
-                <a:latin typeface="Roboto Mono"/>
+                <a:latin typeface="Courier New" panose="02070309020205020404" pitchFamily="49" charset="0"/>
+                <a:cs typeface="Courier New" panose="02070309020205020404" pitchFamily="49" charset="0"/>
               </a:rPr>
               <a:t>}</a:t>
             </a:r>
           </a:p>
         </p:txBody>
       </p:sp>
-      <p:pic>
-        <p:nvPicPr>
-          <p:cNvPr id="2" name="Picture 1">
-            <a:extLst>
-              <a:ext uri="{FF2B5EF4-FFF2-40B4-BE49-F238E27FC236}">
-                <a16:creationId xmlns:a16="http://schemas.microsoft.com/office/drawing/2014/main" id="{6D73691B-4B97-4B86-8C7B-28391EA29716}"/>
-              </a:ext>
-            </a:extLst>
-          </p:cNvPr>
-          <p:cNvPicPr>
-            <a:picLocks noChangeAspect="1"/>
-          </p:cNvPicPr>
-          <p:nvPr/>
-        </p:nvPicPr>
-        <p:blipFill>
-          <a:blip r:embed="rId3"/>
-          <a:stretch>
-            <a:fillRect/>
-          </a:stretch>
-        </p:blipFill>
-        <p:spPr>
-          <a:xfrm>
-            <a:off x="4724400" y="1837205"/>
-            <a:ext cx="4202736" cy="1938636"/>
-          </a:xfrm>
-          <a:prstGeom prst="rect">
-            <a:avLst/>
-          </a:prstGeom>
-        </p:spPr>
-      </p:pic>
       <p:sp>
         <p:nvSpPr>
           <p:cNvPr id="3" name="Footer Placeholder 2">
@@ -14539,6 +14940,36 @@
           </a:p>
         </p:txBody>
       </p:sp>
+      <p:pic>
+        <p:nvPicPr>
+          <p:cNvPr id="5" name="Picture 4">
+            <a:extLst>
+              <a:ext uri="{FF2B5EF4-FFF2-40B4-BE49-F238E27FC236}">
+                <a16:creationId xmlns:a16="http://schemas.microsoft.com/office/drawing/2014/main" id="{AC813A67-6D14-9982-2391-67B6D47D8FF5}"/>
+              </a:ext>
+            </a:extLst>
+          </p:cNvPr>
+          <p:cNvPicPr>
+            <a:picLocks noChangeAspect="1"/>
+          </p:cNvPicPr>
+          <p:nvPr/>
+        </p:nvPicPr>
+        <p:blipFill>
+          <a:blip r:embed="rId3"/>
+          <a:stretch>
+            <a:fillRect/>
+          </a:stretch>
+        </p:blipFill>
+        <p:spPr>
+          <a:xfrm>
+            <a:off x="4778373" y="4701232"/>
+            <a:ext cx="4202736" cy="1938636"/>
+          </a:xfrm>
+          <a:prstGeom prst="rect">
+            <a:avLst/>
+          </a:prstGeom>
+        </p:spPr>
+      </p:pic>
     </p:spTree>
     <p:extLst>
       <p:ext uri="{BB962C8B-B14F-4D97-AF65-F5344CB8AC3E}">
@@ -14845,7 +15276,7 @@
         <p:spPr>
           <a:xfrm>
             <a:off x="973949" y="2997774"/>
-            <a:ext cx="6526445" cy="1631216"/>
+            <a:ext cx="6526445" cy="2031325"/>
           </a:xfrm>
           <a:prstGeom prst="rect">
             <a:avLst/>
@@ -14889,32 +15320,35 @@
               </a:tabLst>
             </a:pPr>
             <a:r>
-              <a:rPr lang="es-ES" sz="2000" i="0" dirty="0">
+              <a:rPr lang="es-ES" b="1" i="0" dirty="0">
                 <a:solidFill>
                   <a:schemeClr val="tx1"/>
                 </a:solidFill>
                 <a:effectLst/>
-                <a:latin typeface="Roboto Mono"/>
+                <a:latin typeface="Courier New" panose="02070309020205020404" pitchFamily="49" charset="0"/>
+                <a:cs typeface="Courier New" panose="02070309020205020404" pitchFamily="49" charset="0"/>
               </a:rPr>
               <a:t> </a:t>
             </a:r>
             <a:r>
-              <a:rPr lang="es-ES" sz="2000" i="0" dirty="0" err="1">
+              <a:rPr lang="es-ES" b="1" i="0" dirty="0" err="1">
                 <a:solidFill>
                   <a:srgbClr val="0000FF"/>
                 </a:solidFill>
                 <a:effectLst/>
-                <a:latin typeface="Roboto Mono"/>
+                <a:latin typeface="Courier New" panose="02070309020205020404" pitchFamily="49" charset="0"/>
+                <a:cs typeface="Courier New" panose="02070309020205020404" pitchFamily="49" charset="0"/>
               </a:rPr>
               <a:t>if</a:t>
             </a:r>
             <a:r>
-              <a:rPr lang="es-ES" sz="2000" i="0" dirty="0">
+              <a:rPr lang="es-ES" b="1" i="0" dirty="0">
                 <a:solidFill>
                   <a:schemeClr val="tx1"/>
                 </a:solidFill>
                 <a:effectLst/>
-                <a:latin typeface="Roboto Mono"/>
+                <a:latin typeface="Courier New" panose="02070309020205020404" pitchFamily="49" charset="0"/>
+                <a:cs typeface="Courier New" panose="02070309020205020404" pitchFamily="49" charset="0"/>
               </a:rPr>
               <a:t> (…) {</a:t>
             </a:r>
@@ -14930,17 +15364,18 @@
               </a:tabLst>
             </a:pPr>
             <a:r>
-              <a:rPr lang="en-US" sz="2000" b="0" i="0" dirty="0">
+              <a:rPr lang="en-US" b="1" i="0" dirty="0">
                 <a:solidFill>
                   <a:srgbClr val="36464E"/>
                 </a:solidFill>
                 <a:effectLst/>
-                <a:latin typeface="Roboto Mono"/>
+                <a:latin typeface="Courier New" panose="02070309020205020404" pitchFamily="49" charset="0"/>
+                <a:cs typeface="Courier New" panose="02070309020205020404" pitchFamily="49" charset="0"/>
               </a:rPr>
               <a:t>     </a:t>
             </a:r>
             <a:r>
-              <a:rPr lang="en-US" sz="2000" b="0" i="0" dirty="0">
+              <a:rPr lang="en-US" b="1" i="0" dirty="0">
                 <a:solidFill>
                   <a:srgbClr val="36464E"/>
                 </a:solidFill>
@@ -14948,12 +15383,13 @@
                 <a:highlight>
                   <a:srgbClr val="FFFF00"/>
                 </a:highlight>
-                <a:latin typeface="Roboto Mono"/>
+                <a:latin typeface="Courier New" panose="02070309020205020404" pitchFamily="49" charset="0"/>
+                <a:cs typeface="Courier New" panose="02070309020205020404" pitchFamily="49" charset="0"/>
               </a:rPr>
               <a:t>// { </a:t>
             </a:r>
             <a:r>
-              <a:rPr lang="en-US" sz="2000" i="0" dirty="0">
+              <a:rPr lang="en-US" b="1" i="0" dirty="0">
                 <a:solidFill>
                   <a:schemeClr val="tx1"/>
                 </a:solidFill>
@@ -14961,12 +15397,13 @@
                 <a:highlight>
                   <a:srgbClr val="FFFF00"/>
                 </a:highlight>
-                <a:latin typeface="Roboto Mono"/>
+                <a:latin typeface="Courier New" panose="02070309020205020404" pitchFamily="49" charset="0"/>
+                <a:cs typeface="Courier New" panose="02070309020205020404" pitchFamily="49" charset="0"/>
               </a:rPr>
               <a:t>(</a:t>
             </a:r>
             <a:r>
-              <a:rPr lang="en-US" sz="2000" i="0" dirty="0" err="1">
+              <a:rPr lang="en-US" b="1" i="0" dirty="0" err="1">
                 <a:solidFill>
                   <a:schemeClr val="tx1"/>
                 </a:solidFill>
@@ -14974,12 +15411,13 @@
                 <a:highlight>
                   <a:srgbClr val="FFFF00"/>
                 </a:highlight>
-                <a:latin typeface="Roboto Mono"/>
+                <a:latin typeface="Courier New" panose="02070309020205020404" pitchFamily="49" charset="0"/>
+                <a:cs typeface="Courier New" panose="02070309020205020404" pitchFamily="49" charset="0"/>
               </a:rPr>
               <a:t>birth_year</a:t>
             </a:r>
             <a:r>
-              <a:rPr lang="en-US" sz="2000" i="0" dirty="0">
+              <a:rPr lang="en-US" b="1" i="0" dirty="0">
                 <a:solidFill>
                   <a:schemeClr val="tx1"/>
                 </a:solidFill>
@@ -14987,12 +15425,13 @@
                 <a:highlight>
                   <a:srgbClr val="FFFF00"/>
                 </a:highlight>
-                <a:latin typeface="Roboto Mono"/>
+                <a:latin typeface="Courier New" panose="02070309020205020404" pitchFamily="49" charset="0"/>
+                <a:cs typeface="Courier New" panose="02070309020205020404" pitchFamily="49" charset="0"/>
               </a:rPr>
               <a:t> &gt;= 1995) &amp;&amp; (</a:t>
             </a:r>
             <a:r>
-              <a:rPr lang="en-US" sz="2000" i="0" dirty="0" err="1">
+              <a:rPr lang="en-US" b="1" i="0" dirty="0" err="1">
                 <a:solidFill>
                   <a:schemeClr val="tx1"/>
                 </a:solidFill>
@@ -15000,12 +15439,13 @@
                 <a:highlight>
                   <a:srgbClr val="FFFF00"/>
                 </a:highlight>
-                <a:latin typeface="Roboto Mono"/>
+                <a:latin typeface="Courier New" panose="02070309020205020404" pitchFamily="49" charset="0"/>
+                <a:cs typeface="Courier New" panose="02070309020205020404" pitchFamily="49" charset="0"/>
               </a:rPr>
               <a:t>birth_year</a:t>
             </a:r>
             <a:r>
-              <a:rPr lang="en-US" sz="2000" i="0" dirty="0">
+              <a:rPr lang="en-US" b="1" i="0" dirty="0">
                 <a:solidFill>
                   <a:schemeClr val="tx1"/>
                 </a:solidFill>
@@ -15013,12 +15453,13 @@
                 <a:highlight>
                   <a:srgbClr val="FFFF00"/>
                 </a:highlight>
-                <a:latin typeface="Roboto Mono"/>
+                <a:latin typeface="Courier New" panose="02070309020205020404" pitchFamily="49" charset="0"/>
+                <a:cs typeface="Courier New" panose="02070309020205020404" pitchFamily="49" charset="0"/>
               </a:rPr>
               <a:t> &lt;= 2005)</a:t>
             </a:r>
             <a:r>
-              <a:rPr lang="en-US" sz="2000" b="0" i="0" dirty="0">
+              <a:rPr lang="en-US" b="1" i="0" dirty="0">
                 <a:solidFill>
                   <a:srgbClr val="36464E"/>
                 </a:solidFill>
@@ -15026,11 +15467,12 @@
                 <a:highlight>
                   <a:srgbClr val="FFFF00"/>
                 </a:highlight>
-                <a:latin typeface="Roboto Mono"/>
+                <a:latin typeface="Courier New" panose="02070309020205020404" pitchFamily="49" charset="0"/>
+                <a:cs typeface="Courier New" panose="02070309020205020404" pitchFamily="49" charset="0"/>
               </a:rPr>
               <a:t> }</a:t>
             </a:r>
-            <a:endParaRPr lang="es-ES" sz="2000" i="0" dirty="0">
+            <a:endParaRPr lang="es-ES" b="1" i="0" dirty="0">
               <a:solidFill>
                 <a:schemeClr val="tx1"/>
               </a:solidFill>
@@ -15038,7 +15480,8 @@
               <a:highlight>
                 <a:srgbClr val="FFFF00"/>
               </a:highlight>
-              <a:latin typeface="Roboto Mono"/>
+              <a:latin typeface="Courier New" panose="02070309020205020404" pitchFamily="49" charset="0"/>
+              <a:cs typeface="Courier New" panose="02070309020205020404" pitchFamily="49" charset="0"/>
             </a:endParaRPr>
           </a:p>
           <a:p>
@@ -15052,32 +15495,35 @@
               </a:tabLst>
             </a:pPr>
             <a:r>
-              <a:rPr lang="es-ES" sz="2000" i="0" dirty="0">
+              <a:rPr lang="es-ES" b="1" i="0" dirty="0">
                 <a:solidFill>
                   <a:schemeClr val="tx1"/>
                 </a:solidFill>
                 <a:effectLst/>
-                <a:latin typeface="Roboto Mono"/>
+                <a:latin typeface="Courier New" panose="02070309020205020404" pitchFamily="49" charset="0"/>
+                <a:cs typeface="Courier New" panose="02070309020205020404" pitchFamily="49" charset="0"/>
               </a:rPr>
               <a:t>} </a:t>
             </a:r>
             <a:r>
-              <a:rPr lang="es-ES" sz="2000" i="0" dirty="0" err="1">
+              <a:rPr lang="es-ES" b="1" i="0" dirty="0" err="1">
                 <a:solidFill>
                   <a:srgbClr val="0000FF"/>
                 </a:solidFill>
                 <a:effectLst/>
-                <a:latin typeface="Roboto Mono"/>
+                <a:latin typeface="Courier New" panose="02070309020205020404" pitchFamily="49" charset="0"/>
+                <a:cs typeface="Courier New" panose="02070309020205020404" pitchFamily="49" charset="0"/>
               </a:rPr>
               <a:t>else</a:t>
             </a:r>
             <a:r>
-              <a:rPr lang="es-ES" sz="2000" i="0" dirty="0">
+              <a:rPr lang="es-ES" b="1" i="0" dirty="0">
                 <a:solidFill>
                   <a:schemeClr val="tx1"/>
                 </a:solidFill>
                 <a:effectLst/>
-                <a:latin typeface="Roboto Mono"/>
+                <a:latin typeface="Courier New" panose="02070309020205020404" pitchFamily="49" charset="0"/>
+                <a:cs typeface="Courier New" panose="02070309020205020404" pitchFamily="49" charset="0"/>
               </a:rPr>
               <a:t> {</a:t>
             </a:r>
@@ -15093,26 +15539,28 @@
               </a:tabLst>
             </a:pPr>
             <a:r>
-              <a:rPr lang="es-ES" sz="2000" dirty="0">
+              <a:rPr lang="es-ES" b="1" dirty="0">
                 <a:solidFill>
                   <a:schemeClr val="tx1"/>
                 </a:solidFill>
-                <a:latin typeface="Roboto Mono"/>
+                <a:latin typeface="Courier New" panose="02070309020205020404" pitchFamily="49" charset="0"/>
+                <a:cs typeface="Courier New" panose="02070309020205020404" pitchFamily="49" charset="0"/>
               </a:rPr>
               <a:t>    </a:t>
             </a:r>
             <a:r>
-              <a:rPr lang="en-US" sz="2000" b="0" i="0" dirty="0">
+              <a:rPr lang="en-US" b="1" i="0" dirty="0">
                 <a:solidFill>
                   <a:srgbClr val="36464E"/>
                 </a:solidFill>
                 <a:effectLst/>
-                <a:latin typeface="Roboto Mono"/>
+                <a:latin typeface="Courier New" panose="02070309020205020404" pitchFamily="49" charset="0"/>
+                <a:cs typeface="Courier New" panose="02070309020205020404" pitchFamily="49" charset="0"/>
               </a:rPr>
               <a:t> </a:t>
             </a:r>
             <a:r>
-              <a:rPr lang="en-US" sz="2000" b="0" i="0" dirty="0">
+              <a:rPr lang="en-US" b="1" i="0" dirty="0">
                 <a:solidFill>
                   <a:srgbClr val="36464E"/>
                 </a:solidFill>
@@ -15120,25 +15568,27 @@
                 <a:highlight>
                   <a:srgbClr val="FFFF00"/>
                 </a:highlight>
-                <a:latin typeface="Roboto Mono"/>
+                <a:latin typeface="Courier New" panose="02070309020205020404" pitchFamily="49" charset="0"/>
+                <a:cs typeface="Courier New" panose="02070309020205020404" pitchFamily="49" charset="0"/>
               </a:rPr>
               <a:t>// { </a:t>
             </a:r>
             <a:r>
-              <a:rPr lang="en-US" sz="2000" b="1" i="0" dirty="0">
-                <a:solidFill>
-                  <a:srgbClr val="36464E"/>
+              <a:rPr lang="en-US" b="1" i="0" dirty="0">
+                <a:solidFill>
+                  <a:srgbClr val="FF0000"/>
                 </a:solidFill>
                 <a:effectLst/>
                 <a:highlight>
                   <a:srgbClr val="FFFF00"/>
                 </a:highlight>
-                <a:latin typeface="Roboto Mono"/>
+                <a:latin typeface="Courier New" panose="02070309020205020404" pitchFamily="49" charset="0"/>
+                <a:cs typeface="Courier New" panose="02070309020205020404" pitchFamily="49" charset="0"/>
               </a:rPr>
               <a:t>!</a:t>
             </a:r>
             <a:r>
-              <a:rPr lang="en-US" sz="2000" b="0" i="0" dirty="0">
+              <a:rPr lang="en-US" b="1" i="0" dirty="0">
                 <a:solidFill>
                   <a:srgbClr val="36464E"/>
                 </a:solidFill>
@@ -15146,12 +15596,13 @@
                 <a:highlight>
                   <a:srgbClr val="FFFF00"/>
                 </a:highlight>
-                <a:latin typeface="Roboto Mono"/>
+                <a:latin typeface="Courier New" panose="02070309020205020404" pitchFamily="49" charset="0"/>
+                <a:cs typeface="Courier New" panose="02070309020205020404" pitchFamily="49" charset="0"/>
               </a:rPr>
               <a:t>(</a:t>
             </a:r>
             <a:r>
-              <a:rPr lang="en-US" sz="2000" i="0" dirty="0">
+              <a:rPr lang="en-US" b="1" i="0" dirty="0">
                 <a:solidFill>
                   <a:schemeClr val="tx1"/>
                 </a:solidFill>
@@ -15159,12 +15610,13 @@
                 <a:highlight>
                   <a:srgbClr val="FFFF00"/>
                 </a:highlight>
-                <a:latin typeface="Roboto Mono"/>
+                <a:latin typeface="Courier New" panose="02070309020205020404" pitchFamily="49" charset="0"/>
+                <a:cs typeface="Courier New" panose="02070309020205020404" pitchFamily="49" charset="0"/>
               </a:rPr>
               <a:t>(</a:t>
             </a:r>
             <a:r>
-              <a:rPr lang="en-US" sz="2000" i="0" dirty="0" err="1">
+              <a:rPr lang="en-US" b="1" i="0" dirty="0" err="1">
                 <a:solidFill>
                   <a:schemeClr val="tx1"/>
                 </a:solidFill>
@@ -15172,12 +15624,13 @@
                 <a:highlight>
                   <a:srgbClr val="FFFF00"/>
                 </a:highlight>
-                <a:latin typeface="Roboto Mono"/>
+                <a:latin typeface="Courier New" panose="02070309020205020404" pitchFamily="49" charset="0"/>
+                <a:cs typeface="Courier New" panose="02070309020205020404" pitchFamily="49" charset="0"/>
               </a:rPr>
               <a:t>birth_year</a:t>
             </a:r>
             <a:r>
-              <a:rPr lang="en-US" sz="2000" i="0" dirty="0">
+              <a:rPr lang="en-US" b="1" i="0" dirty="0">
                 <a:solidFill>
                   <a:schemeClr val="tx1"/>
                 </a:solidFill>
@@ -15185,12 +15638,13 @@
                 <a:highlight>
                   <a:srgbClr val="FFFF00"/>
                 </a:highlight>
-                <a:latin typeface="Roboto Mono"/>
-              </a:rPr>
-              <a:t> &gt;= 1995) &amp;&amp; (</a:t>
-            </a:r>
-            <a:r>
-              <a:rPr lang="en-US" sz="2000" i="0" dirty="0" err="1">
+                <a:latin typeface="Courier New" panose="02070309020205020404" pitchFamily="49" charset="0"/>
+                <a:cs typeface="Courier New" panose="02070309020205020404" pitchFamily="49" charset="0"/>
+              </a:rPr>
+              <a:t> &gt;= 1995) &amp;&amp;    </a:t>
+            </a:r>
+            <a:br>
+              <a:rPr lang="en-US" b="1" i="0" dirty="0">
                 <a:solidFill>
                   <a:schemeClr val="tx1"/>
                 </a:solidFill>
@@ -15198,12 +15652,23 @@
                 <a:highlight>
                   <a:srgbClr val="FFFF00"/>
                 </a:highlight>
-                <a:latin typeface="Roboto Mono"/>
-              </a:rPr>
-              <a:t>birth_year</a:t>
-            </a:r>
-            <a:r>
-              <a:rPr lang="en-US" sz="2000" i="0" dirty="0">
+                <a:latin typeface="Courier New" panose="02070309020205020404" pitchFamily="49" charset="0"/>
+                <a:cs typeface="Courier New" panose="02070309020205020404" pitchFamily="49" charset="0"/>
+              </a:rPr>
+            </a:br>
+            <a:r>
+              <a:rPr lang="en-US" b="1" i="0" dirty="0">
+                <a:solidFill>
+                  <a:schemeClr val="tx1"/>
+                </a:solidFill>
+                <a:effectLst/>
+                <a:latin typeface="Courier New" panose="02070309020205020404" pitchFamily="49" charset="0"/>
+                <a:cs typeface="Courier New" panose="02070309020205020404" pitchFamily="49" charset="0"/>
+              </a:rPr>
+              <a:t>           </a:t>
+            </a:r>
+            <a:r>
+              <a:rPr lang="en-US" b="1" i="0" dirty="0">
                 <a:solidFill>
                   <a:schemeClr val="tx1"/>
                 </a:solidFill>
@@ -15211,29 +15676,60 @@
                 <a:highlight>
                   <a:srgbClr val="FFFF00"/>
                 </a:highlight>
-                <a:latin typeface="Roboto Mono"/>
-              </a:rPr>
-              <a:t> &lt;= 2005))</a:t>
-            </a:r>
-            <a:r>
-              <a:rPr lang="en-US" sz="2000" b="0" i="0" dirty="0">
-                <a:solidFill>
-                  <a:srgbClr val="36464E"/>
+                <a:latin typeface="Courier New" panose="02070309020205020404" pitchFamily="49" charset="0"/>
+                <a:cs typeface="Courier New" panose="02070309020205020404" pitchFamily="49" charset="0"/>
+              </a:rPr>
+              <a:t>(</a:t>
+            </a:r>
+            <a:r>
+              <a:rPr lang="en-US" b="1" i="0" dirty="0" err="1">
+                <a:solidFill>
+                  <a:schemeClr val="tx1"/>
                 </a:solidFill>
                 <a:effectLst/>
                 <a:highlight>
                   <a:srgbClr val="FFFF00"/>
                 </a:highlight>
-                <a:latin typeface="Roboto Mono"/>
+                <a:latin typeface="Courier New" panose="02070309020205020404" pitchFamily="49" charset="0"/>
+                <a:cs typeface="Courier New" panose="02070309020205020404" pitchFamily="49" charset="0"/>
+              </a:rPr>
+              <a:t>birth_year</a:t>
+            </a:r>
+            <a:r>
+              <a:rPr lang="en-US" b="1" i="0" dirty="0">
+                <a:solidFill>
+                  <a:schemeClr val="tx1"/>
+                </a:solidFill>
+                <a:effectLst/>
+                <a:highlight>
+                  <a:srgbClr val="FFFF00"/>
+                </a:highlight>
+                <a:latin typeface="Courier New" panose="02070309020205020404" pitchFamily="49" charset="0"/>
+                <a:cs typeface="Courier New" panose="02070309020205020404" pitchFamily="49" charset="0"/>
+              </a:rPr>
+              <a:t> &lt;= 2005))</a:t>
+            </a:r>
+            <a:r>
+              <a:rPr lang="en-US" b="1" i="0" dirty="0">
+                <a:solidFill>
+                  <a:srgbClr val="36464E"/>
+                </a:solidFill>
+                <a:effectLst/>
+                <a:highlight>
+                  <a:srgbClr val="FFFF00"/>
+                </a:highlight>
+                <a:latin typeface="Courier New" panose="02070309020205020404" pitchFamily="49" charset="0"/>
+                <a:cs typeface="Courier New" panose="02070309020205020404" pitchFamily="49" charset="0"/>
               </a:rPr>
               <a:t> }</a:t>
             </a:r>
-            <a:endParaRPr lang="es-ES" sz="2000" i="0" dirty="0">
+            <a:endParaRPr lang="es-ES" b="1" i="0" dirty="0">
               <a:solidFill>
                 <a:schemeClr val="tx1"/>
               </a:solidFill>
               <a:effectLst/>
-              <a:latin typeface="Roboto Mono"/>
+              <a:latin typeface="Courier New" panose="02070309020205020404" pitchFamily="49" charset="0"/>
+              <a:cs typeface="Courier New" panose="02070309020205020404" pitchFamily="49" charset="0"/>
             </a:endParaRPr>
           </a:p>
           <a:p>
@@ -15247,12 +15743,13 @@
               </a:tabLst>
             </a:pPr>
             <a:r>
-              <a:rPr lang="es-ES" sz="2000" i="0" dirty="0">
+              <a:rPr lang="es-ES" b="1" i="0" dirty="0">
                 <a:solidFill>
                   <a:schemeClr val="tx1"/>
                 </a:solidFill>
                 <a:effectLst/>
-                <a:latin typeface="Roboto Mono"/>
+                <a:latin typeface="Courier New" panose="02070309020205020404" pitchFamily="49" charset="0"/>
+                <a:cs typeface="Courier New" panose="02070309020205020404" pitchFamily="49" charset="0"/>
               </a:rPr>
               <a:t>}</a:t>
             </a:r>
@@ -15273,8 +15770,8 @@
         </p:nvSpPr>
         <p:spPr>
           <a:xfrm>
-            <a:off x="973948" y="4788142"/>
-            <a:ext cx="6526445" cy="400110"/>
+            <a:off x="973947" y="5152657"/>
+            <a:ext cx="6526445" cy="646331"/>
           </a:xfrm>
           <a:prstGeom prst="rect">
             <a:avLst/>
@@ -15318,17 +15815,18 @@
               </a:tabLst>
             </a:pPr>
             <a:r>
-              <a:rPr lang="en-US" sz="2000" b="0" i="0" dirty="0">
+              <a:rPr lang="en-US" b="1" i="0" dirty="0">
                 <a:solidFill>
                   <a:srgbClr val="36464E"/>
                 </a:solidFill>
                 <a:effectLst/>
-                <a:latin typeface="Roboto Mono"/>
+                <a:latin typeface="Courier New" panose="02070309020205020404" pitchFamily="49" charset="0"/>
+                <a:cs typeface="Courier New" panose="02070309020205020404" pitchFamily="49" charset="0"/>
               </a:rPr>
               <a:t>    </a:t>
             </a:r>
             <a:r>
-              <a:rPr lang="en-US" sz="2000" b="0" i="0" dirty="0">
+              <a:rPr lang="en-US" b="1" i="0" dirty="0">
                 <a:solidFill>
                   <a:srgbClr val="36464E"/>
                 </a:solidFill>
@@ -15336,25 +15834,27 @@
                 <a:highlight>
                   <a:srgbClr val="FFFF00"/>
                 </a:highlight>
-                <a:latin typeface="Roboto Mono"/>
+                <a:latin typeface="Courier New" panose="02070309020205020404" pitchFamily="49" charset="0"/>
+                <a:cs typeface="Courier New" panose="02070309020205020404" pitchFamily="49" charset="0"/>
               </a:rPr>
               <a:t>// { (</a:t>
             </a:r>
             <a:r>
-              <a:rPr lang="en-US" sz="2000" b="1" i="0" dirty="0">
-                <a:solidFill>
-                  <a:srgbClr val="36464E"/>
+              <a:rPr lang="en-US" b="1" i="0" dirty="0">
+                <a:solidFill>
+                  <a:srgbClr val="FF0000"/>
                 </a:solidFill>
                 <a:effectLst/>
                 <a:highlight>
                   <a:srgbClr val="FFFF00"/>
                 </a:highlight>
-                <a:latin typeface="Roboto Mono"/>
+                <a:latin typeface="Courier New" panose="02070309020205020404" pitchFamily="49" charset="0"/>
+                <a:cs typeface="Courier New" panose="02070309020205020404" pitchFamily="49" charset="0"/>
               </a:rPr>
               <a:t>!</a:t>
             </a:r>
             <a:r>
-              <a:rPr lang="en-US" sz="2000" i="0" dirty="0">
+              <a:rPr lang="en-US" b="1" i="0" dirty="0">
                 <a:solidFill>
                   <a:schemeClr val="tx1"/>
                 </a:solidFill>
@@ -15362,12 +15862,13 @@
                 <a:highlight>
                   <a:srgbClr val="FFFF00"/>
                 </a:highlight>
-                <a:latin typeface="Roboto Mono"/>
+                <a:latin typeface="Courier New" panose="02070309020205020404" pitchFamily="49" charset="0"/>
+                <a:cs typeface="Courier New" panose="02070309020205020404" pitchFamily="49" charset="0"/>
               </a:rPr>
               <a:t>(</a:t>
             </a:r>
             <a:r>
-              <a:rPr lang="en-US" sz="2000" i="0" dirty="0" err="1">
+              <a:rPr lang="en-US" b="1" i="0" dirty="0" err="1">
                 <a:solidFill>
                   <a:schemeClr val="tx1"/>
                 </a:solidFill>
@@ -15375,12 +15876,13 @@
                 <a:highlight>
                   <a:srgbClr val="FFFF00"/>
                 </a:highlight>
-                <a:latin typeface="Roboto Mono"/>
+                <a:latin typeface="Courier New" panose="02070309020205020404" pitchFamily="49" charset="0"/>
+                <a:cs typeface="Courier New" panose="02070309020205020404" pitchFamily="49" charset="0"/>
               </a:rPr>
               <a:t>birth_year</a:t>
             </a:r>
             <a:r>
-              <a:rPr lang="en-US" sz="2000" i="0" dirty="0">
+              <a:rPr lang="en-US" b="1" i="0" dirty="0">
                 <a:solidFill>
                   <a:schemeClr val="tx1"/>
                 </a:solidFill>
@@ -15388,12 +15890,13 @@
                 <a:highlight>
                   <a:srgbClr val="FFFF00"/>
                 </a:highlight>
-                <a:latin typeface="Roboto Mono"/>
+                <a:latin typeface="Courier New" panose="02070309020205020404" pitchFamily="49" charset="0"/>
+                <a:cs typeface="Courier New" panose="02070309020205020404" pitchFamily="49" charset="0"/>
               </a:rPr>
               <a:t> &gt;= 1995) || </a:t>
             </a:r>
-            <a:r>
-              <a:rPr lang="en-US" sz="2000" b="1" i="0" dirty="0">
+            <a:br>
+              <a:rPr lang="en-US" b="1" i="0" dirty="0">
                 <a:solidFill>
                   <a:schemeClr val="tx1"/>
                 </a:solidFill>
@@ -15401,25 +15904,37 @@
                 <a:highlight>
                   <a:srgbClr val="FFFF00"/>
                 </a:highlight>
-                <a:latin typeface="Roboto Mono"/>
-              </a:rPr>
-              <a:t>!(</a:t>
-            </a:r>
-            <a:r>
-              <a:rPr lang="en-US" sz="2000" i="0" dirty="0" err="1">
+                <a:latin typeface="Courier New" panose="02070309020205020404" pitchFamily="49" charset="0"/>
+                <a:cs typeface="Courier New" panose="02070309020205020404" pitchFamily="49" charset="0"/>
+              </a:rPr>
+            </a:br>
+            <a:r>
+              <a:rPr lang="en-US" b="1" i="0" dirty="0">
                 <a:solidFill>
                   <a:schemeClr val="tx1"/>
+                </a:solidFill>
+                <a:effectLst/>
+                <a:latin typeface="Courier New" panose="02070309020205020404" pitchFamily="49" charset="0"/>
+                <a:cs typeface="Courier New" panose="02070309020205020404" pitchFamily="49" charset="0"/>
+              </a:rPr>
+              <a:t>          </a:t>
+            </a:r>
+            <a:r>
+              <a:rPr lang="en-US" b="1" i="0" dirty="0">
+                <a:solidFill>
+                  <a:srgbClr val="FF0000"/>
                 </a:solidFill>
                 <a:effectLst/>
                 <a:highlight>
                   <a:srgbClr val="FFFF00"/>
                 </a:highlight>
-                <a:latin typeface="Roboto Mono"/>
-              </a:rPr>
-              <a:t>birth_year</a:t>
-            </a:r>
-            <a:r>
-              <a:rPr lang="en-US" sz="2000" i="0" dirty="0">
+                <a:latin typeface="Courier New" panose="02070309020205020404" pitchFamily="49" charset="0"/>
+                <a:cs typeface="Courier New" panose="02070309020205020404" pitchFamily="49" charset="0"/>
+              </a:rPr>
+              <a:t>!</a:t>
+            </a:r>
+            <a:r>
+              <a:rPr lang="en-US" b="1" i="0" dirty="0">
                 <a:solidFill>
                   <a:schemeClr val="tx1"/>
                 </a:solidFill>
@@ -15427,29 +15942,60 @@
                 <a:highlight>
                   <a:srgbClr val="FFFF00"/>
                 </a:highlight>
-                <a:latin typeface="Roboto Mono"/>
-              </a:rPr>
-              <a:t> &lt;= 2005)</a:t>
-            </a:r>
-            <a:r>
-              <a:rPr lang="en-US" sz="2000" b="0" i="0" dirty="0">
-                <a:solidFill>
-                  <a:srgbClr val="36464E"/>
+                <a:latin typeface="Courier New" panose="02070309020205020404" pitchFamily="49" charset="0"/>
+                <a:cs typeface="Courier New" panose="02070309020205020404" pitchFamily="49" charset="0"/>
+              </a:rPr>
+              <a:t>(</a:t>
+            </a:r>
+            <a:r>
+              <a:rPr lang="en-US" b="1" i="0" dirty="0" err="1">
+                <a:solidFill>
+                  <a:schemeClr val="tx1"/>
                 </a:solidFill>
                 <a:effectLst/>
                 <a:highlight>
                   <a:srgbClr val="FFFF00"/>
                 </a:highlight>
-                <a:latin typeface="Roboto Mono"/>
+                <a:latin typeface="Courier New" panose="02070309020205020404" pitchFamily="49" charset="0"/>
+                <a:cs typeface="Courier New" panose="02070309020205020404" pitchFamily="49" charset="0"/>
+              </a:rPr>
+              <a:t>birth_year</a:t>
+            </a:r>
+            <a:r>
+              <a:rPr lang="en-US" b="1" i="0" dirty="0">
+                <a:solidFill>
+                  <a:schemeClr val="tx1"/>
+                </a:solidFill>
+                <a:effectLst/>
+                <a:highlight>
+                  <a:srgbClr val="FFFF00"/>
+                </a:highlight>
+                <a:latin typeface="Courier New" panose="02070309020205020404" pitchFamily="49" charset="0"/>
+                <a:cs typeface="Courier New" panose="02070309020205020404" pitchFamily="49" charset="0"/>
+              </a:rPr>
+              <a:t> &lt;= 2005)</a:t>
+            </a:r>
+            <a:r>
+              <a:rPr lang="en-US" b="1" i="0" dirty="0">
+                <a:solidFill>
+                  <a:srgbClr val="36464E"/>
+                </a:solidFill>
+                <a:effectLst/>
+                <a:highlight>
+                  <a:srgbClr val="FFFF00"/>
+                </a:highlight>
+                <a:latin typeface="Courier New" panose="02070309020205020404" pitchFamily="49" charset="0"/>
+                <a:cs typeface="Courier New" panose="02070309020205020404" pitchFamily="49" charset="0"/>
               </a:rPr>
               <a:t> }</a:t>
             </a:r>
-            <a:endParaRPr lang="es-ES" sz="2000" i="0" dirty="0">
+            <a:endParaRPr lang="es-ES" b="1" i="0" dirty="0">
               <a:solidFill>
                 <a:schemeClr val="tx1"/>
               </a:solidFill>
               <a:effectLst/>
-              <a:latin typeface="Roboto Mono"/>
+              <a:latin typeface="Courier New" panose="02070309020205020404" pitchFamily="49" charset="0"/>
+              <a:cs typeface="Courier New" panose="02070309020205020404" pitchFamily="49" charset="0"/>
             </a:endParaRPr>
           </a:p>
         </p:txBody>
@@ -15468,8 +16014,8 @@
         </p:nvSpPr>
         <p:spPr>
           <a:xfrm>
-            <a:off x="973947" y="5356468"/>
-            <a:ext cx="6526445" cy="400110"/>
+            <a:off x="973947" y="5944917"/>
+            <a:ext cx="6526445" cy="646331"/>
           </a:xfrm>
           <a:prstGeom prst="rect">
             <a:avLst/>
@@ -15513,17 +16059,18 @@
               </a:tabLst>
             </a:pPr>
             <a:r>
-              <a:rPr lang="en-US" sz="2000" b="0" i="0" dirty="0">
+              <a:rPr lang="en-US" b="1" i="0" dirty="0">
                 <a:solidFill>
                   <a:srgbClr val="36464E"/>
                 </a:solidFill>
                 <a:effectLst/>
-                <a:latin typeface="Roboto Mono"/>
+                <a:latin typeface="Courier New" panose="02070309020205020404" pitchFamily="49" charset="0"/>
+                <a:cs typeface="Courier New" panose="02070309020205020404" pitchFamily="49" charset="0"/>
               </a:rPr>
               <a:t>    </a:t>
             </a:r>
             <a:r>
-              <a:rPr lang="en-US" sz="2000" b="0" i="0" dirty="0">
+              <a:rPr lang="en-US" b="1" i="0" dirty="0">
                 <a:solidFill>
                   <a:srgbClr val="36464E"/>
                 </a:solidFill>
@@ -15531,12 +16078,13 @@
                 <a:highlight>
                   <a:srgbClr val="FFFF00"/>
                 </a:highlight>
-                <a:latin typeface="Roboto Mono"/>
+                <a:latin typeface="Courier New" panose="02070309020205020404" pitchFamily="49" charset="0"/>
+                <a:cs typeface="Courier New" panose="02070309020205020404" pitchFamily="49" charset="0"/>
               </a:rPr>
               <a:t>// { (</a:t>
             </a:r>
             <a:r>
-              <a:rPr lang="en-US" sz="2000" i="0" dirty="0" err="1">
+              <a:rPr lang="en-US" b="1" i="0" dirty="0" err="1">
                 <a:solidFill>
                   <a:schemeClr val="tx1"/>
                 </a:solidFill>
@@ -15544,12 +16092,13 @@
                 <a:highlight>
                   <a:srgbClr val="FFFF00"/>
                 </a:highlight>
-                <a:latin typeface="Roboto Mono"/>
+                <a:latin typeface="Courier New" panose="02070309020205020404" pitchFamily="49" charset="0"/>
+                <a:cs typeface="Courier New" panose="02070309020205020404" pitchFamily="49" charset="0"/>
               </a:rPr>
               <a:t>birth_year</a:t>
             </a:r>
             <a:r>
-              <a:rPr lang="en-US" sz="2000" i="0" dirty="0">
+              <a:rPr lang="en-US" b="1" i="0" dirty="0">
                 <a:solidFill>
                   <a:schemeClr val="tx1"/>
                 </a:solidFill>
@@ -15557,25 +16106,27 @@
                 <a:highlight>
                   <a:srgbClr val="FFFF00"/>
                 </a:highlight>
-                <a:latin typeface="Roboto Mono"/>
-              </a:rPr>
-              <a:t> &lt; 1995) || (</a:t>
-            </a:r>
-            <a:r>
-              <a:rPr lang="en-US" sz="2000" i="0" dirty="0" err="1">
-                <a:solidFill>
-                  <a:schemeClr val="tx1"/>
+                <a:latin typeface="Courier New" panose="02070309020205020404" pitchFamily="49" charset="0"/>
+                <a:cs typeface="Courier New" panose="02070309020205020404" pitchFamily="49" charset="0"/>
+              </a:rPr>
+              <a:t> </a:t>
+            </a:r>
+            <a:r>
+              <a:rPr lang="en-US" b="1" i="0" dirty="0">
+                <a:solidFill>
+                  <a:srgbClr val="FF0000"/>
                 </a:solidFill>
                 <a:effectLst/>
                 <a:highlight>
                   <a:srgbClr val="FFFF00"/>
                 </a:highlight>
-                <a:latin typeface="Roboto Mono"/>
-              </a:rPr>
-              <a:t>birth_year</a:t>
-            </a:r>
-            <a:r>
-              <a:rPr lang="en-US" sz="2000" i="0" dirty="0">
+                <a:latin typeface="Courier New" panose="02070309020205020404" pitchFamily="49" charset="0"/>
+                <a:cs typeface="Courier New" panose="02070309020205020404" pitchFamily="49" charset="0"/>
+              </a:rPr>
+              <a:t>&lt;</a:t>
+            </a:r>
+            <a:r>
+              <a:rPr lang="en-US" b="1" i="0" dirty="0">
                 <a:solidFill>
                   <a:schemeClr val="tx1"/>
                 </a:solidFill>
@@ -15583,29 +16134,126 @@
                 <a:highlight>
                   <a:srgbClr val="FFFF00"/>
                 </a:highlight>
-                <a:latin typeface="Roboto Mono"/>
-              </a:rPr>
-              <a:t> &gt; 2005)</a:t>
-            </a:r>
-            <a:r>
-              <a:rPr lang="en-US" sz="2000" b="0" i="0" dirty="0">
-                <a:solidFill>
-                  <a:srgbClr val="36464E"/>
+                <a:latin typeface="Courier New" panose="02070309020205020404" pitchFamily="49" charset="0"/>
+                <a:cs typeface="Courier New" panose="02070309020205020404" pitchFamily="49" charset="0"/>
+              </a:rPr>
+              <a:t> 1995) || </a:t>
+            </a:r>
+            <a:br>
+              <a:rPr lang="en-US" b="1" i="0" dirty="0">
+                <a:solidFill>
+                  <a:schemeClr val="tx1"/>
                 </a:solidFill>
                 <a:effectLst/>
                 <a:highlight>
                   <a:srgbClr val="FFFF00"/>
                 </a:highlight>
-                <a:latin typeface="Roboto Mono"/>
+                <a:latin typeface="Courier New" panose="02070309020205020404" pitchFamily="49" charset="0"/>
+                <a:cs typeface="Courier New" panose="02070309020205020404" pitchFamily="49" charset="0"/>
+              </a:rPr>
+            </a:br>
+            <a:r>
+              <a:rPr lang="en-US" b="1" i="0" dirty="0">
+                <a:solidFill>
+                  <a:schemeClr val="tx1"/>
+                </a:solidFill>
+                <a:effectLst/>
+                <a:latin typeface="Courier New" panose="02070309020205020404" pitchFamily="49" charset="0"/>
+                <a:cs typeface="Courier New" panose="02070309020205020404" pitchFamily="49" charset="0"/>
+              </a:rPr>
+              <a:t>         </a:t>
+            </a:r>
+            <a:r>
+              <a:rPr lang="en-US" b="1" i="0" dirty="0">
+                <a:solidFill>
+                  <a:schemeClr val="tx1"/>
+                </a:solidFill>
+                <a:effectLst/>
+                <a:highlight>
+                  <a:srgbClr val="FFFF00"/>
+                </a:highlight>
+                <a:latin typeface="Courier New" panose="02070309020205020404" pitchFamily="49" charset="0"/>
+                <a:cs typeface="Courier New" panose="02070309020205020404" pitchFamily="49" charset="0"/>
+              </a:rPr>
+              <a:t>(</a:t>
+            </a:r>
+            <a:r>
+              <a:rPr lang="en-US" b="1" i="0" dirty="0" err="1">
+                <a:solidFill>
+                  <a:schemeClr val="tx1"/>
+                </a:solidFill>
+                <a:effectLst/>
+                <a:highlight>
+                  <a:srgbClr val="FFFF00"/>
+                </a:highlight>
+                <a:latin typeface="Courier New" panose="02070309020205020404" pitchFamily="49" charset="0"/>
+                <a:cs typeface="Courier New" panose="02070309020205020404" pitchFamily="49" charset="0"/>
+              </a:rPr>
+              <a:t>birth_year</a:t>
+            </a:r>
+            <a:r>
+              <a:rPr lang="en-US" b="1" i="0" dirty="0">
+                <a:solidFill>
+                  <a:schemeClr val="tx1"/>
+                </a:solidFill>
+                <a:effectLst/>
+                <a:highlight>
+                  <a:srgbClr val="FFFF00"/>
+                </a:highlight>
+                <a:latin typeface="Courier New" panose="02070309020205020404" pitchFamily="49" charset="0"/>
+                <a:cs typeface="Courier New" panose="02070309020205020404" pitchFamily="49" charset="0"/>
+              </a:rPr>
+              <a:t> </a:t>
+            </a:r>
+            <a:r>
+              <a:rPr lang="en-US" b="1" i="0" dirty="0">
+                <a:solidFill>
+                  <a:srgbClr val="FF0000"/>
+                </a:solidFill>
+                <a:effectLst/>
+                <a:highlight>
+                  <a:srgbClr val="FFFF00"/>
+                </a:highlight>
+                <a:latin typeface="Courier New" panose="02070309020205020404" pitchFamily="49" charset="0"/>
+                <a:cs typeface="Courier New" panose="02070309020205020404" pitchFamily="49" charset="0"/>
+              </a:rPr>
+              <a:t>&gt;</a:t>
+            </a:r>
+            <a:r>
+              <a:rPr lang="en-US" b="1" i="0" dirty="0">
+                <a:solidFill>
+                  <a:schemeClr val="tx1"/>
+                </a:solidFill>
+                <a:effectLst/>
+                <a:highlight>
+                  <a:srgbClr val="FFFF00"/>
+                </a:highlight>
+                <a:latin typeface="Courier New" panose="02070309020205020404" pitchFamily="49" charset="0"/>
+                <a:cs typeface="Courier New" panose="02070309020205020404" pitchFamily="49" charset="0"/>
+              </a:rPr>
+              <a:t> 2005)</a:t>
+            </a:r>
+            <a:r>
+              <a:rPr lang="en-US" b="1" i="0" dirty="0">
+                <a:solidFill>
+                  <a:srgbClr val="36464E"/>
+                </a:solidFill>
+                <a:effectLst/>
+                <a:highlight>
+                  <a:srgbClr val="FFFF00"/>
+                </a:highlight>
+                <a:latin typeface="Courier New" panose="02070309020205020404" pitchFamily="49" charset="0"/>
+                <a:cs typeface="Courier New" panose="02070309020205020404" pitchFamily="49" charset="0"/>
               </a:rPr>
               <a:t> }</a:t>
             </a:r>
-            <a:endParaRPr lang="es-ES" sz="2000" i="0" dirty="0">
+            <a:endParaRPr lang="es-ES" b="1" i="0" dirty="0">
               <a:solidFill>
                 <a:schemeClr val="tx1"/>
               </a:solidFill>
               <a:effectLst/>
-              <a:latin typeface="Roboto Mono"/>
+              <a:latin typeface="Courier New" panose="02070309020205020404" pitchFamily="49" charset="0"/>
+              <a:cs typeface="Courier New" panose="02070309020205020404" pitchFamily="49" charset="0"/>
             </a:endParaRPr>
           </a:p>
         </p:txBody>
@@ -15639,6 +16287,98 @@
               <a:t>CS1010 (AY2023/24 Semester 2)</a:t>
             </a:r>
             <a:endParaRPr lang="en-US" dirty="0"/>
+          </a:p>
+        </p:txBody>
+      </p:sp>
+      <p:sp>
+        <p:nvSpPr>
+          <p:cNvPr id="3" name="Arrow: Down 2">
+            <a:extLst>
+              <a:ext uri="{FF2B5EF4-FFF2-40B4-BE49-F238E27FC236}">
+                <a16:creationId xmlns:a16="http://schemas.microsoft.com/office/drawing/2014/main" id="{EB29D67A-E1FB-B8A1-FFED-05798E6A90A4}"/>
+              </a:ext>
+            </a:extLst>
+          </p:cNvPr>
+          <p:cNvSpPr/>
+          <p:nvPr/>
+        </p:nvSpPr>
+        <p:spPr>
+          <a:xfrm>
+            <a:off x="4028792" y="4734962"/>
+            <a:ext cx="208230" cy="417695"/>
+          </a:xfrm>
+          <a:prstGeom prst="downArrow">
+            <a:avLst/>
+          </a:prstGeom>
+        </p:spPr>
+        <p:style>
+          <a:lnRef idx="2">
+            <a:schemeClr val="accent1">
+              <a:shade val="15000"/>
+            </a:schemeClr>
+          </a:lnRef>
+          <a:fillRef idx="1">
+            <a:schemeClr val="accent1"/>
+          </a:fillRef>
+          <a:effectRef idx="0">
+            <a:schemeClr val="accent1"/>
+          </a:effectRef>
+          <a:fontRef idx="minor">
+            <a:schemeClr val="lt1"/>
+          </a:fontRef>
+        </p:style>
+        <p:txBody>
+          <a:bodyPr rtlCol="0" anchor="ctr"/>
+          <a:lstStyle/>
+          <a:p>
+            <a:pPr algn="ctr"/>
+            <a:endParaRPr lang="en-SG"/>
+          </a:p>
+        </p:txBody>
+      </p:sp>
+      <p:sp>
+        <p:nvSpPr>
+          <p:cNvPr id="4" name="Arrow: Down 3">
+            <a:extLst>
+              <a:ext uri="{FF2B5EF4-FFF2-40B4-BE49-F238E27FC236}">
+                <a16:creationId xmlns:a16="http://schemas.microsoft.com/office/drawing/2014/main" id="{28C1099F-1121-70FE-4A9C-B34BE7EF3CFA}"/>
+              </a:ext>
+            </a:extLst>
+          </p:cNvPr>
+          <p:cNvSpPr/>
+          <p:nvPr/>
+        </p:nvSpPr>
+        <p:spPr>
+          <a:xfrm>
+            <a:off x="4028792" y="5780795"/>
+            <a:ext cx="208230" cy="182316"/>
+          </a:xfrm>
+          <a:prstGeom prst="downArrow">
+            <a:avLst/>
+          </a:prstGeom>
+        </p:spPr>
+        <p:style>
+          <a:lnRef idx="2">
+            <a:schemeClr val="accent1">
+              <a:shade val="15000"/>
+            </a:schemeClr>
+          </a:lnRef>
+          <a:fillRef idx="1">
+            <a:schemeClr val="accent1"/>
+          </a:fillRef>
+          <a:effectRef idx="0">
+            <a:schemeClr val="accent1"/>
+          </a:effectRef>
+          <a:fontRef idx="minor">
+            <a:schemeClr val="lt1"/>
+          </a:fontRef>
+        </p:style>
+        <p:txBody>
+          <a:bodyPr rtlCol="0" anchor="ctr"/>
+          <a:lstStyle/>
+          <a:p>
+            <a:pPr algn="ctr"/>
+            <a:endParaRPr lang="en-SG"/>
           </a:p>
         </p:txBody>
       </p:sp>

</xml_diff>